<commit_message>
updated XDTools and report
</commit_message>
<xml_diff>
--- a/Presentation/Midterm/midterm.pptx
+++ b/Presentation/Midterm/midterm.pptx
@@ -4670,21 +4670,21 @@
     </dgm:pt>
   </dgm:ptLst>
   <dgm:cxnLst>
-    <dgm:cxn modelId="{871F3FDF-C464-4964-A3C4-CC3F21778624}" type="presOf" srcId="{F52B2616-E070-41E9-A0C6-5F77A35279F8}" destId="{475E8E10-321D-43CB-9FBE-E21B12C6A7FB}" srcOrd="0" destOrd="0" presId="urn:microsoft.com/office/officeart/2005/8/layout/hList6"/>
     <dgm:cxn modelId="{48283766-C8B5-4FC7-812B-8497AA0DEBE2}" srcId="{F52B2616-E070-41E9-A0C6-5F77A35279F8}" destId="{395ED92E-3BD4-4BFD-9994-17C5129F55A5}" srcOrd="1" destOrd="0" parTransId="{B66891D4-0E88-4E7C-8A2A-00D270DC71D7}" sibTransId="{34D15687-2B3A-4677-A069-CE3784C0870A}"/>
+    <dgm:cxn modelId="{02379F8E-E404-459B-9023-5210359B8444}" type="presOf" srcId="{57ECCBC0-E332-4DA8-A753-B19397CD300C}" destId="{475E8E10-321D-43CB-9FBE-E21B12C6A7FB}" srcOrd="0" destOrd="4" presId="urn:microsoft.com/office/officeart/2005/8/layout/hList6"/>
     <dgm:cxn modelId="{EE055907-9F23-4631-A693-A5320BAFE293}" srcId="{F52B2616-E070-41E9-A0C6-5F77A35279F8}" destId="{57ECCBC0-E332-4DA8-A753-B19397CD300C}" srcOrd="3" destOrd="0" parTransId="{AC7B9073-E1B8-4F66-9BEE-86E84C56E727}" sibTransId="{A91B5AC3-C622-4833-A8CA-6C2F4C9C6E7B}"/>
     <dgm:cxn modelId="{B088ACB9-2AF1-4274-9163-FCECF296CBA9}" type="presOf" srcId="{14F50946-1EB0-44B4-97FE-91658C19A3E7}" destId="{475E8E10-321D-43CB-9FBE-E21B12C6A7FB}" srcOrd="0" destOrd="1" presId="urn:microsoft.com/office/officeart/2005/8/layout/hList6"/>
-    <dgm:cxn modelId="{AF60B73B-EF89-40EE-A778-CCA3C636C26A}" srcId="{F52B2616-E070-41E9-A0C6-5F77A35279F8}" destId="{36C62F2E-BE03-4469-93EB-2CE0029861D2}" srcOrd="2" destOrd="0" parTransId="{6B55622F-833B-4820-BB7F-780FE83BAA97}" sibTransId="{BA316D3A-4158-4234-82B5-DB796CAA804B}"/>
-    <dgm:cxn modelId="{3412A52F-459B-475D-9F64-173BE5107FC9}" srcId="{F52B2616-E070-41E9-A0C6-5F77A35279F8}" destId="{14F50946-1EB0-44B4-97FE-91658C19A3E7}" srcOrd="0" destOrd="0" parTransId="{08744D75-444B-4D39-BE5B-555F09CFEAE3}" sibTransId="{2E923D5A-C04A-407D-9677-B766BDC9887B}"/>
     <dgm:cxn modelId="{9AE7B832-666D-4F57-AD7F-E46722024978}" type="presOf" srcId="{AAEE1B33-7B5F-4AAA-BC6C-8DA7C7BA08E6}" destId="{CB3970F5-4B46-4D03-9416-FEB9FF6AB152}" srcOrd="0" destOrd="0" presId="urn:microsoft.com/office/officeart/2005/8/layout/hList6"/>
+    <dgm:cxn modelId="{A68C515D-4781-4ED2-825C-BFC427B28AA4}" srcId="{F9CA9111-1371-447E-8AA7-EEE656CE2D33}" destId="{F52B2616-E070-41E9-A0C6-5F77A35279F8}" srcOrd="0" destOrd="0" parTransId="{4BF08426-E85B-4FBD-933D-0C8974B695AF}" sibTransId="{248DC076-5408-4A74-B5D3-67F4691AB699}"/>
     <dgm:cxn modelId="{F29D6295-5C85-47D5-A92C-F4263C7D3B91}" type="presOf" srcId="{1ABD7A25-9D19-420E-AAF3-2963CAD6EAC6}" destId="{4A2757D9-EA3E-4300-9C07-77EBA31E4FE6}" srcOrd="0" destOrd="0" presId="urn:microsoft.com/office/officeart/2005/8/layout/hList6"/>
     <dgm:cxn modelId="{FBEB1564-6F49-4777-86FD-EE4D15B4B84C}" type="presOf" srcId="{395ED92E-3BD4-4BFD-9994-17C5129F55A5}" destId="{475E8E10-321D-43CB-9FBE-E21B12C6A7FB}" srcOrd="0" destOrd="2" presId="urn:microsoft.com/office/officeart/2005/8/layout/hList6"/>
+    <dgm:cxn modelId="{3412A52F-459B-475D-9F64-173BE5107FC9}" srcId="{F52B2616-E070-41E9-A0C6-5F77A35279F8}" destId="{14F50946-1EB0-44B4-97FE-91658C19A3E7}" srcOrd="0" destOrd="0" parTransId="{08744D75-444B-4D39-BE5B-555F09CFEAE3}" sibTransId="{2E923D5A-C04A-407D-9677-B766BDC9887B}"/>
+    <dgm:cxn modelId="{7C37895F-5EE0-4FA2-A49F-109C5A857BEE}" srcId="{F9CA9111-1371-447E-8AA7-EEE656CE2D33}" destId="{1ABD7A25-9D19-420E-AAF3-2963CAD6EAC6}" srcOrd="1" destOrd="0" parTransId="{511EA8BB-52B4-4F77-9E23-CE9DECDAD34F}" sibTransId="{447BF525-E978-44D7-8AD8-2A572135AF6B}"/>
+    <dgm:cxn modelId="{871F3FDF-C464-4964-A3C4-CC3F21778624}" type="presOf" srcId="{F52B2616-E070-41E9-A0C6-5F77A35279F8}" destId="{475E8E10-321D-43CB-9FBE-E21B12C6A7FB}" srcOrd="0" destOrd="0" presId="urn:microsoft.com/office/officeart/2005/8/layout/hList6"/>
     <dgm:cxn modelId="{317E6C53-4101-4B07-B4CA-E955FAD17431}" type="presOf" srcId="{36C62F2E-BE03-4469-93EB-2CE0029861D2}" destId="{475E8E10-321D-43CB-9FBE-E21B12C6A7FB}" srcOrd="0" destOrd="3" presId="urn:microsoft.com/office/officeart/2005/8/layout/hList6"/>
-    <dgm:cxn modelId="{A68C515D-4781-4ED2-825C-BFC427B28AA4}" srcId="{F9CA9111-1371-447E-8AA7-EEE656CE2D33}" destId="{F52B2616-E070-41E9-A0C6-5F77A35279F8}" srcOrd="0" destOrd="0" parTransId="{4BF08426-E85B-4FBD-933D-0C8974B695AF}" sibTransId="{248DC076-5408-4A74-B5D3-67F4691AB699}"/>
-    <dgm:cxn modelId="{02379F8E-E404-459B-9023-5210359B8444}" type="presOf" srcId="{57ECCBC0-E332-4DA8-A753-B19397CD300C}" destId="{475E8E10-321D-43CB-9FBE-E21B12C6A7FB}" srcOrd="0" destOrd="4" presId="urn:microsoft.com/office/officeart/2005/8/layout/hList6"/>
     <dgm:cxn modelId="{3E37CD1C-179D-4156-A167-34DCE0D052A3}" srcId="{F9CA9111-1371-447E-8AA7-EEE656CE2D33}" destId="{AAEE1B33-7B5F-4AAA-BC6C-8DA7C7BA08E6}" srcOrd="2" destOrd="0" parTransId="{82D59BF3-8865-460B-89E3-CEB78E0A4B11}" sibTransId="{2EE4BE8A-D1C9-41A1-8F65-AD8D50D77E78}"/>
     <dgm:cxn modelId="{E91080F3-4DD0-466A-AF91-5CEF78A90E55}" type="presOf" srcId="{F9CA9111-1371-447E-8AA7-EEE656CE2D33}" destId="{A6963697-5066-44D5-9D8B-78CBDBA2B4B3}" srcOrd="0" destOrd="0" presId="urn:microsoft.com/office/officeart/2005/8/layout/hList6"/>
-    <dgm:cxn modelId="{7C37895F-5EE0-4FA2-A49F-109C5A857BEE}" srcId="{F9CA9111-1371-447E-8AA7-EEE656CE2D33}" destId="{1ABD7A25-9D19-420E-AAF3-2963CAD6EAC6}" srcOrd="1" destOrd="0" parTransId="{511EA8BB-52B4-4F77-9E23-CE9DECDAD34F}" sibTransId="{447BF525-E978-44D7-8AD8-2A572135AF6B}"/>
+    <dgm:cxn modelId="{AF60B73B-EF89-40EE-A778-CCA3C636C26A}" srcId="{F52B2616-E070-41E9-A0C6-5F77A35279F8}" destId="{36C62F2E-BE03-4469-93EB-2CE0029861D2}" srcOrd="2" destOrd="0" parTransId="{6B55622F-833B-4820-BB7F-780FE83BAA97}" sibTransId="{BA316D3A-4158-4234-82B5-DB796CAA804B}"/>
     <dgm:cxn modelId="{3CB54F1F-7587-4D58-9FE8-BEB2800776A4}" type="presParOf" srcId="{A6963697-5066-44D5-9D8B-78CBDBA2B4B3}" destId="{475E8E10-321D-43CB-9FBE-E21B12C6A7FB}" srcOrd="0" destOrd="0" presId="urn:microsoft.com/office/officeart/2005/8/layout/hList6"/>
     <dgm:cxn modelId="{35E32079-9D9E-4F82-B280-3CDC3B2C761D}" type="presParOf" srcId="{A6963697-5066-44D5-9D8B-78CBDBA2B4B3}" destId="{B1D85BDC-A359-4F71-A35B-0A83DD2BF8E2}" srcOrd="1" destOrd="0" presId="urn:microsoft.com/office/officeart/2005/8/layout/hList6"/>
     <dgm:cxn modelId="{4185EC8E-595A-4D80-BCA0-22666756F9F3}" type="presParOf" srcId="{A6963697-5066-44D5-9D8B-78CBDBA2B4B3}" destId="{4A2757D9-EA3E-4300-9C07-77EBA31E4FE6}" srcOrd="2" destOrd="0" presId="urn:microsoft.com/office/officeart/2005/8/layout/hList6"/>
@@ -7233,304 +7233,6 @@
       <dsp:cNvGrpSpPr/>
     </dsp:nvGrpSpPr>
     <dsp:grpSpPr/>
-    <dsp:sp modelId="{475E8E10-321D-43CB-9FBE-E21B12C6A7FB}">
-      <dsp:nvSpPr>
-        <dsp:cNvPr id="0" name=""/>
-        <dsp:cNvSpPr/>
-      </dsp:nvSpPr>
-      <dsp:spPr>
-        <a:xfrm rot="16200000">
-          <a:off x="-504299" y="507633"/>
-          <a:ext cx="3952683" cy="2937415"/>
-        </a:xfrm>
-        <a:prstGeom prst="flowChartManualOperation">
-          <a:avLst/>
-        </a:prstGeom>
-        <a:gradFill rotWithShape="0">
-          <a:gsLst>
-            <a:gs pos="0">
-              <a:schemeClr val="accent1">
-                <a:shade val="80000"/>
-                <a:hueOff val="0"/>
-                <a:satOff val="0"/>
-                <a:lumOff val="0"/>
-                <a:alphaOff val="0"/>
-                <a:tint val="96000"/>
-                <a:lumMod val="104000"/>
-              </a:schemeClr>
-            </a:gs>
-            <a:gs pos="100000">
-              <a:schemeClr val="accent1">
-                <a:shade val="80000"/>
-                <a:hueOff val="0"/>
-                <a:satOff val="0"/>
-                <a:lumOff val="0"/>
-                <a:alphaOff val="0"/>
-                <a:shade val="98000"/>
-                <a:lumMod val="94000"/>
-              </a:schemeClr>
-            </a:gs>
-          </a:gsLst>
-          <a:lin ang="5400000" scaled="0"/>
-        </a:gradFill>
-        <a:ln>
-          <a:noFill/>
-        </a:ln>
-        <a:effectLst>
-          <a:outerShdw blurRad="50800" dist="38100" dir="5400000" rotWithShape="0">
-            <a:srgbClr val="000000">
-              <a:alpha val="60000"/>
-            </a:srgbClr>
-          </a:outerShdw>
-        </a:effectLst>
-      </dsp:spPr>
-      <dsp:style>
-        <a:lnRef idx="0">
-          <a:scrgbClr r="0" g="0" b="0"/>
-        </a:lnRef>
-        <a:fillRef idx="3">
-          <a:scrgbClr r="0" g="0" b="0"/>
-        </a:fillRef>
-        <a:effectRef idx="3">
-          <a:scrgbClr r="0" g="0" b="0"/>
-        </a:effectRef>
-        <a:fontRef idx="minor">
-          <a:schemeClr val="lt1"/>
-        </a:fontRef>
-      </dsp:style>
-      <dsp:txBody>
-        <a:bodyPr spcFirstLastPara="0" vert="horz" wrap="square" lIns="133350" tIns="0" rIns="133350" bIns="0" numCol="1" spcCol="1270" anchor="t" anchorCtr="0">
-          <a:noAutofit/>
-        </a:bodyPr>
-        <a:lstStyle/>
-        <a:p>
-          <a:pPr lvl="0" algn="l" defTabSz="933450">
-            <a:lnSpc>
-              <a:spcPct val="90000"/>
-            </a:lnSpc>
-            <a:spcBef>
-              <a:spcPct val="0"/>
-            </a:spcBef>
-            <a:spcAft>
-              <a:spcPct val="35000"/>
-            </a:spcAft>
-          </a:pPr>
-          <a:r>
-            <a:rPr lang="en-US" sz="2100" kern="1200" smtClean="0"/>
-            <a:t>Analyze</a:t>
-          </a:r>
-          <a:endParaRPr lang="en-US" sz="2100" kern="1200" dirty="0"/>
-        </a:p>
-        <a:p>
-          <a:pPr marL="171450" lvl="1" indent="-171450" algn="l" defTabSz="800100">
-            <a:lnSpc>
-              <a:spcPct val="90000"/>
-            </a:lnSpc>
-            <a:spcBef>
-              <a:spcPct val="0"/>
-            </a:spcBef>
-            <a:spcAft>
-              <a:spcPct val="15000"/>
-            </a:spcAft>
-            <a:buChar char="••"/>
-          </a:pPr>
-          <a:r>
-            <a:rPr lang="en-US" sz="1800" kern="1200" dirty="0" smtClean="0"/>
-            <a:t>Testing tools for responsive design</a:t>
-          </a:r>
-          <a:endParaRPr lang="en-US" sz="1800" kern="1200" dirty="0"/>
-        </a:p>
-        <a:p>
-          <a:pPr marL="171450" lvl="1" indent="-171450" algn="l" defTabSz="800100">
-            <a:lnSpc>
-              <a:spcPct val="90000"/>
-            </a:lnSpc>
-            <a:spcBef>
-              <a:spcPct val="0"/>
-            </a:spcBef>
-            <a:spcAft>
-              <a:spcPct val="15000"/>
-            </a:spcAft>
-            <a:buChar char="••"/>
-          </a:pPr>
-          <a:r>
-            <a:rPr lang="en-US" sz="1800" kern="1200" dirty="0" smtClean="0"/>
-            <a:t>General web testing tools</a:t>
-          </a:r>
-          <a:endParaRPr lang="en-US" sz="1800" kern="1200" dirty="0"/>
-        </a:p>
-        <a:p>
-          <a:pPr marL="171450" lvl="1" indent="-171450" algn="l" defTabSz="800100">
-            <a:lnSpc>
-              <a:spcPct val="90000"/>
-            </a:lnSpc>
-            <a:spcBef>
-              <a:spcPct val="0"/>
-            </a:spcBef>
-            <a:spcAft>
-              <a:spcPct val="15000"/>
-            </a:spcAft>
-            <a:buChar char="••"/>
-          </a:pPr>
-          <a:r>
-            <a:rPr lang="en-US" sz="1800" kern="1200" dirty="0" smtClean="0"/>
-            <a:t>Find limitations</a:t>
-          </a:r>
-          <a:endParaRPr lang="en-US" sz="1800" kern="1200" dirty="0"/>
-        </a:p>
-        <a:p>
-          <a:pPr marL="171450" lvl="1" indent="-171450" algn="l" defTabSz="800100">
-            <a:lnSpc>
-              <a:spcPct val="90000"/>
-            </a:lnSpc>
-            <a:spcBef>
-              <a:spcPct val="0"/>
-            </a:spcBef>
-            <a:spcAft>
-              <a:spcPct val="15000"/>
-            </a:spcAft>
-            <a:buChar char="••"/>
-          </a:pPr>
-          <a:r>
-            <a:rPr lang="en-US" sz="1800" kern="1200" dirty="0" smtClean="0"/>
-            <a:t>Gather requirements for improvements</a:t>
-          </a:r>
-          <a:endParaRPr lang="en-US" sz="1800" kern="1200" dirty="0"/>
-        </a:p>
-      </dsp:txBody>
-      <dsp:txXfrm rot="5400000">
-        <a:off x="3335" y="790536"/>
-        <a:ext cx="2937415" cy="2371609"/>
-      </dsp:txXfrm>
-    </dsp:sp>
-    <dsp:sp modelId="{4A2757D9-EA3E-4300-9C07-77EBA31E4FE6}">
-      <dsp:nvSpPr>
-        <dsp:cNvPr id="0" name=""/>
-        <dsp:cNvSpPr/>
-      </dsp:nvSpPr>
-      <dsp:spPr>
-        <a:xfrm rot="16200000">
-          <a:off x="2561388" y="587663"/>
-          <a:ext cx="3952683" cy="2777356"/>
-        </a:xfrm>
-        <a:prstGeom prst="flowChartManualOperation">
-          <a:avLst/>
-        </a:prstGeom>
-        <a:noFill/>
-        <a:ln>
-          <a:noFill/>
-        </a:ln>
-        <a:effectLst>
-          <a:outerShdw blurRad="50800" dist="38100" dir="5400000" rotWithShape="0">
-            <a:srgbClr val="000000">
-              <a:alpha val="60000"/>
-            </a:srgbClr>
-          </a:outerShdw>
-        </a:effectLst>
-      </dsp:spPr>
-      <dsp:style>
-        <a:lnRef idx="0">
-          <a:scrgbClr r="0" g="0" b="0"/>
-        </a:lnRef>
-        <a:fillRef idx="3">
-          <a:scrgbClr r="0" g="0" b="0"/>
-        </a:fillRef>
-        <a:effectRef idx="3">
-          <a:scrgbClr r="0" g="0" b="0"/>
-        </a:effectRef>
-        <a:fontRef idx="minor">
-          <a:schemeClr val="lt1"/>
-        </a:fontRef>
-      </dsp:style>
-      <dsp:txBody>
-        <a:bodyPr spcFirstLastPara="0" vert="horz" wrap="square" lIns="412750" tIns="0" rIns="412750" bIns="0" numCol="1" spcCol="1270" anchor="ctr" anchorCtr="0">
-          <a:noAutofit/>
-        </a:bodyPr>
-        <a:lstStyle/>
-        <a:p>
-          <a:pPr lvl="0" algn="ctr" defTabSz="2889250">
-            <a:lnSpc>
-              <a:spcPct val="90000"/>
-            </a:lnSpc>
-            <a:spcBef>
-              <a:spcPct val="0"/>
-            </a:spcBef>
-            <a:spcAft>
-              <a:spcPct val="35000"/>
-            </a:spcAft>
-          </a:pPr>
-          <a:endParaRPr lang="en-US" sz="6500" kern="1200" dirty="0"/>
-        </a:p>
-      </dsp:txBody>
-      <dsp:txXfrm rot="5400000">
-        <a:off x="3149052" y="790536"/>
-        <a:ext cx="2777356" cy="2371609"/>
-      </dsp:txXfrm>
-    </dsp:sp>
-    <dsp:sp modelId="{CB3970F5-4B46-4D03-9416-FEB9FF6AB152}">
-      <dsp:nvSpPr>
-        <dsp:cNvPr id="0" name=""/>
-        <dsp:cNvSpPr/>
-      </dsp:nvSpPr>
-      <dsp:spPr>
-        <a:xfrm rot="16200000">
-          <a:off x="5547045" y="587663"/>
-          <a:ext cx="3952683" cy="2777356"/>
-        </a:xfrm>
-        <a:prstGeom prst="flowChartManualOperation">
-          <a:avLst/>
-        </a:prstGeom>
-        <a:noFill/>
-        <a:ln>
-          <a:noFill/>
-        </a:ln>
-        <a:effectLst>
-          <a:outerShdw blurRad="50800" dist="38100" dir="5400000" rotWithShape="0">
-            <a:srgbClr val="000000">
-              <a:alpha val="60000"/>
-            </a:srgbClr>
-          </a:outerShdw>
-        </a:effectLst>
-      </dsp:spPr>
-      <dsp:style>
-        <a:lnRef idx="0">
-          <a:scrgbClr r="0" g="0" b="0"/>
-        </a:lnRef>
-        <a:fillRef idx="3">
-          <a:scrgbClr r="0" g="0" b="0"/>
-        </a:fillRef>
-        <a:effectRef idx="3">
-          <a:scrgbClr r="0" g="0" b="0"/>
-        </a:effectRef>
-        <a:fontRef idx="minor">
-          <a:schemeClr val="lt1"/>
-        </a:fontRef>
-      </dsp:style>
-      <dsp:txBody>
-        <a:bodyPr spcFirstLastPara="0" vert="horz" wrap="square" lIns="412750" tIns="0" rIns="412750" bIns="0" numCol="1" spcCol="1270" anchor="ctr" anchorCtr="0">
-          <a:noAutofit/>
-        </a:bodyPr>
-        <a:lstStyle/>
-        <a:p>
-          <a:pPr lvl="0" algn="ctr" defTabSz="2889250">
-            <a:lnSpc>
-              <a:spcPct val="90000"/>
-            </a:lnSpc>
-            <a:spcBef>
-              <a:spcPct val="0"/>
-            </a:spcBef>
-            <a:spcAft>
-              <a:spcPct val="35000"/>
-            </a:spcAft>
-          </a:pPr>
-          <a:endParaRPr lang="en-US" sz="6500" kern="1200" dirty="0"/>
-        </a:p>
-      </dsp:txBody>
-      <dsp:txXfrm rot="5400000">
-        <a:off x="6134709" y="790536"/>
-        <a:ext cx="2777356" cy="2371609"/>
-      </dsp:txXfrm>
-    </dsp:sp>
   </dsp:spTree>
 </dsp:drawing>
 </file>
@@ -7543,372 +7245,6 @@
       <dsp:cNvGrpSpPr/>
     </dsp:nvGrpSpPr>
     <dsp:grpSpPr/>
-    <dsp:sp modelId="{475E8E10-321D-43CB-9FBE-E21B12C6A7FB}">
-      <dsp:nvSpPr>
-        <dsp:cNvPr id="0" name=""/>
-        <dsp:cNvSpPr/>
-      </dsp:nvSpPr>
-      <dsp:spPr>
-        <a:xfrm rot="16200000">
-          <a:off x="-506828" y="507917"/>
-          <a:ext cx="3845429" cy="2829594"/>
-        </a:xfrm>
-        <a:prstGeom prst="flowChartManualOperation">
-          <a:avLst/>
-        </a:prstGeom>
-        <a:gradFill rotWithShape="0">
-          <a:gsLst>
-            <a:gs pos="0">
-              <a:schemeClr val="accent1">
-                <a:shade val="80000"/>
-                <a:hueOff val="0"/>
-                <a:satOff val="0"/>
-                <a:lumOff val="0"/>
-                <a:alphaOff val="0"/>
-                <a:tint val="96000"/>
-                <a:lumMod val="104000"/>
-              </a:schemeClr>
-            </a:gs>
-            <a:gs pos="100000">
-              <a:schemeClr val="accent1">
-                <a:shade val="80000"/>
-                <a:hueOff val="0"/>
-                <a:satOff val="0"/>
-                <a:lumOff val="0"/>
-                <a:alphaOff val="0"/>
-                <a:shade val="98000"/>
-                <a:lumMod val="94000"/>
-              </a:schemeClr>
-            </a:gs>
-          </a:gsLst>
-          <a:lin ang="5400000" scaled="0"/>
-        </a:gradFill>
-        <a:ln>
-          <a:noFill/>
-        </a:ln>
-        <a:effectLst>
-          <a:outerShdw blurRad="50800" dist="38100" dir="5400000" rotWithShape="0">
-            <a:srgbClr val="000000">
-              <a:alpha val="60000"/>
-            </a:srgbClr>
-          </a:outerShdw>
-        </a:effectLst>
-      </dsp:spPr>
-      <dsp:style>
-        <a:lnRef idx="0">
-          <a:scrgbClr r="0" g="0" b="0"/>
-        </a:lnRef>
-        <a:fillRef idx="3">
-          <a:scrgbClr r="0" g="0" b="0"/>
-        </a:fillRef>
-        <a:effectRef idx="3">
-          <a:scrgbClr r="0" g="0" b="0"/>
-        </a:effectRef>
-        <a:fontRef idx="minor">
-          <a:schemeClr val="lt1"/>
-        </a:fontRef>
-      </dsp:style>
-      <dsp:txBody>
-        <a:bodyPr spcFirstLastPara="0" vert="horz" wrap="square" lIns="133350" tIns="0" rIns="134476" bIns="0" numCol="1" spcCol="1270" anchor="t" anchorCtr="0">
-          <a:noAutofit/>
-        </a:bodyPr>
-        <a:lstStyle/>
-        <a:p>
-          <a:pPr lvl="0" algn="l" defTabSz="933450">
-            <a:lnSpc>
-              <a:spcPct val="90000"/>
-            </a:lnSpc>
-            <a:spcBef>
-              <a:spcPct val="0"/>
-            </a:spcBef>
-            <a:spcAft>
-              <a:spcPct val="35000"/>
-            </a:spcAft>
-          </a:pPr>
-          <a:r>
-            <a:rPr lang="en-US" sz="2100" kern="1200" dirty="0" smtClean="0"/>
-            <a:t>Analyze</a:t>
-          </a:r>
-          <a:endParaRPr lang="en-US" sz="2100" kern="1200" dirty="0"/>
-        </a:p>
-        <a:p>
-          <a:pPr marL="171450" lvl="1" indent="-171450" algn="l" defTabSz="711200">
-            <a:lnSpc>
-              <a:spcPct val="90000"/>
-            </a:lnSpc>
-            <a:spcBef>
-              <a:spcPct val="0"/>
-            </a:spcBef>
-            <a:spcAft>
-              <a:spcPct val="15000"/>
-            </a:spcAft>
-            <a:buChar char="••"/>
-          </a:pPr>
-          <a:r>
-            <a:rPr lang="en-US" sz="1600" kern="1200" dirty="0" smtClean="0"/>
-            <a:t>Testing tools for responsive design</a:t>
-          </a:r>
-          <a:endParaRPr lang="en-US" sz="1600" kern="1200" dirty="0"/>
-        </a:p>
-        <a:p>
-          <a:pPr marL="171450" lvl="1" indent="-171450" algn="l" defTabSz="711200">
-            <a:lnSpc>
-              <a:spcPct val="90000"/>
-            </a:lnSpc>
-            <a:spcBef>
-              <a:spcPct val="0"/>
-            </a:spcBef>
-            <a:spcAft>
-              <a:spcPct val="15000"/>
-            </a:spcAft>
-            <a:buChar char="••"/>
-          </a:pPr>
-          <a:r>
-            <a:rPr lang="en-US" sz="1600" kern="1200" dirty="0" smtClean="0"/>
-            <a:t>General web testing tools</a:t>
-          </a:r>
-          <a:endParaRPr lang="en-US" sz="1600" kern="1200" dirty="0"/>
-        </a:p>
-        <a:p>
-          <a:pPr marL="171450" lvl="1" indent="-171450" algn="l" defTabSz="711200">
-            <a:lnSpc>
-              <a:spcPct val="90000"/>
-            </a:lnSpc>
-            <a:spcBef>
-              <a:spcPct val="0"/>
-            </a:spcBef>
-            <a:spcAft>
-              <a:spcPct val="15000"/>
-            </a:spcAft>
-            <a:buChar char="••"/>
-          </a:pPr>
-          <a:r>
-            <a:rPr lang="en-US" sz="1600" kern="1200" dirty="0" smtClean="0"/>
-            <a:t>Find limitations</a:t>
-          </a:r>
-          <a:endParaRPr lang="en-US" sz="1600" kern="1200" dirty="0"/>
-        </a:p>
-        <a:p>
-          <a:pPr marL="171450" lvl="1" indent="-171450" algn="l" defTabSz="711200">
-            <a:lnSpc>
-              <a:spcPct val="90000"/>
-            </a:lnSpc>
-            <a:spcBef>
-              <a:spcPct val="0"/>
-            </a:spcBef>
-            <a:spcAft>
-              <a:spcPct val="15000"/>
-            </a:spcAft>
-            <a:buChar char="••"/>
-          </a:pPr>
-          <a:r>
-            <a:rPr lang="en-US" sz="1600" kern="1200" dirty="0" smtClean="0"/>
-            <a:t>Gather requirements for improvements</a:t>
-          </a:r>
-          <a:endParaRPr lang="en-US" sz="1600" kern="1200" dirty="0"/>
-        </a:p>
-      </dsp:txBody>
-      <dsp:txXfrm rot="5400000">
-        <a:off x="1090" y="769085"/>
-        <a:ext cx="2829594" cy="2307257"/>
-      </dsp:txXfrm>
-    </dsp:sp>
-    <dsp:sp modelId="{4A2757D9-EA3E-4300-9C07-77EBA31E4FE6}">
-      <dsp:nvSpPr>
-        <dsp:cNvPr id="0" name=""/>
-        <dsp:cNvSpPr/>
-      </dsp:nvSpPr>
-      <dsp:spPr>
-        <a:xfrm rot="16200000">
-          <a:off x="2534985" y="507917"/>
-          <a:ext cx="3845429" cy="2829594"/>
-        </a:xfrm>
-        <a:prstGeom prst="flowChartManualOperation">
-          <a:avLst/>
-        </a:prstGeom>
-        <a:gradFill rotWithShape="0">
-          <a:gsLst>
-            <a:gs pos="0">
-              <a:schemeClr val="accent1">
-                <a:shade val="80000"/>
-                <a:hueOff val="164162"/>
-                <a:satOff val="-7062"/>
-                <a:lumOff val="14007"/>
-                <a:alphaOff val="0"/>
-                <a:tint val="96000"/>
-                <a:lumMod val="104000"/>
-              </a:schemeClr>
-            </a:gs>
-            <a:gs pos="100000">
-              <a:schemeClr val="accent1">
-                <a:shade val="80000"/>
-                <a:hueOff val="164162"/>
-                <a:satOff val="-7062"/>
-                <a:lumOff val="14007"/>
-                <a:alphaOff val="0"/>
-                <a:shade val="98000"/>
-                <a:lumMod val="94000"/>
-              </a:schemeClr>
-            </a:gs>
-          </a:gsLst>
-          <a:lin ang="5400000" scaled="0"/>
-        </a:gradFill>
-        <a:ln>
-          <a:noFill/>
-        </a:ln>
-        <a:effectLst>
-          <a:outerShdw blurRad="50800" dist="38100" dir="5400000" rotWithShape="0">
-            <a:srgbClr val="000000">
-              <a:alpha val="60000"/>
-            </a:srgbClr>
-          </a:outerShdw>
-        </a:effectLst>
-      </dsp:spPr>
-      <dsp:style>
-        <a:lnRef idx="0">
-          <a:scrgbClr r="0" g="0" b="0"/>
-        </a:lnRef>
-        <a:fillRef idx="3">
-          <a:scrgbClr r="0" g="0" b="0"/>
-        </a:fillRef>
-        <a:effectRef idx="3">
-          <a:scrgbClr r="0" g="0" b="0"/>
-        </a:effectRef>
-        <a:fontRef idx="minor">
-          <a:schemeClr val="lt1"/>
-        </a:fontRef>
-      </dsp:style>
-      <dsp:txBody>
-        <a:bodyPr spcFirstLastPara="0" vert="horz" wrap="square" lIns="133350" tIns="0" rIns="134476" bIns="0" numCol="1" spcCol="1270" anchor="t" anchorCtr="0">
-          <a:noAutofit/>
-        </a:bodyPr>
-        <a:lstStyle/>
-        <a:p>
-          <a:pPr lvl="0" algn="l" defTabSz="933450">
-            <a:lnSpc>
-              <a:spcPct val="90000"/>
-            </a:lnSpc>
-            <a:spcBef>
-              <a:spcPct val="0"/>
-            </a:spcBef>
-            <a:spcAft>
-              <a:spcPct val="35000"/>
-            </a:spcAft>
-          </a:pPr>
-          <a:r>
-            <a:rPr lang="en-US" sz="2100" kern="1200" dirty="0" smtClean="0"/>
-            <a:t>Design and Implement</a:t>
-          </a:r>
-          <a:endParaRPr lang="en-US" sz="2100" kern="1200" dirty="0"/>
-        </a:p>
-        <a:p>
-          <a:pPr marL="171450" lvl="1" indent="-171450" algn="l" defTabSz="711200">
-            <a:lnSpc>
-              <a:spcPct val="90000"/>
-            </a:lnSpc>
-            <a:spcBef>
-              <a:spcPct val="0"/>
-            </a:spcBef>
-            <a:spcAft>
-              <a:spcPct val="15000"/>
-            </a:spcAft>
-            <a:buChar char="••"/>
-          </a:pPr>
-          <a:r>
-            <a:rPr lang="en-US" sz="1600" kern="1200" dirty="0" smtClean="0"/>
-            <a:t>Set of tools for simplifying cross-device application testing</a:t>
-          </a:r>
-          <a:endParaRPr lang="en-US" sz="1600" kern="1200" dirty="0"/>
-        </a:p>
-        <a:p>
-          <a:pPr marL="171450" lvl="1" indent="-171450" algn="l" defTabSz="711200">
-            <a:lnSpc>
-              <a:spcPct val="90000"/>
-            </a:lnSpc>
-            <a:spcBef>
-              <a:spcPct val="0"/>
-            </a:spcBef>
-            <a:spcAft>
-              <a:spcPct val="15000"/>
-            </a:spcAft>
-            <a:buChar char="••"/>
-          </a:pPr>
-          <a:r>
-            <a:rPr lang="en-US" sz="1600" kern="1200" dirty="0" smtClean="0"/>
-            <a:t>Based on requirements gathered during analysis</a:t>
-          </a:r>
-          <a:endParaRPr lang="en-US" sz="1600" kern="1200" dirty="0"/>
-        </a:p>
-      </dsp:txBody>
-      <dsp:txXfrm rot="5400000">
-        <a:off x="3042903" y="769085"/>
-        <a:ext cx="2829594" cy="2307257"/>
-      </dsp:txXfrm>
-    </dsp:sp>
-    <dsp:sp modelId="{CB3970F5-4B46-4D03-9416-FEB9FF6AB152}">
-      <dsp:nvSpPr>
-        <dsp:cNvPr id="0" name=""/>
-        <dsp:cNvSpPr/>
-      </dsp:nvSpPr>
-      <dsp:spPr>
-        <a:xfrm rot="16200000">
-          <a:off x="5576799" y="507917"/>
-          <a:ext cx="3845429" cy="2829594"/>
-        </a:xfrm>
-        <a:prstGeom prst="flowChartManualOperation">
-          <a:avLst/>
-        </a:prstGeom>
-        <a:noFill/>
-        <a:ln>
-          <a:noFill/>
-        </a:ln>
-        <a:effectLst>
-          <a:outerShdw blurRad="50800" dist="38100" dir="5400000" rotWithShape="0">
-            <a:srgbClr val="000000">
-              <a:alpha val="60000"/>
-            </a:srgbClr>
-          </a:outerShdw>
-        </a:effectLst>
-      </dsp:spPr>
-      <dsp:style>
-        <a:lnRef idx="0">
-          <a:scrgbClr r="0" g="0" b="0"/>
-        </a:lnRef>
-        <a:fillRef idx="3">
-          <a:scrgbClr r="0" g="0" b="0"/>
-        </a:fillRef>
-        <a:effectRef idx="3">
-          <a:scrgbClr r="0" g="0" b="0"/>
-        </a:effectRef>
-        <a:fontRef idx="minor">
-          <a:schemeClr val="lt1"/>
-        </a:fontRef>
-      </dsp:style>
-      <dsp:txBody>
-        <a:bodyPr spcFirstLastPara="0" vert="horz" wrap="square" lIns="133350" tIns="0" rIns="134476" bIns="0" numCol="1" spcCol="1270" anchor="ctr" anchorCtr="0">
-          <a:noAutofit/>
-        </a:bodyPr>
-        <a:lstStyle/>
-        <a:p>
-          <a:pPr lvl="0" algn="ctr" defTabSz="933450">
-            <a:lnSpc>
-              <a:spcPct val="90000"/>
-            </a:lnSpc>
-            <a:spcBef>
-              <a:spcPct val="0"/>
-            </a:spcBef>
-            <a:spcAft>
-              <a:spcPct val="35000"/>
-            </a:spcAft>
-          </a:pPr>
-          <a:endParaRPr lang="en-US" sz="2100" kern="1200" dirty="0"/>
-        </a:p>
-      </dsp:txBody>
-      <dsp:txXfrm rot="5400000">
-        <a:off x="6084717" y="769085"/>
-        <a:ext cx="2829594" cy="2307257"/>
-      </dsp:txXfrm>
-    </dsp:sp>
   </dsp:spTree>
 </dsp:drawing>
 </file>
@@ -7921,421 +7257,6 @@
       <dsp:cNvGrpSpPr/>
     </dsp:nvGrpSpPr>
     <dsp:grpSpPr/>
-    <dsp:sp modelId="{475E8E10-321D-43CB-9FBE-E21B12C6A7FB}">
-      <dsp:nvSpPr>
-        <dsp:cNvPr id="0" name=""/>
-        <dsp:cNvSpPr/>
-      </dsp:nvSpPr>
-      <dsp:spPr>
-        <a:xfrm rot="16200000">
-          <a:off x="-506828" y="507917"/>
-          <a:ext cx="3845429" cy="2829594"/>
-        </a:xfrm>
-        <a:prstGeom prst="flowChartManualOperation">
-          <a:avLst/>
-        </a:prstGeom>
-        <a:gradFill rotWithShape="0">
-          <a:gsLst>
-            <a:gs pos="0">
-              <a:schemeClr val="accent1">
-                <a:shade val="80000"/>
-                <a:hueOff val="0"/>
-                <a:satOff val="0"/>
-                <a:lumOff val="0"/>
-                <a:alphaOff val="0"/>
-                <a:tint val="96000"/>
-                <a:lumMod val="104000"/>
-              </a:schemeClr>
-            </a:gs>
-            <a:gs pos="100000">
-              <a:schemeClr val="accent1">
-                <a:shade val="80000"/>
-                <a:hueOff val="0"/>
-                <a:satOff val="0"/>
-                <a:lumOff val="0"/>
-                <a:alphaOff val="0"/>
-                <a:shade val="98000"/>
-                <a:lumMod val="94000"/>
-              </a:schemeClr>
-            </a:gs>
-          </a:gsLst>
-          <a:lin ang="5400000" scaled="0"/>
-        </a:gradFill>
-        <a:ln>
-          <a:noFill/>
-        </a:ln>
-        <a:effectLst>
-          <a:outerShdw blurRad="50800" dist="38100" dir="5400000" rotWithShape="0">
-            <a:srgbClr val="000000">
-              <a:alpha val="60000"/>
-            </a:srgbClr>
-          </a:outerShdw>
-        </a:effectLst>
-      </dsp:spPr>
-      <dsp:style>
-        <a:lnRef idx="0">
-          <a:scrgbClr r="0" g="0" b="0"/>
-        </a:lnRef>
-        <a:fillRef idx="3">
-          <a:scrgbClr r="0" g="0" b="0"/>
-        </a:fillRef>
-        <a:effectRef idx="3">
-          <a:scrgbClr r="0" g="0" b="0"/>
-        </a:effectRef>
-        <a:fontRef idx="minor">
-          <a:schemeClr val="lt1"/>
-        </a:fontRef>
-      </dsp:style>
-      <dsp:txBody>
-        <a:bodyPr spcFirstLastPara="0" vert="horz" wrap="square" lIns="133350" tIns="0" rIns="134476" bIns="0" numCol="1" spcCol="1270" anchor="t" anchorCtr="0">
-          <a:noAutofit/>
-        </a:bodyPr>
-        <a:lstStyle/>
-        <a:p>
-          <a:pPr lvl="0" algn="l" defTabSz="933450">
-            <a:lnSpc>
-              <a:spcPct val="90000"/>
-            </a:lnSpc>
-            <a:spcBef>
-              <a:spcPct val="0"/>
-            </a:spcBef>
-            <a:spcAft>
-              <a:spcPct val="35000"/>
-            </a:spcAft>
-          </a:pPr>
-          <a:r>
-            <a:rPr lang="en-US" sz="2100" kern="1200" dirty="0" smtClean="0"/>
-            <a:t>Analyze</a:t>
-          </a:r>
-          <a:endParaRPr lang="en-US" sz="2100" kern="1200" dirty="0"/>
-        </a:p>
-        <a:p>
-          <a:pPr marL="171450" lvl="1" indent="-171450" algn="l" defTabSz="711200">
-            <a:lnSpc>
-              <a:spcPct val="90000"/>
-            </a:lnSpc>
-            <a:spcBef>
-              <a:spcPct val="0"/>
-            </a:spcBef>
-            <a:spcAft>
-              <a:spcPct val="15000"/>
-            </a:spcAft>
-            <a:buChar char="••"/>
-          </a:pPr>
-          <a:r>
-            <a:rPr lang="en-US" sz="1600" kern="1200" dirty="0" smtClean="0"/>
-            <a:t>Testing tools for responsive design</a:t>
-          </a:r>
-          <a:endParaRPr lang="en-US" sz="1600" kern="1200" dirty="0"/>
-        </a:p>
-        <a:p>
-          <a:pPr marL="171450" lvl="1" indent="-171450" algn="l" defTabSz="711200">
-            <a:lnSpc>
-              <a:spcPct val="90000"/>
-            </a:lnSpc>
-            <a:spcBef>
-              <a:spcPct val="0"/>
-            </a:spcBef>
-            <a:spcAft>
-              <a:spcPct val="15000"/>
-            </a:spcAft>
-            <a:buChar char="••"/>
-          </a:pPr>
-          <a:r>
-            <a:rPr lang="en-US" sz="1600" kern="1200" dirty="0" smtClean="0"/>
-            <a:t>General web testing tools</a:t>
-          </a:r>
-          <a:endParaRPr lang="en-US" sz="1600" kern="1200" dirty="0"/>
-        </a:p>
-        <a:p>
-          <a:pPr marL="171450" lvl="1" indent="-171450" algn="l" defTabSz="711200">
-            <a:lnSpc>
-              <a:spcPct val="90000"/>
-            </a:lnSpc>
-            <a:spcBef>
-              <a:spcPct val="0"/>
-            </a:spcBef>
-            <a:spcAft>
-              <a:spcPct val="15000"/>
-            </a:spcAft>
-            <a:buChar char="••"/>
-          </a:pPr>
-          <a:r>
-            <a:rPr lang="en-US" sz="1600" kern="1200" dirty="0" smtClean="0"/>
-            <a:t>Find limitations</a:t>
-          </a:r>
-          <a:endParaRPr lang="en-US" sz="1600" kern="1200" dirty="0"/>
-        </a:p>
-        <a:p>
-          <a:pPr marL="171450" lvl="1" indent="-171450" algn="l" defTabSz="711200">
-            <a:lnSpc>
-              <a:spcPct val="90000"/>
-            </a:lnSpc>
-            <a:spcBef>
-              <a:spcPct val="0"/>
-            </a:spcBef>
-            <a:spcAft>
-              <a:spcPct val="15000"/>
-            </a:spcAft>
-            <a:buChar char="••"/>
-          </a:pPr>
-          <a:r>
-            <a:rPr lang="en-US" sz="1600" kern="1200" dirty="0" smtClean="0"/>
-            <a:t>Gather requirements for improvements</a:t>
-          </a:r>
-          <a:endParaRPr lang="en-US" sz="1600" kern="1200" dirty="0"/>
-        </a:p>
-      </dsp:txBody>
-      <dsp:txXfrm rot="5400000">
-        <a:off x="1090" y="769085"/>
-        <a:ext cx="2829594" cy="2307257"/>
-      </dsp:txXfrm>
-    </dsp:sp>
-    <dsp:sp modelId="{4A2757D9-EA3E-4300-9C07-77EBA31E4FE6}">
-      <dsp:nvSpPr>
-        <dsp:cNvPr id="0" name=""/>
-        <dsp:cNvSpPr/>
-      </dsp:nvSpPr>
-      <dsp:spPr>
-        <a:xfrm rot="16200000">
-          <a:off x="2534985" y="507917"/>
-          <a:ext cx="3845429" cy="2829594"/>
-        </a:xfrm>
-        <a:prstGeom prst="flowChartManualOperation">
-          <a:avLst/>
-        </a:prstGeom>
-        <a:gradFill rotWithShape="0">
-          <a:gsLst>
-            <a:gs pos="0">
-              <a:schemeClr val="accent1">
-                <a:shade val="80000"/>
-                <a:hueOff val="164162"/>
-                <a:satOff val="-7062"/>
-                <a:lumOff val="14007"/>
-                <a:alphaOff val="0"/>
-                <a:tint val="96000"/>
-                <a:lumMod val="104000"/>
-              </a:schemeClr>
-            </a:gs>
-            <a:gs pos="100000">
-              <a:schemeClr val="accent1">
-                <a:shade val="80000"/>
-                <a:hueOff val="164162"/>
-                <a:satOff val="-7062"/>
-                <a:lumOff val="14007"/>
-                <a:alphaOff val="0"/>
-                <a:shade val="98000"/>
-                <a:lumMod val="94000"/>
-              </a:schemeClr>
-            </a:gs>
-          </a:gsLst>
-          <a:lin ang="5400000" scaled="0"/>
-        </a:gradFill>
-        <a:ln>
-          <a:noFill/>
-        </a:ln>
-        <a:effectLst>
-          <a:outerShdw blurRad="50800" dist="38100" dir="5400000" rotWithShape="0">
-            <a:srgbClr val="000000">
-              <a:alpha val="60000"/>
-            </a:srgbClr>
-          </a:outerShdw>
-        </a:effectLst>
-      </dsp:spPr>
-      <dsp:style>
-        <a:lnRef idx="0">
-          <a:scrgbClr r="0" g="0" b="0"/>
-        </a:lnRef>
-        <a:fillRef idx="3">
-          <a:scrgbClr r="0" g="0" b="0"/>
-        </a:fillRef>
-        <a:effectRef idx="3">
-          <a:scrgbClr r="0" g="0" b="0"/>
-        </a:effectRef>
-        <a:fontRef idx="minor">
-          <a:schemeClr val="lt1"/>
-        </a:fontRef>
-      </dsp:style>
-      <dsp:txBody>
-        <a:bodyPr spcFirstLastPara="0" vert="horz" wrap="square" lIns="133350" tIns="0" rIns="134476" bIns="0" numCol="1" spcCol="1270" anchor="t" anchorCtr="0">
-          <a:noAutofit/>
-        </a:bodyPr>
-        <a:lstStyle/>
-        <a:p>
-          <a:pPr lvl="0" algn="l" defTabSz="933450">
-            <a:lnSpc>
-              <a:spcPct val="90000"/>
-            </a:lnSpc>
-            <a:spcBef>
-              <a:spcPct val="0"/>
-            </a:spcBef>
-            <a:spcAft>
-              <a:spcPct val="35000"/>
-            </a:spcAft>
-          </a:pPr>
-          <a:r>
-            <a:rPr lang="en-US" sz="2100" kern="1200" dirty="0" smtClean="0"/>
-            <a:t>Design and Implement</a:t>
-          </a:r>
-          <a:endParaRPr lang="en-US" sz="2100" kern="1200" dirty="0"/>
-        </a:p>
-        <a:p>
-          <a:pPr marL="171450" lvl="1" indent="-171450" algn="l" defTabSz="711200">
-            <a:lnSpc>
-              <a:spcPct val="90000"/>
-            </a:lnSpc>
-            <a:spcBef>
-              <a:spcPct val="0"/>
-            </a:spcBef>
-            <a:spcAft>
-              <a:spcPct val="15000"/>
-            </a:spcAft>
-            <a:buChar char="••"/>
-          </a:pPr>
-          <a:r>
-            <a:rPr lang="en-US" sz="1600" kern="1200" dirty="0" smtClean="0"/>
-            <a:t>Set of tools for simplifying cross-device application testing</a:t>
-          </a:r>
-          <a:endParaRPr lang="en-US" sz="1600" kern="1200" dirty="0"/>
-        </a:p>
-        <a:p>
-          <a:pPr marL="171450" lvl="1" indent="-171450" algn="l" defTabSz="711200">
-            <a:lnSpc>
-              <a:spcPct val="90000"/>
-            </a:lnSpc>
-            <a:spcBef>
-              <a:spcPct val="0"/>
-            </a:spcBef>
-            <a:spcAft>
-              <a:spcPct val="15000"/>
-            </a:spcAft>
-            <a:buChar char="••"/>
-          </a:pPr>
-          <a:r>
-            <a:rPr lang="en-US" sz="1600" kern="1200" dirty="0" smtClean="0"/>
-            <a:t>Based on requirements gathered during analysis</a:t>
-          </a:r>
-          <a:endParaRPr lang="en-US" sz="1600" kern="1200" dirty="0"/>
-        </a:p>
-      </dsp:txBody>
-      <dsp:txXfrm rot="5400000">
-        <a:off x="3042903" y="769085"/>
-        <a:ext cx="2829594" cy="2307257"/>
-      </dsp:txXfrm>
-    </dsp:sp>
-    <dsp:sp modelId="{CB3970F5-4B46-4D03-9416-FEB9FF6AB152}">
-      <dsp:nvSpPr>
-        <dsp:cNvPr id="0" name=""/>
-        <dsp:cNvSpPr/>
-      </dsp:nvSpPr>
-      <dsp:spPr>
-        <a:xfrm rot="16200000">
-          <a:off x="5576799" y="507917"/>
-          <a:ext cx="3845429" cy="2829594"/>
-        </a:xfrm>
-        <a:prstGeom prst="flowChartManualOperation">
-          <a:avLst/>
-        </a:prstGeom>
-        <a:gradFill rotWithShape="0">
-          <a:gsLst>
-            <a:gs pos="0">
-              <a:schemeClr val="accent1">
-                <a:shade val="80000"/>
-                <a:hueOff val="328325"/>
-                <a:satOff val="-14124"/>
-                <a:lumOff val="28014"/>
-                <a:alphaOff val="0"/>
-                <a:tint val="96000"/>
-                <a:lumMod val="104000"/>
-              </a:schemeClr>
-            </a:gs>
-            <a:gs pos="100000">
-              <a:schemeClr val="accent1">
-                <a:shade val="80000"/>
-                <a:hueOff val="328325"/>
-                <a:satOff val="-14124"/>
-                <a:lumOff val="28014"/>
-                <a:alphaOff val="0"/>
-                <a:shade val="98000"/>
-                <a:lumMod val="94000"/>
-              </a:schemeClr>
-            </a:gs>
-          </a:gsLst>
-          <a:lin ang="5400000" scaled="0"/>
-        </a:gradFill>
-        <a:ln>
-          <a:noFill/>
-        </a:ln>
-        <a:effectLst>
-          <a:outerShdw blurRad="50800" dist="38100" dir="5400000" rotWithShape="0">
-            <a:srgbClr val="000000">
-              <a:alpha val="60000"/>
-            </a:srgbClr>
-          </a:outerShdw>
-        </a:effectLst>
-      </dsp:spPr>
-      <dsp:style>
-        <a:lnRef idx="0">
-          <a:scrgbClr r="0" g="0" b="0"/>
-        </a:lnRef>
-        <a:fillRef idx="3">
-          <a:scrgbClr r="0" g="0" b="0"/>
-        </a:fillRef>
-        <a:effectRef idx="3">
-          <a:scrgbClr r="0" g="0" b="0"/>
-        </a:effectRef>
-        <a:fontRef idx="minor">
-          <a:schemeClr val="lt1"/>
-        </a:fontRef>
-      </dsp:style>
-      <dsp:txBody>
-        <a:bodyPr spcFirstLastPara="0" vert="horz" wrap="square" lIns="133350" tIns="0" rIns="134476" bIns="0" numCol="1" spcCol="1270" anchor="t" anchorCtr="0">
-          <a:noAutofit/>
-        </a:bodyPr>
-        <a:lstStyle/>
-        <a:p>
-          <a:pPr lvl="0" algn="l" defTabSz="933450">
-            <a:lnSpc>
-              <a:spcPct val="90000"/>
-            </a:lnSpc>
-            <a:spcBef>
-              <a:spcPct val="0"/>
-            </a:spcBef>
-            <a:spcAft>
-              <a:spcPct val="35000"/>
-            </a:spcAft>
-          </a:pPr>
-          <a:r>
-            <a:rPr lang="en-US" sz="2100" kern="1200" dirty="0" smtClean="0"/>
-            <a:t>User Study</a:t>
-          </a:r>
-          <a:endParaRPr lang="en-US" sz="2100" kern="1200" dirty="0"/>
-        </a:p>
-        <a:p>
-          <a:pPr marL="171450" lvl="1" indent="-171450" algn="l" defTabSz="711200">
-            <a:lnSpc>
-              <a:spcPct val="90000"/>
-            </a:lnSpc>
-            <a:spcBef>
-              <a:spcPct val="0"/>
-            </a:spcBef>
-            <a:spcAft>
-              <a:spcPct val="15000"/>
-            </a:spcAft>
-            <a:buChar char="••"/>
-          </a:pPr>
-          <a:r>
-            <a:rPr lang="en-US" sz="1600" kern="1200" dirty="0" smtClean="0"/>
-            <a:t>Test the suitability and quality of the tools</a:t>
-          </a:r>
-          <a:endParaRPr lang="en-US" sz="1600" kern="1200" dirty="0"/>
-        </a:p>
-      </dsp:txBody>
-      <dsp:txXfrm rot="5400000">
-        <a:off x="6084717" y="769085"/>
-        <a:ext cx="2829594" cy="2307257"/>
-      </dsp:txXfrm>
-    </dsp:sp>
   </dsp:spTree>
 </dsp:drawing>
 </file>
@@ -8348,698 +7269,6 @@
       <dsp:cNvGrpSpPr/>
     </dsp:nvGrpSpPr>
     <dsp:grpSpPr/>
-    <dsp:sp modelId="{9A525D47-14B2-4F0B-85D8-FD3EB0402421}">
-      <dsp:nvSpPr>
-        <dsp:cNvPr id="0" name=""/>
-        <dsp:cNvSpPr/>
-      </dsp:nvSpPr>
-      <dsp:spPr>
-        <a:xfrm rot="5400000">
-          <a:off x="360000" y="1077124"/>
-          <a:ext cx="945949" cy="1076930"/>
-        </a:xfrm>
-        <a:prstGeom prst="bentUpArrow">
-          <a:avLst>
-            <a:gd name="adj1" fmla="val 32840"/>
-            <a:gd name="adj2" fmla="val 25000"/>
-            <a:gd name="adj3" fmla="val 35780"/>
-          </a:avLst>
-        </a:prstGeom>
-        <a:solidFill>
-          <a:schemeClr val="accent1">
-            <a:tint val="50000"/>
-            <a:hueOff val="0"/>
-            <a:satOff val="0"/>
-            <a:lumOff val="0"/>
-            <a:alphaOff val="0"/>
-          </a:schemeClr>
-        </a:solidFill>
-        <a:ln w="15875" cap="rnd" cmpd="sng" algn="ctr">
-          <a:solidFill>
-            <a:schemeClr val="lt1">
-              <a:hueOff val="0"/>
-              <a:satOff val="0"/>
-              <a:lumOff val="0"/>
-              <a:alphaOff val="0"/>
-            </a:schemeClr>
-          </a:solidFill>
-          <a:prstDash val="solid"/>
-        </a:ln>
-        <a:effectLst/>
-      </dsp:spPr>
-      <dsp:style>
-        <a:lnRef idx="2">
-          <a:scrgbClr r="0" g="0" b="0"/>
-        </a:lnRef>
-        <a:fillRef idx="1">
-          <a:scrgbClr r="0" g="0" b="0"/>
-        </a:fillRef>
-        <a:effectRef idx="0">
-          <a:scrgbClr r="0" g="0" b="0"/>
-        </a:effectRef>
-        <a:fontRef idx="minor"/>
-      </dsp:style>
-    </dsp:sp>
-    <dsp:sp modelId="{2BE033E5-5E65-4ABF-9D27-5FFF8CF71BCD}">
-      <dsp:nvSpPr>
-        <dsp:cNvPr id="0" name=""/>
-        <dsp:cNvSpPr/>
-      </dsp:nvSpPr>
-      <dsp:spPr>
-        <a:xfrm>
-          <a:off x="7" y="28520"/>
-          <a:ext cx="1592422" cy="1114644"/>
-        </a:xfrm>
-        <a:prstGeom prst="roundRect">
-          <a:avLst>
-            <a:gd name="adj" fmla="val 16670"/>
-          </a:avLst>
-        </a:prstGeom>
-        <a:solidFill>
-          <a:schemeClr val="accent1">
-            <a:hueOff val="0"/>
-            <a:satOff val="0"/>
-            <a:lumOff val="0"/>
-            <a:alphaOff val="0"/>
-          </a:schemeClr>
-        </a:solidFill>
-        <a:ln w="15875" cap="rnd" cmpd="sng" algn="ctr">
-          <a:solidFill>
-            <a:schemeClr val="lt1">
-              <a:hueOff val="0"/>
-              <a:satOff val="0"/>
-              <a:lumOff val="0"/>
-              <a:alphaOff val="0"/>
-            </a:schemeClr>
-          </a:solidFill>
-          <a:prstDash val="solid"/>
-        </a:ln>
-        <a:effectLst/>
-      </dsp:spPr>
-      <dsp:style>
-        <a:lnRef idx="2">
-          <a:scrgbClr r="0" g="0" b="0"/>
-        </a:lnRef>
-        <a:fillRef idx="1">
-          <a:scrgbClr r="0" g="0" b="0"/>
-        </a:fillRef>
-        <a:effectRef idx="0">
-          <a:scrgbClr r="0" g="0" b="0"/>
-        </a:effectRef>
-        <a:fontRef idx="minor">
-          <a:schemeClr val="lt1"/>
-        </a:fontRef>
-      </dsp:style>
-      <dsp:txBody>
-        <a:bodyPr spcFirstLastPara="0" vert="horz" wrap="square" lIns="80010" tIns="80010" rIns="80010" bIns="80010" numCol="1" spcCol="1270" anchor="ctr" anchorCtr="0">
-          <a:noAutofit/>
-        </a:bodyPr>
-        <a:lstStyle/>
-        <a:p>
-          <a:pPr lvl="0" algn="ctr" defTabSz="933450">
-            <a:lnSpc>
-              <a:spcPct val="90000"/>
-            </a:lnSpc>
-            <a:spcBef>
-              <a:spcPct val="0"/>
-            </a:spcBef>
-            <a:spcAft>
-              <a:spcPct val="35000"/>
-            </a:spcAft>
-          </a:pPr>
-          <a:r>
-            <a:rPr lang="en-US" sz="2100" kern="1200" dirty="0" smtClean="0"/>
-            <a:t>Record sequence</a:t>
-          </a:r>
-          <a:endParaRPr lang="de-CH" sz="2100" kern="1200" dirty="0"/>
-        </a:p>
-      </dsp:txBody>
-      <dsp:txXfrm>
-        <a:off x="54429" y="82942"/>
-        <a:ext cx="1483578" cy="1005800"/>
-      </dsp:txXfrm>
-    </dsp:sp>
-    <dsp:sp modelId="{D4EFC377-AFF7-4383-8611-A4AC615569BE}">
-      <dsp:nvSpPr>
-        <dsp:cNvPr id="0" name=""/>
-        <dsp:cNvSpPr/>
-      </dsp:nvSpPr>
-      <dsp:spPr>
-        <a:xfrm>
-          <a:off x="1583995" y="140782"/>
-          <a:ext cx="2762331" cy="900904"/>
-        </a:xfrm>
-        <a:prstGeom prst="rect">
-          <a:avLst/>
-        </a:prstGeom>
-        <a:noFill/>
-        <a:ln>
-          <a:noFill/>
-        </a:ln>
-        <a:effectLst/>
-      </dsp:spPr>
-      <dsp:style>
-        <a:lnRef idx="0">
-          <a:scrgbClr r="0" g="0" b="0"/>
-        </a:lnRef>
-        <a:fillRef idx="0">
-          <a:scrgbClr r="0" g="0" b="0"/>
-        </a:fillRef>
-        <a:effectRef idx="0">
-          <a:scrgbClr r="0" g="0" b="0"/>
-        </a:effectRef>
-        <a:fontRef idx="minor"/>
-      </dsp:style>
-      <dsp:txBody>
-        <a:bodyPr spcFirstLastPara="0" vert="horz" wrap="square" lIns="68580" tIns="68580" rIns="68580" bIns="68580" numCol="1" spcCol="1270" anchor="ctr" anchorCtr="0">
-          <a:noAutofit/>
-        </a:bodyPr>
-        <a:lstStyle/>
-        <a:p>
-          <a:pPr marL="171450" lvl="1" indent="-171450" algn="l" defTabSz="800100">
-            <a:lnSpc>
-              <a:spcPct val="90000"/>
-            </a:lnSpc>
-            <a:spcBef>
-              <a:spcPct val="0"/>
-            </a:spcBef>
-            <a:spcAft>
-              <a:spcPct val="15000"/>
-            </a:spcAft>
-            <a:buChar char="••"/>
-          </a:pPr>
-          <a:r>
-            <a:rPr lang="en-US" sz="1800" kern="1200" dirty="0" smtClean="0"/>
-            <a:t>On emulated device</a:t>
-          </a:r>
-          <a:endParaRPr lang="de-CH" sz="1800" kern="1200" dirty="0"/>
-        </a:p>
-      </dsp:txBody>
-      <dsp:txXfrm>
-        <a:off x="1583995" y="140782"/>
-        <a:ext cx="2762331" cy="900904"/>
-      </dsp:txXfrm>
-    </dsp:sp>
-    <dsp:sp modelId="{6FB92FAA-8355-4FEC-9356-67979D72B354}">
-      <dsp:nvSpPr>
-        <dsp:cNvPr id="0" name=""/>
-        <dsp:cNvSpPr/>
-      </dsp:nvSpPr>
-      <dsp:spPr>
-        <a:xfrm rot="5400000">
-          <a:off x="2160003" y="2329238"/>
-          <a:ext cx="945949" cy="1076930"/>
-        </a:xfrm>
-        <a:prstGeom prst="bentUpArrow">
-          <a:avLst>
-            <a:gd name="adj1" fmla="val 32840"/>
-            <a:gd name="adj2" fmla="val 25000"/>
-            <a:gd name="adj3" fmla="val 35780"/>
-          </a:avLst>
-        </a:prstGeom>
-        <a:noFill/>
-        <a:ln w="15875" cap="rnd" cmpd="sng" algn="ctr">
-          <a:noFill/>
-          <a:prstDash val="solid"/>
-        </a:ln>
-        <a:effectLst/>
-      </dsp:spPr>
-      <dsp:style>
-        <a:lnRef idx="2">
-          <a:scrgbClr r="0" g="0" b="0"/>
-        </a:lnRef>
-        <a:fillRef idx="1">
-          <a:scrgbClr r="0" g="0" b="0"/>
-        </a:fillRef>
-        <a:effectRef idx="0">
-          <a:scrgbClr r="0" g="0" b="0"/>
-        </a:effectRef>
-        <a:fontRef idx="minor"/>
-      </dsp:style>
-    </dsp:sp>
-    <dsp:sp modelId="{CCCE12E7-E5B8-4F58-8431-0C12B0F81C58}">
-      <dsp:nvSpPr>
-        <dsp:cNvPr id="0" name=""/>
-        <dsp:cNvSpPr/>
-      </dsp:nvSpPr>
-      <dsp:spPr>
-        <a:xfrm>
-          <a:off x="1799996" y="1280633"/>
-          <a:ext cx="1592422" cy="1114644"/>
-        </a:xfrm>
-        <a:prstGeom prst="roundRect">
-          <a:avLst>
-            <a:gd name="adj" fmla="val 16670"/>
-          </a:avLst>
-        </a:prstGeom>
-        <a:noFill/>
-        <a:ln w="15875" cap="rnd" cmpd="sng" algn="ctr">
-          <a:noFill/>
-          <a:prstDash val="solid"/>
-        </a:ln>
-        <a:effectLst/>
-      </dsp:spPr>
-      <dsp:style>
-        <a:lnRef idx="2">
-          <a:scrgbClr r="0" g="0" b="0"/>
-        </a:lnRef>
-        <a:fillRef idx="1">
-          <a:scrgbClr r="0" g="0" b="0"/>
-        </a:fillRef>
-        <a:effectRef idx="0">
-          <a:scrgbClr r="0" g="0" b="0"/>
-        </a:effectRef>
-        <a:fontRef idx="minor">
-          <a:schemeClr val="lt1"/>
-        </a:fontRef>
-      </dsp:style>
-      <dsp:txBody>
-        <a:bodyPr spcFirstLastPara="0" vert="horz" wrap="square" lIns="80010" tIns="80010" rIns="80010" bIns="80010" numCol="1" spcCol="1270" anchor="ctr" anchorCtr="0">
-          <a:noAutofit/>
-        </a:bodyPr>
-        <a:lstStyle/>
-        <a:p>
-          <a:pPr lvl="0" algn="ctr" defTabSz="933450">
-            <a:lnSpc>
-              <a:spcPct val="90000"/>
-            </a:lnSpc>
-            <a:spcBef>
-              <a:spcPct val="0"/>
-            </a:spcBef>
-            <a:spcAft>
-              <a:spcPct val="35000"/>
-            </a:spcAft>
-          </a:pPr>
-          <a:r>
-            <a:rPr lang="en-US" sz="2100" kern="1200" dirty="0" smtClean="0"/>
-            <a:t> </a:t>
-          </a:r>
-          <a:endParaRPr lang="de-CH" sz="2100" kern="1200" dirty="0"/>
-        </a:p>
-      </dsp:txBody>
-      <dsp:txXfrm>
-        <a:off x="1854418" y="1335055"/>
-        <a:ext cx="1483578" cy="1005800"/>
-      </dsp:txXfrm>
-    </dsp:sp>
-    <dsp:sp modelId="{C60AB0D8-72C7-45B2-B090-B32ABD564FCD}">
-      <dsp:nvSpPr>
-        <dsp:cNvPr id="0" name=""/>
-        <dsp:cNvSpPr/>
-      </dsp:nvSpPr>
-      <dsp:spPr>
-        <a:xfrm>
-          <a:off x="3384002" y="1398940"/>
-          <a:ext cx="4672500" cy="900904"/>
-        </a:xfrm>
-        <a:prstGeom prst="rect">
-          <a:avLst/>
-        </a:prstGeom>
-        <a:noFill/>
-        <a:ln>
-          <a:noFill/>
-        </a:ln>
-        <a:effectLst/>
-      </dsp:spPr>
-      <dsp:style>
-        <a:lnRef idx="0">
-          <a:scrgbClr r="0" g="0" b="0"/>
-        </a:lnRef>
-        <a:fillRef idx="0">
-          <a:scrgbClr r="0" g="0" b="0"/>
-        </a:fillRef>
-        <a:effectRef idx="0">
-          <a:scrgbClr r="0" g="0" b="0"/>
-        </a:effectRef>
-        <a:fontRef idx="minor"/>
-      </dsp:style>
-      <dsp:txBody>
-        <a:bodyPr spcFirstLastPara="0" vert="horz" wrap="square" lIns="68580" tIns="68580" rIns="68580" bIns="68580" numCol="1" spcCol="1270" anchor="ctr" anchorCtr="0">
-          <a:noAutofit/>
-        </a:bodyPr>
-        <a:lstStyle/>
-        <a:p>
-          <a:pPr marL="171450" lvl="1" indent="-171450" algn="l" defTabSz="800100">
-            <a:lnSpc>
-              <a:spcPct val="90000"/>
-            </a:lnSpc>
-            <a:spcBef>
-              <a:spcPct val="0"/>
-            </a:spcBef>
-            <a:spcAft>
-              <a:spcPct val="15000"/>
-            </a:spcAft>
-            <a:buChar char="••"/>
-          </a:pPr>
-          <a:endParaRPr lang="de-CH" sz="1800" kern="1200" dirty="0"/>
-        </a:p>
-        <a:p>
-          <a:pPr marL="171450" lvl="1" indent="-171450" algn="l" defTabSz="800100">
-            <a:lnSpc>
-              <a:spcPct val="90000"/>
-            </a:lnSpc>
-            <a:spcBef>
-              <a:spcPct val="0"/>
-            </a:spcBef>
-            <a:spcAft>
-              <a:spcPct val="15000"/>
-            </a:spcAft>
-            <a:buChar char="••"/>
-          </a:pPr>
-          <a:endParaRPr lang="de-CH" sz="1800" kern="1200" dirty="0"/>
-        </a:p>
-        <a:p>
-          <a:pPr marL="171450" lvl="1" indent="-171450" algn="l" defTabSz="800100">
-            <a:lnSpc>
-              <a:spcPct val="90000"/>
-            </a:lnSpc>
-            <a:spcBef>
-              <a:spcPct val="0"/>
-            </a:spcBef>
-            <a:spcAft>
-              <a:spcPct val="15000"/>
-            </a:spcAft>
-            <a:buChar char="••"/>
-          </a:pPr>
-          <a:endParaRPr lang="de-CH" sz="1800" kern="1200" dirty="0"/>
-        </a:p>
-      </dsp:txBody>
-      <dsp:txXfrm>
-        <a:off x="3384002" y="1398940"/>
-        <a:ext cx="4672500" cy="900904"/>
-      </dsp:txXfrm>
-    </dsp:sp>
-    <dsp:sp modelId="{F3F94BDD-D93C-4EB6-8AFF-FDEC6505EA29}">
-      <dsp:nvSpPr>
-        <dsp:cNvPr id="0" name=""/>
-        <dsp:cNvSpPr/>
-      </dsp:nvSpPr>
-      <dsp:spPr>
-        <a:xfrm rot="5400000">
-          <a:off x="3960002" y="3581351"/>
-          <a:ext cx="945949" cy="1076930"/>
-        </a:xfrm>
-        <a:prstGeom prst="bentUpArrow">
-          <a:avLst>
-            <a:gd name="adj1" fmla="val 32840"/>
-            <a:gd name="adj2" fmla="val 25000"/>
-            <a:gd name="adj3" fmla="val 35780"/>
-          </a:avLst>
-        </a:prstGeom>
-        <a:noFill/>
-        <a:ln w="15875" cap="rnd" cmpd="sng" algn="ctr">
-          <a:noFill/>
-          <a:prstDash val="solid"/>
-        </a:ln>
-        <a:effectLst/>
-      </dsp:spPr>
-      <dsp:style>
-        <a:lnRef idx="2">
-          <a:scrgbClr r="0" g="0" b="0"/>
-        </a:lnRef>
-        <a:fillRef idx="1">
-          <a:scrgbClr r="0" g="0" b="0"/>
-        </a:fillRef>
-        <a:effectRef idx="0">
-          <a:scrgbClr r="0" g="0" b="0"/>
-        </a:effectRef>
-        <a:fontRef idx="minor"/>
-      </dsp:style>
-    </dsp:sp>
-    <dsp:sp modelId="{7C9C6413-B337-4A66-8542-181936D08323}">
-      <dsp:nvSpPr>
-        <dsp:cNvPr id="0" name=""/>
-        <dsp:cNvSpPr/>
-      </dsp:nvSpPr>
-      <dsp:spPr>
-        <a:xfrm>
-          <a:off x="3599995" y="2534396"/>
-          <a:ext cx="1592422" cy="1114644"/>
-        </a:xfrm>
-        <a:prstGeom prst="roundRect">
-          <a:avLst>
-            <a:gd name="adj" fmla="val 16670"/>
-          </a:avLst>
-        </a:prstGeom>
-        <a:noFill/>
-        <a:ln w="15875" cap="rnd" cmpd="sng" algn="ctr">
-          <a:noFill/>
-          <a:prstDash val="solid"/>
-        </a:ln>
-        <a:effectLst/>
-      </dsp:spPr>
-      <dsp:style>
-        <a:lnRef idx="2">
-          <a:scrgbClr r="0" g="0" b="0"/>
-        </a:lnRef>
-        <a:fillRef idx="1">
-          <a:scrgbClr r="0" g="0" b="0"/>
-        </a:fillRef>
-        <a:effectRef idx="0">
-          <a:scrgbClr r="0" g="0" b="0"/>
-        </a:effectRef>
-        <a:fontRef idx="minor">
-          <a:schemeClr val="lt1"/>
-        </a:fontRef>
-      </dsp:style>
-      <dsp:txBody>
-        <a:bodyPr spcFirstLastPara="0" vert="horz" wrap="square" lIns="80010" tIns="80010" rIns="80010" bIns="80010" numCol="1" spcCol="1270" anchor="ctr" anchorCtr="0">
-          <a:noAutofit/>
-        </a:bodyPr>
-        <a:lstStyle/>
-        <a:p>
-          <a:pPr lvl="0" algn="ctr" defTabSz="933450">
-            <a:lnSpc>
-              <a:spcPct val="90000"/>
-            </a:lnSpc>
-            <a:spcBef>
-              <a:spcPct val="0"/>
-            </a:spcBef>
-            <a:spcAft>
-              <a:spcPct val="35000"/>
-            </a:spcAft>
-          </a:pPr>
-          <a:r>
-            <a:rPr lang="en-US" sz="2100" kern="1200" dirty="0" smtClean="0"/>
-            <a:t> </a:t>
-          </a:r>
-          <a:endParaRPr lang="de-CH" sz="2100" kern="1200" dirty="0"/>
-        </a:p>
-      </dsp:txBody>
-      <dsp:txXfrm>
-        <a:off x="3654417" y="2588818"/>
-        <a:ext cx="1483578" cy="1005800"/>
-      </dsp:txXfrm>
-    </dsp:sp>
-    <dsp:sp modelId="{00C2D28C-794C-46F8-B203-EACC2F42DFC0}">
-      <dsp:nvSpPr>
-        <dsp:cNvPr id="0" name=""/>
-        <dsp:cNvSpPr/>
-      </dsp:nvSpPr>
-      <dsp:spPr>
-        <a:xfrm>
-          <a:off x="5183996" y="2692423"/>
-          <a:ext cx="3377416" cy="900904"/>
-        </a:xfrm>
-        <a:prstGeom prst="rect">
-          <a:avLst/>
-        </a:prstGeom>
-        <a:noFill/>
-        <a:ln>
-          <a:noFill/>
-        </a:ln>
-        <a:effectLst/>
-      </dsp:spPr>
-      <dsp:style>
-        <a:lnRef idx="0">
-          <a:scrgbClr r="0" g="0" b="0"/>
-        </a:lnRef>
-        <a:fillRef idx="0">
-          <a:scrgbClr r="0" g="0" b="0"/>
-        </a:fillRef>
-        <a:effectRef idx="0">
-          <a:scrgbClr r="0" g="0" b="0"/>
-        </a:effectRef>
-        <a:fontRef idx="minor"/>
-      </dsp:style>
-      <dsp:txBody>
-        <a:bodyPr spcFirstLastPara="0" vert="horz" wrap="square" lIns="68580" tIns="68580" rIns="68580" bIns="68580" numCol="1" spcCol="1270" anchor="ctr" anchorCtr="0">
-          <a:noAutofit/>
-        </a:bodyPr>
-        <a:lstStyle/>
-        <a:p>
-          <a:pPr marL="171450" lvl="1" indent="-171450" algn="l" defTabSz="800100">
-            <a:lnSpc>
-              <a:spcPct val="90000"/>
-            </a:lnSpc>
-            <a:spcBef>
-              <a:spcPct val="0"/>
-            </a:spcBef>
-            <a:spcAft>
-              <a:spcPct val="15000"/>
-            </a:spcAft>
-            <a:buChar char="••"/>
-          </a:pPr>
-          <a:endParaRPr lang="de-CH" sz="1800" kern="1200" dirty="0"/>
-        </a:p>
-        <a:p>
-          <a:pPr marL="171450" lvl="1" indent="-171450" algn="l" defTabSz="800100">
-            <a:lnSpc>
-              <a:spcPct val="90000"/>
-            </a:lnSpc>
-            <a:spcBef>
-              <a:spcPct val="0"/>
-            </a:spcBef>
-            <a:spcAft>
-              <a:spcPct val="15000"/>
-            </a:spcAft>
-            <a:buChar char="••"/>
-          </a:pPr>
-          <a:endParaRPr lang="de-CH" sz="1800" kern="1200" dirty="0"/>
-        </a:p>
-        <a:p>
-          <a:pPr marL="171450" lvl="1" indent="-171450" algn="l" defTabSz="800100">
-            <a:lnSpc>
-              <a:spcPct val="90000"/>
-            </a:lnSpc>
-            <a:spcBef>
-              <a:spcPct val="0"/>
-            </a:spcBef>
-            <a:spcAft>
-              <a:spcPct val="15000"/>
-            </a:spcAft>
-            <a:buChar char="••"/>
-          </a:pPr>
-          <a:endParaRPr lang="de-CH" sz="1800" kern="1200" dirty="0"/>
-        </a:p>
-      </dsp:txBody>
-      <dsp:txXfrm>
-        <a:off x="5183996" y="2692423"/>
-        <a:ext cx="3377416" cy="900904"/>
-      </dsp:txXfrm>
-    </dsp:sp>
-    <dsp:sp modelId="{C2AE311F-8BBD-4734-9B78-465F3C6AAF7A}">
-      <dsp:nvSpPr>
-        <dsp:cNvPr id="0" name=""/>
-        <dsp:cNvSpPr/>
-      </dsp:nvSpPr>
-      <dsp:spPr>
-        <a:xfrm>
-          <a:off x="5399997" y="3784860"/>
-          <a:ext cx="1592422" cy="1114644"/>
-        </a:xfrm>
-        <a:prstGeom prst="roundRect">
-          <a:avLst>
-            <a:gd name="adj" fmla="val 16670"/>
-          </a:avLst>
-        </a:prstGeom>
-        <a:noFill/>
-        <a:ln w="15875" cap="rnd" cmpd="sng" algn="ctr">
-          <a:noFill/>
-          <a:prstDash val="solid"/>
-        </a:ln>
-        <a:effectLst/>
-      </dsp:spPr>
-      <dsp:style>
-        <a:lnRef idx="2">
-          <a:scrgbClr r="0" g="0" b="0"/>
-        </a:lnRef>
-        <a:fillRef idx="1">
-          <a:scrgbClr r="0" g="0" b="0"/>
-        </a:fillRef>
-        <a:effectRef idx="0">
-          <a:scrgbClr r="0" g="0" b="0"/>
-        </a:effectRef>
-        <a:fontRef idx="minor">
-          <a:schemeClr val="lt1"/>
-        </a:fontRef>
-      </dsp:style>
-      <dsp:txBody>
-        <a:bodyPr spcFirstLastPara="0" vert="horz" wrap="square" lIns="80010" tIns="80010" rIns="80010" bIns="80010" numCol="1" spcCol="1270" anchor="ctr" anchorCtr="0">
-          <a:noAutofit/>
-        </a:bodyPr>
-        <a:lstStyle/>
-        <a:p>
-          <a:pPr lvl="0" algn="ctr" defTabSz="933450">
-            <a:lnSpc>
-              <a:spcPct val="90000"/>
-            </a:lnSpc>
-            <a:spcBef>
-              <a:spcPct val="0"/>
-            </a:spcBef>
-            <a:spcAft>
-              <a:spcPct val="35000"/>
-            </a:spcAft>
-          </a:pPr>
-          <a:r>
-            <a:rPr lang="en-US" sz="2100" kern="1200" dirty="0" smtClean="0"/>
-            <a:t> </a:t>
-          </a:r>
-          <a:endParaRPr lang="de-CH" sz="2100" kern="1200" dirty="0"/>
-        </a:p>
-      </dsp:txBody>
-      <dsp:txXfrm>
-        <a:off x="5454419" y="3839282"/>
-        <a:ext cx="1483578" cy="1005800"/>
-      </dsp:txXfrm>
-    </dsp:sp>
-    <dsp:sp modelId="{C6E774FE-2729-439D-889B-C5312A503348}">
-      <dsp:nvSpPr>
-        <dsp:cNvPr id="0" name=""/>
-        <dsp:cNvSpPr/>
-      </dsp:nvSpPr>
-      <dsp:spPr>
-        <a:xfrm>
-          <a:off x="6983996" y="3891166"/>
-          <a:ext cx="1984940" cy="900904"/>
-        </a:xfrm>
-        <a:prstGeom prst="rect">
-          <a:avLst/>
-        </a:prstGeom>
-        <a:noFill/>
-        <a:ln>
-          <a:noFill/>
-        </a:ln>
-        <a:effectLst/>
-      </dsp:spPr>
-      <dsp:style>
-        <a:lnRef idx="0">
-          <a:scrgbClr r="0" g="0" b="0"/>
-        </a:lnRef>
-        <a:fillRef idx="0">
-          <a:scrgbClr r="0" g="0" b="0"/>
-        </a:fillRef>
-        <a:effectRef idx="0">
-          <a:scrgbClr r="0" g="0" b="0"/>
-        </a:effectRef>
-        <a:fontRef idx="minor"/>
-      </dsp:style>
-      <dsp:txBody>
-        <a:bodyPr spcFirstLastPara="0" vert="horz" wrap="square" lIns="68580" tIns="68580" rIns="68580" bIns="68580" numCol="1" spcCol="1270" anchor="ctr" anchorCtr="0">
-          <a:noAutofit/>
-        </a:bodyPr>
-        <a:lstStyle/>
-        <a:p>
-          <a:pPr marL="171450" lvl="1" indent="-171450" algn="l" defTabSz="800100">
-            <a:lnSpc>
-              <a:spcPct val="90000"/>
-            </a:lnSpc>
-            <a:spcBef>
-              <a:spcPct val="0"/>
-            </a:spcBef>
-            <a:spcAft>
-              <a:spcPct val="15000"/>
-            </a:spcAft>
-            <a:buChar char="••"/>
-          </a:pPr>
-          <a:endParaRPr lang="de-CH" sz="1800" kern="1200" dirty="0"/>
-        </a:p>
-      </dsp:txBody>
-      <dsp:txXfrm>
-        <a:off x="6983996" y="3891166"/>
-        <a:ext cx="1984940" cy="900904"/>
-      </dsp:txXfrm>
-    </dsp:sp>
   </dsp:spTree>
 </dsp:drawing>
 </file>
@@ -9052,798 +7281,6 @@
       <dsp:cNvGrpSpPr/>
     </dsp:nvGrpSpPr>
     <dsp:grpSpPr/>
-    <dsp:sp modelId="{9A525D47-14B2-4F0B-85D8-FD3EB0402421}">
-      <dsp:nvSpPr>
-        <dsp:cNvPr id="0" name=""/>
-        <dsp:cNvSpPr/>
-      </dsp:nvSpPr>
-      <dsp:spPr>
-        <a:xfrm rot="5400000">
-          <a:off x="360000" y="1077124"/>
-          <a:ext cx="945949" cy="1076930"/>
-        </a:xfrm>
-        <a:prstGeom prst="bentUpArrow">
-          <a:avLst>
-            <a:gd name="adj1" fmla="val 32840"/>
-            <a:gd name="adj2" fmla="val 25000"/>
-            <a:gd name="adj3" fmla="val 35780"/>
-          </a:avLst>
-        </a:prstGeom>
-        <a:solidFill>
-          <a:schemeClr val="accent1">
-            <a:tint val="50000"/>
-            <a:hueOff val="0"/>
-            <a:satOff val="0"/>
-            <a:lumOff val="0"/>
-            <a:alphaOff val="0"/>
-          </a:schemeClr>
-        </a:solidFill>
-        <a:ln w="15875" cap="rnd" cmpd="sng" algn="ctr">
-          <a:solidFill>
-            <a:schemeClr val="lt1">
-              <a:hueOff val="0"/>
-              <a:satOff val="0"/>
-              <a:lumOff val="0"/>
-              <a:alphaOff val="0"/>
-            </a:schemeClr>
-          </a:solidFill>
-          <a:prstDash val="solid"/>
-        </a:ln>
-        <a:effectLst/>
-      </dsp:spPr>
-      <dsp:style>
-        <a:lnRef idx="2">
-          <a:scrgbClr r="0" g="0" b="0"/>
-        </a:lnRef>
-        <a:fillRef idx="1">
-          <a:scrgbClr r="0" g="0" b="0"/>
-        </a:fillRef>
-        <a:effectRef idx="0">
-          <a:scrgbClr r="0" g="0" b="0"/>
-        </a:effectRef>
-        <a:fontRef idx="minor"/>
-      </dsp:style>
-    </dsp:sp>
-    <dsp:sp modelId="{2BE033E5-5E65-4ABF-9D27-5FFF8CF71BCD}">
-      <dsp:nvSpPr>
-        <dsp:cNvPr id="0" name=""/>
-        <dsp:cNvSpPr/>
-      </dsp:nvSpPr>
-      <dsp:spPr>
-        <a:xfrm>
-          <a:off x="7" y="28520"/>
-          <a:ext cx="1592422" cy="1114644"/>
-        </a:xfrm>
-        <a:prstGeom prst="roundRect">
-          <a:avLst>
-            <a:gd name="adj" fmla="val 16670"/>
-          </a:avLst>
-        </a:prstGeom>
-        <a:solidFill>
-          <a:schemeClr val="accent1">
-            <a:hueOff val="0"/>
-            <a:satOff val="0"/>
-            <a:lumOff val="0"/>
-            <a:alphaOff val="0"/>
-          </a:schemeClr>
-        </a:solidFill>
-        <a:ln w="15875" cap="rnd" cmpd="sng" algn="ctr">
-          <a:solidFill>
-            <a:schemeClr val="lt1">
-              <a:hueOff val="0"/>
-              <a:satOff val="0"/>
-              <a:lumOff val="0"/>
-              <a:alphaOff val="0"/>
-            </a:schemeClr>
-          </a:solidFill>
-          <a:prstDash val="solid"/>
-        </a:ln>
-        <a:effectLst/>
-      </dsp:spPr>
-      <dsp:style>
-        <a:lnRef idx="2">
-          <a:scrgbClr r="0" g="0" b="0"/>
-        </a:lnRef>
-        <a:fillRef idx="1">
-          <a:scrgbClr r="0" g="0" b="0"/>
-        </a:fillRef>
-        <a:effectRef idx="0">
-          <a:scrgbClr r="0" g="0" b="0"/>
-        </a:effectRef>
-        <a:fontRef idx="minor">
-          <a:schemeClr val="lt1"/>
-        </a:fontRef>
-      </dsp:style>
-      <dsp:txBody>
-        <a:bodyPr spcFirstLastPara="0" vert="horz" wrap="square" lIns="80010" tIns="80010" rIns="80010" bIns="80010" numCol="1" spcCol="1270" anchor="ctr" anchorCtr="0">
-          <a:noAutofit/>
-        </a:bodyPr>
-        <a:lstStyle/>
-        <a:p>
-          <a:pPr lvl="0" algn="ctr" defTabSz="933450">
-            <a:lnSpc>
-              <a:spcPct val="90000"/>
-            </a:lnSpc>
-            <a:spcBef>
-              <a:spcPct val="0"/>
-            </a:spcBef>
-            <a:spcAft>
-              <a:spcPct val="35000"/>
-            </a:spcAft>
-          </a:pPr>
-          <a:r>
-            <a:rPr lang="en-US" sz="2100" kern="1200" dirty="0" smtClean="0"/>
-            <a:t>Record sequence</a:t>
-          </a:r>
-          <a:endParaRPr lang="de-CH" sz="2100" kern="1200" dirty="0"/>
-        </a:p>
-      </dsp:txBody>
-      <dsp:txXfrm>
-        <a:off x="54429" y="82942"/>
-        <a:ext cx="1483578" cy="1005800"/>
-      </dsp:txXfrm>
-    </dsp:sp>
-    <dsp:sp modelId="{D4EFC377-AFF7-4383-8611-A4AC615569BE}">
-      <dsp:nvSpPr>
-        <dsp:cNvPr id="0" name=""/>
-        <dsp:cNvSpPr/>
-      </dsp:nvSpPr>
-      <dsp:spPr>
-        <a:xfrm>
-          <a:off x="1583995" y="140782"/>
-          <a:ext cx="2762331" cy="900904"/>
-        </a:xfrm>
-        <a:prstGeom prst="rect">
-          <a:avLst/>
-        </a:prstGeom>
-        <a:noFill/>
-        <a:ln>
-          <a:noFill/>
-        </a:ln>
-        <a:effectLst/>
-      </dsp:spPr>
-      <dsp:style>
-        <a:lnRef idx="0">
-          <a:scrgbClr r="0" g="0" b="0"/>
-        </a:lnRef>
-        <a:fillRef idx="0">
-          <a:scrgbClr r="0" g="0" b="0"/>
-        </a:fillRef>
-        <a:effectRef idx="0">
-          <a:scrgbClr r="0" g="0" b="0"/>
-        </a:effectRef>
-        <a:fontRef idx="minor"/>
-      </dsp:style>
-      <dsp:txBody>
-        <a:bodyPr spcFirstLastPara="0" vert="horz" wrap="square" lIns="68580" tIns="68580" rIns="68580" bIns="68580" numCol="1" spcCol="1270" anchor="ctr" anchorCtr="0">
-          <a:noAutofit/>
-        </a:bodyPr>
-        <a:lstStyle/>
-        <a:p>
-          <a:pPr marL="171450" lvl="1" indent="-171450" algn="l" defTabSz="800100">
-            <a:lnSpc>
-              <a:spcPct val="90000"/>
-            </a:lnSpc>
-            <a:spcBef>
-              <a:spcPct val="0"/>
-            </a:spcBef>
-            <a:spcAft>
-              <a:spcPct val="15000"/>
-            </a:spcAft>
-            <a:buChar char="••"/>
-          </a:pPr>
-          <a:r>
-            <a:rPr lang="en-US" sz="1800" kern="1200" dirty="0" smtClean="0"/>
-            <a:t>On emulated device</a:t>
-          </a:r>
-          <a:endParaRPr lang="de-CH" sz="1800" kern="1200" dirty="0"/>
-        </a:p>
-      </dsp:txBody>
-      <dsp:txXfrm>
-        <a:off x="1583995" y="140782"/>
-        <a:ext cx="2762331" cy="900904"/>
-      </dsp:txXfrm>
-    </dsp:sp>
-    <dsp:sp modelId="{6FB92FAA-8355-4FEC-9356-67979D72B354}">
-      <dsp:nvSpPr>
-        <dsp:cNvPr id="0" name=""/>
-        <dsp:cNvSpPr/>
-      </dsp:nvSpPr>
-      <dsp:spPr>
-        <a:xfrm rot="5400000">
-          <a:off x="2160003" y="2329238"/>
-          <a:ext cx="945949" cy="1076930"/>
-        </a:xfrm>
-        <a:prstGeom prst="bentUpArrow">
-          <a:avLst>
-            <a:gd name="adj1" fmla="val 32840"/>
-            <a:gd name="adj2" fmla="val 25000"/>
-            <a:gd name="adj3" fmla="val 35780"/>
-          </a:avLst>
-        </a:prstGeom>
-        <a:solidFill>
-          <a:schemeClr val="accent1">
-            <a:tint val="50000"/>
-            <a:hueOff val="0"/>
-            <a:satOff val="0"/>
-            <a:lumOff val="0"/>
-            <a:alphaOff val="0"/>
-          </a:schemeClr>
-        </a:solidFill>
-        <a:ln w="15875" cap="rnd" cmpd="sng" algn="ctr">
-          <a:solidFill>
-            <a:schemeClr val="lt1">
-              <a:hueOff val="0"/>
-              <a:satOff val="0"/>
-              <a:lumOff val="0"/>
-              <a:alphaOff val="0"/>
-            </a:schemeClr>
-          </a:solidFill>
-          <a:prstDash val="solid"/>
-        </a:ln>
-        <a:effectLst/>
-      </dsp:spPr>
-      <dsp:style>
-        <a:lnRef idx="2">
-          <a:scrgbClr r="0" g="0" b="0"/>
-        </a:lnRef>
-        <a:fillRef idx="1">
-          <a:scrgbClr r="0" g="0" b="0"/>
-        </a:fillRef>
-        <a:effectRef idx="0">
-          <a:scrgbClr r="0" g="0" b="0"/>
-        </a:effectRef>
-        <a:fontRef idx="minor"/>
-      </dsp:style>
-    </dsp:sp>
-    <dsp:sp modelId="{CCCE12E7-E5B8-4F58-8431-0C12B0F81C58}">
-      <dsp:nvSpPr>
-        <dsp:cNvPr id="0" name=""/>
-        <dsp:cNvSpPr/>
-      </dsp:nvSpPr>
-      <dsp:spPr>
-        <a:xfrm>
-          <a:off x="1799996" y="1280633"/>
-          <a:ext cx="1592422" cy="1114644"/>
-        </a:xfrm>
-        <a:prstGeom prst="roundRect">
-          <a:avLst>
-            <a:gd name="adj" fmla="val 16670"/>
-          </a:avLst>
-        </a:prstGeom>
-        <a:solidFill>
-          <a:schemeClr val="accent1">
-            <a:hueOff val="0"/>
-            <a:satOff val="0"/>
-            <a:lumOff val="0"/>
-            <a:alphaOff val="0"/>
-          </a:schemeClr>
-        </a:solidFill>
-        <a:ln w="15875" cap="rnd" cmpd="sng" algn="ctr">
-          <a:solidFill>
-            <a:schemeClr val="lt1">
-              <a:hueOff val="0"/>
-              <a:satOff val="0"/>
-              <a:lumOff val="0"/>
-              <a:alphaOff val="0"/>
-            </a:schemeClr>
-          </a:solidFill>
-          <a:prstDash val="solid"/>
-        </a:ln>
-        <a:effectLst/>
-      </dsp:spPr>
-      <dsp:style>
-        <a:lnRef idx="2">
-          <a:scrgbClr r="0" g="0" b="0"/>
-        </a:lnRef>
-        <a:fillRef idx="1">
-          <a:scrgbClr r="0" g="0" b="0"/>
-        </a:fillRef>
-        <a:effectRef idx="0">
-          <a:scrgbClr r="0" g="0" b="0"/>
-        </a:effectRef>
-        <a:fontRef idx="minor">
-          <a:schemeClr val="lt1"/>
-        </a:fontRef>
-      </dsp:style>
-      <dsp:txBody>
-        <a:bodyPr spcFirstLastPara="0" vert="horz" wrap="square" lIns="80010" tIns="80010" rIns="80010" bIns="80010" numCol="1" spcCol="1270" anchor="ctr" anchorCtr="0">
-          <a:noAutofit/>
-        </a:bodyPr>
-        <a:lstStyle/>
-        <a:p>
-          <a:pPr lvl="0" algn="ctr" defTabSz="933450">
-            <a:lnSpc>
-              <a:spcPct val="90000"/>
-            </a:lnSpc>
-            <a:spcBef>
-              <a:spcPct val="0"/>
-            </a:spcBef>
-            <a:spcAft>
-              <a:spcPct val="35000"/>
-            </a:spcAft>
-          </a:pPr>
-          <a:r>
-            <a:rPr lang="en-US" sz="2100" kern="1200" dirty="0" smtClean="0"/>
-            <a:t>Visualize sequence</a:t>
-          </a:r>
-          <a:endParaRPr lang="de-CH" sz="2100" kern="1200" dirty="0"/>
-        </a:p>
-      </dsp:txBody>
-      <dsp:txXfrm>
-        <a:off x="1854418" y="1335055"/>
-        <a:ext cx="1483578" cy="1005800"/>
-      </dsp:txXfrm>
-    </dsp:sp>
-    <dsp:sp modelId="{C60AB0D8-72C7-45B2-B090-B32ABD564FCD}">
-      <dsp:nvSpPr>
-        <dsp:cNvPr id="0" name=""/>
-        <dsp:cNvSpPr/>
-      </dsp:nvSpPr>
-      <dsp:spPr>
-        <a:xfrm>
-          <a:off x="3384002" y="1398940"/>
-          <a:ext cx="4672500" cy="900904"/>
-        </a:xfrm>
-        <a:prstGeom prst="rect">
-          <a:avLst/>
-        </a:prstGeom>
-        <a:noFill/>
-        <a:ln>
-          <a:noFill/>
-        </a:ln>
-        <a:effectLst/>
-      </dsp:spPr>
-      <dsp:style>
-        <a:lnRef idx="0">
-          <a:scrgbClr r="0" g="0" b="0"/>
-        </a:lnRef>
-        <a:fillRef idx="0">
-          <a:scrgbClr r="0" g="0" b="0"/>
-        </a:fillRef>
-        <a:effectRef idx="0">
-          <a:scrgbClr r="0" g="0" b="0"/>
-        </a:effectRef>
-        <a:fontRef idx="minor"/>
-      </dsp:style>
-      <dsp:txBody>
-        <a:bodyPr spcFirstLastPara="0" vert="horz" wrap="square" lIns="68580" tIns="68580" rIns="68580" bIns="68580" numCol="1" spcCol="1270" anchor="ctr" anchorCtr="0">
-          <a:noAutofit/>
-        </a:bodyPr>
-        <a:lstStyle/>
-        <a:p>
-          <a:pPr marL="171450" lvl="1" indent="-171450" algn="l" defTabSz="800100">
-            <a:lnSpc>
-              <a:spcPct val="90000"/>
-            </a:lnSpc>
-            <a:spcBef>
-              <a:spcPct val="0"/>
-            </a:spcBef>
-            <a:spcAft>
-              <a:spcPct val="15000"/>
-            </a:spcAft>
-            <a:buChar char="••"/>
-          </a:pPr>
-          <a:r>
-            <a:rPr lang="en-US" sz="1800" kern="1200" dirty="0" smtClean="0"/>
-            <a:t>Display events in a timeline</a:t>
-          </a:r>
-          <a:endParaRPr lang="de-CH" sz="1800" kern="1200" dirty="0"/>
-        </a:p>
-        <a:p>
-          <a:pPr marL="171450" lvl="1" indent="-171450" algn="l" defTabSz="800100">
-            <a:lnSpc>
-              <a:spcPct val="90000"/>
-            </a:lnSpc>
-            <a:spcBef>
-              <a:spcPct val="0"/>
-            </a:spcBef>
-            <a:spcAft>
-              <a:spcPct val="15000"/>
-            </a:spcAft>
-            <a:buChar char="••"/>
-          </a:pPr>
-          <a:r>
-            <a:rPr lang="en-US" sz="1800" kern="1200" dirty="0" smtClean="0"/>
-            <a:t>Save sequence</a:t>
-          </a:r>
-          <a:endParaRPr lang="de-CH" sz="1800" kern="1200" dirty="0"/>
-        </a:p>
-        <a:p>
-          <a:pPr marL="171450" lvl="1" indent="-171450" algn="l" defTabSz="800100">
-            <a:lnSpc>
-              <a:spcPct val="90000"/>
-            </a:lnSpc>
-            <a:spcBef>
-              <a:spcPct val="0"/>
-            </a:spcBef>
-            <a:spcAft>
-              <a:spcPct val="15000"/>
-            </a:spcAft>
-            <a:buChar char="••"/>
-          </a:pPr>
-          <a:r>
-            <a:rPr lang="en-US" sz="1800" kern="1200" dirty="0" smtClean="0"/>
-            <a:t>Move sequence to other device</a:t>
-          </a:r>
-          <a:endParaRPr lang="de-CH" sz="1800" kern="1200" dirty="0"/>
-        </a:p>
-      </dsp:txBody>
-      <dsp:txXfrm>
-        <a:off x="3384002" y="1398940"/>
-        <a:ext cx="4672500" cy="900904"/>
-      </dsp:txXfrm>
-    </dsp:sp>
-    <dsp:sp modelId="{F3F94BDD-D93C-4EB6-8AFF-FDEC6505EA29}">
-      <dsp:nvSpPr>
-        <dsp:cNvPr id="0" name=""/>
-        <dsp:cNvSpPr/>
-      </dsp:nvSpPr>
-      <dsp:spPr>
-        <a:xfrm rot="5400000">
-          <a:off x="3960002" y="3581351"/>
-          <a:ext cx="945949" cy="1076930"/>
-        </a:xfrm>
-        <a:prstGeom prst="bentUpArrow">
-          <a:avLst>
-            <a:gd name="adj1" fmla="val 32840"/>
-            <a:gd name="adj2" fmla="val 25000"/>
-            <a:gd name="adj3" fmla="val 35780"/>
-          </a:avLst>
-        </a:prstGeom>
-        <a:solidFill>
-          <a:schemeClr val="accent1">
-            <a:tint val="50000"/>
-            <a:hueOff val="0"/>
-            <a:satOff val="0"/>
-            <a:lumOff val="0"/>
-            <a:alphaOff val="0"/>
-          </a:schemeClr>
-        </a:solidFill>
-        <a:ln w="15875" cap="rnd" cmpd="sng" algn="ctr">
-          <a:solidFill>
-            <a:schemeClr val="lt1">
-              <a:hueOff val="0"/>
-              <a:satOff val="0"/>
-              <a:lumOff val="0"/>
-              <a:alphaOff val="0"/>
-            </a:schemeClr>
-          </a:solidFill>
-          <a:prstDash val="solid"/>
-        </a:ln>
-        <a:effectLst/>
-      </dsp:spPr>
-      <dsp:style>
-        <a:lnRef idx="2">
-          <a:scrgbClr r="0" g="0" b="0"/>
-        </a:lnRef>
-        <a:fillRef idx="1">
-          <a:scrgbClr r="0" g="0" b="0"/>
-        </a:fillRef>
-        <a:effectRef idx="0">
-          <a:scrgbClr r="0" g="0" b="0"/>
-        </a:effectRef>
-        <a:fontRef idx="minor"/>
-      </dsp:style>
-    </dsp:sp>
-    <dsp:sp modelId="{7C9C6413-B337-4A66-8542-181936D08323}">
-      <dsp:nvSpPr>
-        <dsp:cNvPr id="0" name=""/>
-        <dsp:cNvSpPr/>
-      </dsp:nvSpPr>
-      <dsp:spPr>
-        <a:xfrm>
-          <a:off x="3599995" y="2534396"/>
-          <a:ext cx="1592422" cy="1114644"/>
-        </a:xfrm>
-        <a:prstGeom prst="roundRect">
-          <a:avLst>
-            <a:gd name="adj" fmla="val 16670"/>
-          </a:avLst>
-        </a:prstGeom>
-        <a:solidFill>
-          <a:schemeClr val="accent1">
-            <a:hueOff val="0"/>
-            <a:satOff val="0"/>
-            <a:lumOff val="0"/>
-            <a:alphaOff val="0"/>
-          </a:schemeClr>
-        </a:solidFill>
-        <a:ln w="15875" cap="rnd" cmpd="sng" algn="ctr">
-          <a:solidFill>
-            <a:schemeClr val="lt1">
-              <a:hueOff val="0"/>
-              <a:satOff val="0"/>
-              <a:lumOff val="0"/>
-              <a:alphaOff val="0"/>
-            </a:schemeClr>
-          </a:solidFill>
-          <a:prstDash val="solid"/>
-        </a:ln>
-        <a:effectLst/>
-      </dsp:spPr>
-      <dsp:style>
-        <a:lnRef idx="2">
-          <a:scrgbClr r="0" g="0" b="0"/>
-        </a:lnRef>
-        <a:fillRef idx="1">
-          <a:scrgbClr r="0" g="0" b="0"/>
-        </a:fillRef>
-        <a:effectRef idx="0">
-          <a:scrgbClr r="0" g="0" b="0"/>
-        </a:effectRef>
-        <a:fontRef idx="minor">
-          <a:schemeClr val="lt1"/>
-        </a:fontRef>
-      </dsp:style>
-      <dsp:txBody>
-        <a:bodyPr spcFirstLastPara="0" vert="horz" wrap="square" lIns="80010" tIns="80010" rIns="80010" bIns="80010" numCol="1" spcCol="1270" anchor="ctr" anchorCtr="0">
-          <a:noAutofit/>
-        </a:bodyPr>
-        <a:lstStyle/>
-        <a:p>
-          <a:pPr lvl="0" algn="ctr" defTabSz="933450">
-            <a:lnSpc>
-              <a:spcPct val="90000"/>
-            </a:lnSpc>
-            <a:spcBef>
-              <a:spcPct val="0"/>
-            </a:spcBef>
-            <a:spcAft>
-              <a:spcPct val="35000"/>
-            </a:spcAft>
-          </a:pPr>
-          <a:r>
-            <a:rPr lang="en-US" sz="2100" kern="1200" dirty="0" smtClean="0"/>
-            <a:t>Adjust timing</a:t>
-          </a:r>
-          <a:endParaRPr lang="de-CH" sz="2100" kern="1200" dirty="0"/>
-        </a:p>
-      </dsp:txBody>
-      <dsp:txXfrm>
-        <a:off x="3654417" y="2588818"/>
-        <a:ext cx="1483578" cy="1005800"/>
-      </dsp:txXfrm>
-    </dsp:sp>
-    <dsp:sp modelId="{00C2D28C-794C-46F8-B203-EACC2F42DFC0}">
-      <dsp:nvSpPr>
-        <dsp:cNvPr id="0" name=""/>
-        <dsp:cNvSpPr/>
-      </dsp:nvSpPr>
-      <dsp:spPr>
-        <a:xfrm>
-          <a:off x="5183996" y="2692423"/>
-          <a:ext cx="3377416" cy="900904"/>
-        </a:xfrm>
-        <a:prstGeom prst="rect">
-          <a:avLst/>
-        </a:prstGeom>
-        <a:noFill/>
-        <a:ln>
-          <a:noFill/>
-        </a:ln>
-        <a:effectLst/>
-      </dsp:spPr>
-      <dsp:style>
-        <a:lnRef idx="0">
-          <a:scrgbClr r="0" g="0" b="0"/>
-        </a:lnRef>
-        <a:fillRef idx="0">
-          <a:scrgbClr r="0" g="0" b="0"/>
-        </a:fillRef>
-        <a:effectRef idx="0">
-          <a:scrgbClr r="0" g="0" b="0"/>
-        </a:effectRef>
-        <a:fontRef idx="minor"/>
-      </dsp:style>
-      <dsp:txBody>
-        <a:bodyPr spcFirstLastPara="0" vert="horz" wrap="square" lIns="68580" tIns="68580" rIns="68580" bIns="68580" numCol="1" spcCol="1270" anchor="ctr" anchorCtr="0">
-          <a:noAutofit/>
-        </a:bodyPr>
-        <a:lstStyle/>
-        <a:p>
-          <a:pPr marL="171450" lvl="1" indent="-171450" algn="l" defTabSz="800100">
-            <a:lnSpc>
-              <a:spcPct val="90000"/>
-            </a:lnSpc>
-            <a:spcBef>
-              <a:spcPct val="0"/>
-            </a:spcBef>
-            <a:spcAft>
-              <a:spcPct val="15000"/>
-            </a:spcAft>
-            <a:buChar char="••"/>
-          </a:pPr>
-          <a:r>
-            <a:rPr lang="en-US" sz="1800" kern="1200" dirty="0" smtClean="0"/>
-            <a:t>Drag and drop sequence</a:t>
-          </a:r>
-          <a:endParaRPr lang="de-CH" sz="1800" kern="1200" dirty="0"/>
-        </a:p>
-        <a:p>
-          <a:pPr marL="171450" lvl="1" indent="-171450" algn="l" defTabSz="800100">
-            <a:lnSpc>
-              <a:spcPct val="90000"/>
-            </a:lnSpc>
-            <a:spcBef>
-              <a:spcPct val="0"/>
-            </a:spcBef>
-            <a:spcAft>
-              <a:spcPct val="15000"/>
-            </a:spcAft>
-            <a:buChar char="••"/>
-          </a:pPr>
-          <a:r>
-            <a:rPr lang="en-US" sz="1800" kern="1200" dirty="0" smtClean="0"/>
-            <a:t>Set breakpoints</a:t>
-          </a:r>
-          <a:endParaRPr lang="de-CH" sz="1800" kern="1200" dirty="0"/>
-        </a:p>
-        <a:p>
-          <a:pPr marL="171450" lvl="1" indent="-171450" algn="l" defTabSz="800100">
-            <a:lnSpc>
-              <a:spcPct val="90000"/>
-            </a:lnSpc>
-            <a:spcBef>
-              <a:spcPct val="0"/>
-            </a:spcBef>
-            <a:spcAft>
-              <a:spcPct val="15000"/>
-            </a:spcAft>
-            <a:buChar char="••"/>
-          </a:pPr>
-          <a:r>
-            <a:rPr lang="en-US" sz="1800" kern="1200" dirty="0" smtClean="0"/>
-            <a:t>Add breaks of one second</a:t>
-          </a:r>
-          <a:endParaRPr lang="de-CH" sz="1800" kern="1200" dirty="0"/>
-        </a:p>
-      </dsp:txBody>
-      <dsp:txXfrm>
-        <a:off x="5183996" y="2692423"/>
-        <a:ext cx="3377416" cy="900904"/>
-      </dsp:txXfrm>
-    </dsp:sp>
-    <dsp:sp modelId="{C2AE311F-8BBD-4734-9B78-465F3C6AAF7A}">
-      <dsp:nvSpPr>
-        <dsp:cNvPr id="0" name=""/>
-        <dsp:cNvSpPr/>
-      </dsp:nvSpPr>
-      <dsp:spPr>
-        <a:xfrm>
-          <a:off x="5399997" y="3784860"/>
-          <a:ext cx="1592422" cy="1114644"/>
-        </a:xfrm>
-        <a:prstGeom prst="roundRect">
-          <a:avLst>
-            <a:gd name="adj" fmla="val 16670"/>
-          </a:avLst>
-        </a:prstGeom>
-        <a:solidFill>
-          <a:schemeClr val="accent1">
-            <a:hueOff val="0"/>
-            <a:satOff val="0"/>
-            <a:lumOff val="0"/>
-            <a:alphaOff val="0"/>
-          </a:schemeClr>
-        </a:solidFill>
-        <a:ln w="15875" cap="rnd" cmpd="sng" algn="ctr">
-          <a:solidFill>
-            <a:schemeClr val="lt1">
-              <a:hueOff val="0"/>
-              <a:satOff val="0"/>
-              <a:lumOff val="0"/>
-              <a:alphaOff val="0"/>
-            </a:schemeClr>
-          </a:solidFill>
-          <a:prstDash val="solid"/>
-        </a:ln>
-        <a:effectLst/>
-      </dsp:spPr>
-      <dsp:style>
-        <a:lnRef idx="2">
-          <a:scrgbClr r="0" g="0" b="0"/>
-        </a:lnRef>
-        <a:fillRef idx="1">
-          <a:scrgbClr r="0" g="0" b="0"/>
-        </a:fillRef>
-        <a:effectRef idx="0">
-          <a:scrgbClr r="0" g="0" b="0"/>
-        </a:effectRef>
-        <a:fontRef idx="minor">
-          <a:schemeClr val="lt1"/>
-        </a:fontRef>
-      </dsp:style>
-      <dsp:txBody>
-        <a:bodyPr spcFirstLastPara="0" vert="horz" wrap="square" lIns="80010" tIns="80010" rIns="80010" bIns="80010" numCol="1" spcCol="1270" anchor="ctr" anchorCtr="0">
-          <a:noAutofit/>
-        </a:bodyPr>
-        <a:lstStyle/>
-        <a:p>
-          <a:pPr lvl="0" algn="ctr" defTabSz="933450">
-            <a:lnSpc>
-              <a:spcPct val="90000"/>
-            </a:lnSpc>
-            <a:spcBef>
-              <a:spcPct val="0"/>
-            </a:spcBef>
-            <a:spcAft>
-              <a:spcPct val="35000"/>
-            </a:spcAft>
-          </a:pPr>
-          <a:r>
-            <a:rPr lang="en-US" sz="2100" kern="1200" dirty="0" smtClean="0"/>
-            <a:t>Replay sequence</a:t>
-          </a:r>
-          <a:endParaRPr lang="de-CH" sz="2100" kern="1200" dirty="0"/>
-        </a:p>
-      </dsp:txBody>
-      <dsp:txXfrm>
-        <a:off x="5454419" y="3839282"/>
-        <a:ext cx="1483578" cy="1005800"/>
-      </dsp:txXfrm>
-    </dsp:sp>
-    <dsp:sp modelId="{C6E774FE-2729-439D-889B-C5312A503348}">
-      <dsp:nvSpPr>
-        <dsp:cNvPr id="0" name=""/>
-        <dsp:cNvSpPr/>
-      </dsp:nvSpPr>
-      <dsp:spPr>
-        <a:xfrm>
-          <a:off x="6983996" y="3891166"/>
-          <a:ext cx="1984940" cy="900904"/>
-        </a:xfrm>
-        <a:prstGeom prst="rect">
-          <a:avLst/>
-        </a:prstGeom>
-        <a:noFill/>
-        <a:ln>
-          <a:noFill/>
-        </a:ln>
-        <a:effectLst/>
-      </dsp:spPr>
-      <dsp:style>
-        <a:lnRef idx="0">
-          <a:scrgbClr r="0" g="0" b="0"/>
-        </a:lnRef>
-        <a:fillRef idx="0">
-          <a:scrgbClr r="0" g="0" b="0"/>
-        </a:fillRef>
-        <a:effectRef idx="0">
-          <a:scrgbClr r="0" g="0" b="0"/>
-        </a:effectRef>
-        <a:fontRef idx="minor"/>
-      </dsp:style>
-      <dsp:txBody>
-        <a:bodyPr spcFirstLastPara="0" vert="horz" wrap="square" lIns="68580" tIns="68580" rIns="68580" bIns="68580" numCol="1" spcCol="1270" anchor="ctr" anchorCtr="0">
-          <a:noAutofit/>
-        </a:bodyPr>
-        <a:lstStyle/>
-        <a:p>
-          <a:pPr marL="171450" lvl="1" indent="-171450" algn="l" defTabSz="800100">
-            <a:lnSpc>
-              <a:spcPct val="90000"/>
-            </a:lnSpc>
-            <a:spcBef>
-              <a:spcPct val="0"/>
-            </a:spcBef>
-            <a:spcAft>
-              <a:spcPct val="15000"/>
-            </a:spcAft>
-            <a:buChar char="••"/>
-          </a:pPr>
-          <a:r>
-            <a:rPr lang="en-US" sz="1800" kern="1200" dirty="0" smtClean="0"/>
-            <a:t>On any device</a:t>
-          </a:r>
-          <a:endParaRPr lang="de-CH" sz="1800" kern="1200" dirty="0"/>
-        </a:p>
-      </dsp:txBody>
-      <dsp:txXfrm>
-        <a:off x="6983996" y="3891166"/>
-        <a:ext cx="1984940" cy="900904"/>
-      </dsp:txXfrm>
-    </dsp:sp>
   </dsp:spTree>
 </dsp:drawing>
 </file>
@@ -16252,7 +13689,7 @@
           <a:p>
             <a:fld id="{039C12ED-8806-4CCC-9C94-51D73545C590}" type="datetimeFigureOut">
               <a:rPr lang="en-US" smtClean="0"/>
-              <a:t>9/14/2015</a:t>
+              <a:t>9/17/2015</a:t>
             </a:fld>
             <a:endParaRPr lang="en-US" dirty="0"/>
           </a:p>
@@ -22988,7 +20425,7 @@
           <a:p>
             <a:fld id="{459220CB-8956-4D40-9A0B-82DE40C3C923}" type="datetimeFigureOut">
               <a:rPr lang="en-US" smtClean="0"/>
-              <a:t>9/14/2015</a:t>
+              <a:t>9/17/2015</a:t>
             </a:fld>
             <a:endParaRPr lang="en-US" dirty="0"/>
           </a:p>
@@ -23326,7 +20763,7 @@
           <a:p>
             <a:fld id="{459220CB-8956-4D40-9A0B-82DE40C3C923}" type="datetimeFigureOut">
               <a:rPr lang="en-US" smtClean="0"/>
-              <a:t>9/14/2015</a:t>
+              <a:t>9/17/2015</a:t>
             </a:fld>
             <a:endParaRPr lang="en-US" dirty="0"/>
           </a:p>
@@ -23727,7 +21164,7 @@
           <a:p>
             <a:fld id="{459220CB-8956-4D40-9A0B-82DE40C3C923}" type="datetimeFigureOut">
               <a:rPr lang="en-US" smtClean="0"/>
-              <a:t>9/14/2015</a:t>
+              <a:t>9/17/2015</a:t>
             </a:fld>
             <a:endParaRPr lang="en-US" dirty="0"/>
           </a:p>
@@ -24063,7 +21500,7 @@
           <a:p>
             <a:fld id="{459220CB-8956-4D40-9A0B-82DE40C3C923}" type="datetimeFigureOut">
               <a:rPr lang="en-US" smtClean="0"/>
-              <a:t>9/14/2015</a:t>
+              <a:t>9/17/2015</a:t>
             </a:fld>
             <a:endParaRPr lang="en-US" dirty="0"/>
           </a:p>
@@ -24383,7 +21820,7 @@
           <a:p>
             <a:fld id="{459220CB-8956-4D40-9A0B-82DE40C3C923}" type="datetimeFigureOut">
               <a:rPr lang="en-US" smtClean="0"/>
-              <a:t>9/14/2015</a:t>
+              <a:t>9/17/2015</a:t>
             </a:fld>
             <a:endParaRPr lang="en-US" dirty="0"/>
           </a:p>
@@ -24779,7 +22216,7 @@
           <a:p>
             <a:fld id="{459220CB-8956-4D40-9A0B-82DE40C3C923}" type="datetimeFigureOut">
               <a:rPr lang="en-US" smtClean="0"/>
-              <a:t>9/14/2015</a:t>
+              <a:t>9/17/2015</a:t>
             </a:fld>
             <a:endParaRPr lang="en-US" dirty="0"/>
           </a:p>
@@ -25036,7 +22473,7 @@
           <a:p>
             <a:fld id="{459220CB-8956-4D40-9A0B-82DE40C3C923}" type="datetimeFigureOut">
               <a:rPr lang="en-US" smtClean="0"/>
-              <a:t>9/14/2015</a:t>
+              <a:t>9/17/2015</a:t>
             </a:fld>
             <a:endParaRPr lang="en-US" dirty="0"/>
           </a:p>
@@ -25298,7 +22735,7 @@
           <a:p>
             <a:fld id="{459220CB-8956-4D40-9A0B-82DE40C3C923}" type="datetimeFigureOut">
               <a:rPr lang="en-US" smtClean="0"/>
-              <a:t>9/14/2015</a:t>
+              <a:t>9/17/2015</a:t>
             </a:fld>
             <a:endParaRPr lang="en-US" dirty="0"/>
           </a:p>
@@ -25560,7 +22997,7 @@
           <a:p>
             <a:fld id="{459220CB-8956-4D40-9A0B-82DE40C3C923}" type="datetimeFigureOut">
               <a:rPr lang="en-US" smtClean="0"/>
-              <a:t>9/14/2015</a:t>
+              <a:t>9/17/2015</a:t>
             </a:fld>
             <a:endParaRPr lang="en-US" dirty="0"/>
           </a:p>
@@ -25889,7 +23326,7 @@
           <a:p>
             <a:fld id="{459220CB-8956-4D40-9A0B-82DE40C3C923}" type="datetimeFigureOut">
               <a:rPr lang="en-US" smtClean="0"/>
-              <a:t>9/14/2015</a:t>
+              <a:t>9/17/2015</a:t>
             </a:fld>
             <a:endParaRPr lang="en-US" dirty="0"/>
           </a:p>
@@ -26212,7 +23649,7 @@
           <a:p>
             <a:fld id="{459220CB-8956-4D40-9A0B-82DE40C3C923}" type="datetimeFigureOut">
               <a:rPr lang="en-US" smtClean="0"/>
-              <a:t>9/14/2015</a:t>
+              <a:t>9/17/2015</a:t>
             </a:fld>
             <a:endParaRPr lang="en-US" dirty="0"/>
           </a:p>
@@ -26669,7 +24106,7 @@
           <a:p>
             <a:fld id="{459220CB-8956-4D40-9A0B-82DE40C3C923}" type="datetimeFigureOut">
               <a:rPr lang="en-US" smtClean="0"/>
-              <a:t>9/14/2015</a:t>
+              <a:t>9/17/2015</a:t>
             </a:fld>
             <a:endParaRPr lang="en-US" dirty="0"/>
           </a:p>
@@ -26874,7 +24311,7 @@
           <a:p>
             <a:fld id="{459220CB-8956-4D40-9A0B-82DE40C3C923}" type="datetimeFigureOut">
               <a:rPr lang="en-US" smtClean="0"/>
-              <a:t>9/14/2015</a:t>
+              <a:t>9/17/2015</a:t>
             </a:fld>
             <a:endParaRPr lang="en-US" dirty="0"/>
           </a:p>
@@ -27051,7 +24488,7 @@
           <a:p>
             <a:fld id="{459220CB-8956-4D40-9A0B-82DE40C3C923}" type="datetimeFigureOut">
               <a:rPr lang="en-US" smtClean="0"/>
-              <a:t>9/14/2015</a:t>
+              <a:t>9/17/2015</a:t>
             </a:fld>
             <a:endParaRPr lang="en-US" dirty="0"/>
           </a:p>
@@ -27384,7 +24821,7 @@
           <a:p>
             <a:fld id="{459220CB-8956-4D40-9A0B-82DE40C3C923}" type="datetimeFigureOut">
               <a:rPr lang="en-US" smtClean="0"/>
-              <a:t>9/14/2015</a:t>
+              <a:t>9/17/2015</a:t>
             </a:fld>
             <a:endParaRPr lang="en-US" dirty="0"/>
           </a:p>
@@ -27729,7 +25166,7 @@
           <a:p>
             <a:fld id="{459220CB-8956-4D40-9A0B-82DE40C3C923}" type="datetimeFigureOut">
               <a:rPr lang="en-US" smtClean="0"/>
-              <a:t>9/14/2015</a:t>
+              <a:t>9/17/2015</a:t>
             </a:fld>
             <a:endParaRPr lang="en-US" dirty="0"/>
           </a:p>
@@ -29846,7 +27283,7 @@
           <a:p>
             <a:fld id="{459220CB-8956-4D40-9A0B-82DE40C3C923}" type="datetimeFigureOut">
               <a:rPr lang="en-US" smtClean="0"/>
-              <a:t>9/14/2015</a:t>
+              <a:t>9/17/2015</a:t>
             </a:fld>
             <a:endParaRPr lang="en-US" dirty="0"/>
           </a:p>
@@ -54626,6 +52063,96 @@
           </p:cxnSp>
         </p:grpSp>
       </p:grpSp>
+      <p:sp>
+        <p:nvSpPr>
+          <p:cNvPr id="44" name="Textfeld 39"/>
+          <p:cNvSpPr txBox="1"/>
+          <p:nvPr/>
+        </p:nvSpPr>
+        <p:spPr>
+          <a:xfrm>
+            <a:off x="2253242" y="3100397"/>
+            <a:ext cx="2099490" cy="338554"/>
+          </a:xfrm>
+          <a:prstGeom prst="rect">
+            <a:avLst/>
+          </a:prstGeom>
+          <a:noFill/>
+        </p:spPr>
+        <p:txBody>
+          <a:bodyPr wrap="square" rtlCol="0">
+            <a:spAutoFit/>
+          </a:bodyPr>
+          <a:lstStyle/>
+          <a:p>
+            <a:r>
+              <a:rPr lang="en-US" sz="1600" dirty="0" smtClean="0">
+                <a:solidFill>
+                  <a:schemeClr val="accent1">
+                    <a:lumMod val="75000"/>
+                  </a:schemeClr>
+                </a:solidFill>
+              </a:rPr>
+              <a:t>Chrome extension</a:t>
+            </a:r>
+            <a:endParaRPr lang="en-US" sz="1600" dirty="0">
+              <a:solidFill>
+                <a:schemeClr val="accent1">
+                  <a:lumMod val="75000"/>
+                </a:schemeClr>
+              </a:solidFill>
+            </a:endParaRPr>
+          </a:p>
+        </p:txBody>
+      </p:sp>
+      <p:sp>
+        <p:nvSpPr>
+          <p:cNvPr id="45" name="Rechteck 24"/>
+          <p:cNvSpPr/>
+          <p:nvPr/>
+        </p:nvSpPr>
+        <p:spPr>
+          <a:xfrm>
+            <a:off x="2312384" y="3139465"/>
+            <a:ext cx="1867649" cy="282580"/>
+          </a:xfrm>
+          <a:prstGeom prst="rect">
+            <a:avLst/>
+          </a:prstGeom>
+          <a:noFill/>
+          <a:ln w="12700"/>
+          <a:effectLst>
+            <a:glow rad="317500">
+              <a:schemeClr val="accent1">
+                <a:satMod val="175000"/>
+                <a:alpha val="0"/>
+              </a:schemeClr>
+            </a:glow>
+          </a:effectLst>
+        </p:spPr>
+        <p:style>
+          <a:lnRef idx="2">
+            <a:schemeClr val="accent1"/>
+          </a:lnRef>
+          <a:fillRef idx="1">
+            <a:schemeClr val="lt1"/>
+          </a:fillRef>
+          <a:effectRef idx="0">
+            <a:schemeClr val="accent1"/>
+          </a:effectRef>
+          <a:fontRef idx="minor">
+            <a:schemeClr val="dk1"/>
+          </a:fontRef>
+        </p:style>
+        <p:txBody>
+          <a:bodyPr rtlCol="0" anchor="ctr"/>
+          <a:lstStyle/>
+          <a:p>
+            <a:pPr algn="ctr"/>
+            <a:endParaRPr lang="en-US"/>
+          </a:p>
+        </p:txBody>
+      </p:sp>
     </p:spTree>
     <p:extLst>
       <p:ext uri="{BB962C8B-B14F-4D97-AF65-F5344CB8AC3E}">

</xml_diff>

<commit_message>
updated report and cleaned up folders
</commit_message>
<xml_diff>
--- a/Presentation/Midterm/midterm.pptx
+++ b/Presentation/Midterm/midterm.pptx
@@ -4670,21 +4670,21 @@
     </dgm:pt>
   </dgm:ptLst>
   <dgm:cxnLst>
+    <dgm:cxn modelId="{871F3FDF-C464-4964-A3C4-CC3F21778624}" type="presOf" srcId="{F52B2616-E070-41E9-A0C6-5F77A35279F8}" destId="{475E8E10-321D-43CB-9FBE-E21B12C6A7FB}" srcOrd="0" destOrd="0" presId="urn:microsoft.com/office/officeart/2005/8/layout/hList6"/>
     <dgm:cxn modelId="{48283766-C8B5-4FC7-812B-8497AA0DEBE2}" srcId="{F52B2616-E070-41E9-A0C6-5F77A35279F8}" destId="{395ED92E-3BD4-4BFD-9994-17C5129F55A5}" srcOrd="1" destOrd="0" parTransId="{B66891D4-0E88-4E7C-8A2A-00D270DC71D7}" sibTransId="{34D15687-2B3A-4677-A069-CE3784C0870A}"/>
-    <dgm:cxn modelId="{02379F8E-E404-459B-9023-5210359B8444}" type="presOf" srcId="{57ECCBC0-E332-4DA8-A753-B19397CD300C}" destId="{475E8E10-321D-43CB-9FBE-E21B12C6A7FB}" srcOrd="0" destOrd="4" presId="urn:microsoft.com/office/officeart/2005/8/layout/hList6"/>
     <dgm:cxn modelId="{EE055907-9F23-4631-A693-A5320BAFE293}" srcId="{F52B2616-E070-41E9-A0C6-5F77A35279F8}" destId="{57ECCBC0-E332-4DA8-A753-B19397CD300C}" srcOrd="3" destOrd="0" parTransId="{AC7B9073-E1B8-4F66-9BEE-86E84C56E727}" sibTransId="{A91B5AC3-C622-4833-A8CA-6C2F4C9C6E7B}"/>
     <dgm:cxn modelId="{B088ACB9-2AF1-4274-9163-FCECF296CBA9}" type="presOf" srcId="{14F50946-1EB0-44B4-97FE-91658C19A3E7}" destId="{475E8E10-321D-43CB-9FBE-E21B12C6A7FB}" srcOrd="0" destOrd="1" presId="urn:microsoft.com/office/officeart/2005/8/layout/hList6"/>
+    <dgm:cxn modelId="{AF60B73B-EF89-40EE-A778-CCA3C636C26A}" srcId="{F52B2616-E070-41E9-A0C6-5F77A35279F8}" destId="{36C62F2E-BE03-4469-93EB-2CE0029861D2}" srcOrd="2" destOrd="0" parTransId="{6B55622F-833B-4820-BB7F-780FE83BAA97}" sibTransId="{BA316D3A-4158-4234-82B5-DB796CAA804B}"/>
+    <dgm:cxn modelId="{3412A52F-459B-475D-9F64-173BE5107FC9}" srcId="{F52B2616-E070-41E9-A0C6-5F77A35279F8}" destId="{14F50946-1EB0-44B4-97FE-91658C19A3E7}" srcOrd="0" destOrd="0" parTransId="{08744D75-444B-4D39-BE5B-555F09CFEAE3}" sibTransId="{2E923D5A-C04A-407D-9677-B766BDC9887B}"/>
     <dgm:cxn modelId="{9AE7B832-666D-4F57-AD7F-E46722024978}" type="presOf" srcId="{AAEE1B33-7B5F-4AAA-BC6C-8DA7C7BA08E6}" destId="{CB3970F5-4B46-4D03-9416-FEB9FF6AB152}" srcOrd="0" destOrd="0" presId="urn:microsoft.com/office/officeart/2005/8/layout/hList6"/>
-    <dgm:cxn modelId="{A68C515D-4781-4ED2-825C-BFC427B28AA4}" srcId="{F9CA9111-1371-447E-8AA7-EEE656CE2D33}" destId="{F52B2616-E070-41E9-A0C6-5F77A35279F8}" srcOrd="0" destOrd="0" parTransId="{4BF08426-E85B-4FBD-933D-0C8974B695AF}" sibTransId="{248DC076-5408-4A74-B5D3-67F4691AB699}"/>
     <dgm:cxn modelId="{F29D6295-5C85-47D5-A92C-F4263C7D3B91}" type="presOf" srcId="{1ABD7A25-9D19-420E-AAF3-2963CAD6EAC6}" destId="{4A2757D9-EA3E-4300-9C07-77EBA31E4FE6}" srcOrd="0" destOrd="0" presId="urn:microsoft.com/office/officeart/2005/8/layout/hList6"/>
     <dgm:cxn modelId="{FBEB1564-6F49-4777-86FD-EE4D15B4B84C}" type="presOf" srcId="{395ED92E-3BD4-4BFD-9994-17C5129F55A5}" destId="{475E8E10-321D-43CB-9FBE-E21B12C6A7FB}" srcOrd="0" destOrd="2" presId="urn:microsoft.com/office/officeart/2005/8/layout/hList6"/>
-    <dgm:cxn modelId="{3412A52F-459B-475D-9F64-173BE5107FC9}" srcId="{F52B2616-E070-41E9-A0C6-5F77A35279F8}" destId="{14F50946-1EB0-44B4-97FE-91658C19A3E7}" srcOrd="0" destOrd="0" parTransId="{08744D75-444B-4D39-BE5B-555F09CFEAE3}" sibTransId="{2E923D5A-C04A-407D-9677-B766BDC9887B}"/>
-    <dgm:cxn modelId="{7C37895F-5EE0-4FA2-A49F-109C5A857BEE}" srcId="{F9CA9111-1371-447E-8AA7-EEE656CE2D33}" destId="{1ABD7A25-9D19-420E-AAF3-2963CAD6EAC6}" srcOrd="1" destOrd="0" parTransId="{511EA8BB-52B4-4F77-9E23-CE9DECDAD34F}" sibTransId="{447BF525-E978-44D7-8AD8-2A572135AF6B}"/>
-    <dgm:cxn modelId="{871F3FDF-C464-4964-A3C4-CC3F21778624}" type="presOf" srcId="{F52B2616-E070-41E9-A0C6-5F77A35279F8}" destId="{475E8E10-321D-43CB-9FBE-E21B12C6A7FB}" srcOrd="0" destOrd="0" presId="urn:microsoft.com/office/officeart/2005/8/layout/hList6"/>
     <dgm:cxn modelId="{317E6C53-4101-4B07-B4CA-E955FAD17431}" type="presOf" srcId="{36C62F2E-BE03-4469-93EB-2CE0029861D2}" destId="{475E8E10-321D-43CB-9FBE-E21B12C6A7FB}" srcOrd="0" destOrd="3" presId="urn:microsoft.com/office/officeart/2005/8/layout/hList6"/>
+    <dgm:cxn modelId="{A68C515D-4781-4ED2-825C-BFC427B28AA4}" srcId="{F9CA9111-1371-447E-8AA7-EEE656CE2D33}" destId="{F52B2616-E070-41E9-A0C6-5F77A35279F8}" srcOrd="0" destOrd="0" parTransId="{4BF08426-E85B-4FBD-933D-0C8974B695AF}" sibTransId="{248DC076-5408-4A74-B5D3-67F4691AB699}"/>
+    <dgm:cxn modelId="{02379F8E-E404-459B-9023-5210359B8444}" type="presOf" srcId="{57ECCBC0-E332-4DA8-A753-B19397CD300C}" destId="{475E8E10-321D-43CB-9FBE-E21B12C6A7FB}" srcOrd="0" destOrd="4" presId="urn:microsoft.com/office/officeart/2005/8/layout/hList6"/>
     <dgm:cxn modelId="{3E37CD1C-179D-4156-A167-34DCE0D052A3}" srcId="{F9CA9111-1371-447E-8AA7-EEE656CE2D33}" destId="{AAEE1B33-7B5F-4AAA-BC6C-8DA7C7BA08E6}" srcOrd="2" destOrd="0" parTransId="{82D59BF3-8865-460B-89E3-CEB78E0A4B11}" sibTransId="{2EE4BE8A-D1C9-41A1-8F65-AD8D50D77E78}"/>
     <dgm:cxn modelId="{E91080F3-4DD0-466A-AF91-5CEF78A90E55}" type="presOf" srcId="{F9CA9111-1371-447E-8AA7-EEE656CE2D33}" destId="{A6963697-5066-44D5-9D8B-78CBDBA2B4B3}" srcOrd="0" destOrd="0" presId="urn:microsoft.com/office/officeart/2005/8/layout/hList6"/>
-    <dgm:cxn modelId="{AF60B73B-EF89-40EE-A778-CCA3C636C26A}" srcId="{F52B2616-E070-41E9-A0C6-5F77A35279F8}" destId="{36C62F2E-BE03-4469-93EB-2CE0029861D2}" srcOrd="2" destOrd="0" parTransId="{6B55622F-833B-4820-BB7F-780FE83BAA97}" sibTransId="{BA316D3A-4158-4234-82B5-DB796CAA804B}"/>
+    <dgm:cxn modelId="{7C37895F-5EE0-4FA2-A49F-109C5A857BEE}" srcId="{F9CA9111-1371-447E-8AA7-EEE656CE2D33}" destId="{1ABD7A25-9D19-420E-AAF3-2963CAD6EAC6}" srcOrd="1" destOrd="0" parTransId="{511EA8BB-52B4-4F77-9E23-CE9DECDAD34F}" sibTransId="{447BF525-E978-44D7-8AD8-2A572135AF6B}"/>
     <dgm:cxn modelId="{3CB54F1F-7587-4D58-9FE8-BEB2800776A4}" type="presParOf" srcId="{A6963697-5066-44D5-9D8B-78CBDBA2B4B3}" destId="{475E8E10-321D-43CB-9FBE-E21B12C6A7FB}" srcOrd="0" destOrd="0" presId="urn:microsoft.com/office/officeart/2005/8/layout/hList6"/>
     <dgm:cxn modelId="{35E32079-9D9E-4F82-B280-3CDC3B2C761D}" type="presParOf" srcId="{A6963697-5066-44D5-9D8B-78CBDBA2B4B3}" destId="{B1D85BDC-A359-4F71-A35B-0A83DD2BF8E2}" srcOrd="1" destOrd="0" presId="urn:microsoft.com/office/officeart/2005/8/layout/hList6"/>
     <dgm:cxn modelId="{4185EC8E-595A-4D80-BCA0-22666756F9F3}" type="presParOf" srcId="{A6963697-5066-44D5-9D8B-78CBDBA2B4B3}" destId="{4A2757D9-EA3E-4300-9C07-77EBA31E4FE6}" srcOrd="2" destOrd="0" presId="urn:microsoft.com/office/officeart/2005/8/layout/hList6"/>
@@ -7233,6 +7233,304 @@
       <dsp:cNvGrpSpPr/>
     </dsp:nvGrpSpPr>
     <dsp:grpSpPr/>
+    <dsp:sp modelId="{475E8E10-321D-43CB-9FBE-E21B12C6A7FB}">
+      <dsp:nvSpPr>
+        <dsp:cNvPr id="0" name=""/>
+        <dsp:cNvSpPr/>
+      </dsp:nvSpPr>
+      <dsp:spPr>
+        <a:xfrm rot="16200000">
+          <a:off x="-504299" y="507633"/>
+          <a:ext cx="3952683" cy="2937415"/>
+        </a:xfrm>
+        <a:prstGeom prst="flowChartManualOperation">
+          <a:avLst/>
+        </a:prstGeom>
+        <a:gradFill rotWithShape="0">
+          <a:gsLst>
+            <a:gs pos="0">
+              <a:schemeClr val="accent1">
+                <a:shade val="80000"/>
+                <a:hueOff val="0"/>
+                <a:satOff val="0"/>
+                <a:lumOff val="0"/>
+                <a:alphaOff val="0"/>
+                <a:tint val="96000"/>
+                <a:lumMod val="104000"/>
+              </a:schemeClr>
+            </a:gs>
+            <a:gs pos="100000">
+              <a:schemeClr val="accent1">
+                <a:shade val="80000"/>
+                <a:hueOff val="0"/>
+                <a:satOff val="0"/>
+                <a:lumOff val="0"/>
+                <a:alphaOff val="0"/>
+                <a:shade val="98000"/>
+                <a:lumMod val="94000"/>
+              </a:schemeClr>
+            </a:gs>
+          </a:gsLst>
+          <a:lin ang="5400000" scaled="0"/>
+        </a:gradFill>
+        <a:ln>
+          <a:noFill/>
+        </a:ln>
+        <a:effectLst>
+          <a:outerShdw blurRad="50800" dist="38100" dir="5400000" rotWithShape="0">
+            <a:srgbClr val="000000">
+              <a:alpha val="60000"/>
+            </a:srgbClr>
+          </a:outerShdw>
+        </a:effectLst>
+      </dsp:spPr>
+      <dsp:style>
+        <a:lnRef idx="0">
+          <a:scrgbClr r="0" g="0" b="0"/>
+        </a:lnRef>
+        <a:fillRef idx="3">
+          <a:scrgbClr r="0" g="0" b="0"/>
+        </a:fillRef>
+        <a:effectRef idx="3">
+          <a:scrgbClr r="0" g="0" b="0"/>
+        </a:effectRef>
+        <a:fontRef idx="minor">
+          <a:schemeClr val="lt1"/>
+        </a:fontRef>
+      </dsp:style>
+      <dsp:txBody>
+        <a:bodyPr spcFirstLastPara="0" vert="horz" wrap="square" lIns="133350" tIns="0" rIns="133350" bIns="0" numCol="1" spcCol="1270" anchor="t" anchorCtr="0">
+          <a:noAutofit/>
+        </a:bodyPr>
+        <a:lstStyle/>
+        <a:p>
+          <a:pPr lvl="0" algn="l" defTabSz="933450">
+            <a:lnSpc>
+              <a:spcPct val="90000"/>
+            </a:lnSpc>
+            <a:spcBef>
+              <a:spcPct val="0"/>
+            </a:spcBef>
+            <a:spcAft>
+              <a:spcPct val="35000"/>
+            </a:spcAft>
+          </a:pPr>
+          <a:r>
+            <a:rPr lang="en-US" sz="2100" kern="1200" smtClean="0"/>
+            <a:t>Analyze</a:t>
+          </a:r>
+          <a:endParaRPr lang="en-US" sz="2100" kern="1200" dirty="0"/>
+        </a:p>
+        <a:p>
+          <a:pPr marL="171450" lvl="1" indent="-171450" algn="l" defTabSz="800100">
+            <a:lnSpc>
+              <a:spcPct val="90000"/>
+            </a:lnSpc>
+            <a:spcBef>
+              <a:spcPct val="0"/>
+            </a:spcBef>
+            <a:spcAft>
+              <a:spcPct val="15000"/>
+            </a:spcAft>
+            <a:buChar char="••"/>
+          </a:pPr>
+          <a:r>
+            <a:rPr lang="en-US" sz="1800" kern="1200" dirty="0" smtClean="0"/>
+            <a:t>Testing tools for responsive design</a:t>
+          </a:r>
+          <a:endParaRPr lang="en-US" sz="1800" kern="1200" dirty="0"/>
+        </a:p>
+        <a:p>
+          <a:pPr marL="171450" lvl="1" indent="-171450" algn="l" defTabSz="800100">
+            <a:lnSpc>
+              <a:spcPct val="90000"/>
+            </a:lnSpc>
+            <a:spcBef>
+              <a:spcPct val="0"/>
+            </a:spcBef>
+            <a:spcAft>
+              <a:spcPct val="15000"/>
+            </a:spcAft>
+            <a:buChar char="••"/>
+          </a:pPr>
+          <a:r>
+            <a:rPr lang="en-US" sz="1800" kern="1200" dirty="0" smtClean="0"/>
+            <a:t>General web testing tools</a:t>
+          </a:r>
+          <a:endParaRPr lang="en-US" sz="1800" kern="1200" dirty="0"/>
+        </a:p>
+        <a:p>
+          <a:pPr marL="171450" lvl="1" indent="-171450" algn="l" defTabSz="800100">
+            <a:lnSpc>
+              <a:spcPct val="90000"/>
+            </a:lnSpc>
+            <a:spcBef>
+              <a:spcPct val="0"/>
+            </a:spcBef>
+            <a:spcAft>
+              <a:spcPct val="15000"/>
+            </a:spcAft>
+            <a:buChar char="••"/>
+          </a:pPr>
+          <a:r>
+            <a:rPr lang="en-US" sz="1800" kern="1200" dirty="0" smtClean="0"/>
+            <a:t>Find limitations</a:t>
+          </a:r>
+          <a:endParaRPr lang="en-US" sz="1800" kern="1200" dirty="0"/>
+        </a:p>
+        <a:p>
+          <a:pPr marL="171450" lvl="1" indent="-171450" algn="l" defTabSz="800100">
+            <a:lnSpc>
+              <a:spcPct val="90000"/>
+            </a:lnSpc>
+            <a:spcBef>
+              <a:spcPct val="0"/>
+            </a:spcBef>
+            <a:spcAft>
+              <a:spcPct val="15000"/>
+            </a:spcAft>
+            <a:buChar char="••"/>
+          </a:pPr>
+          <a:r>
+            <a:rPr lang="en-US" sz="1800" kern="1200" dirty="0" smtClean="0"/>
+            <a:t>Gather requirements for improvements</a:t>
+          </a:r>
+          <a:endParaRPr lang="en-US" sz="1800" kern="1200" dirty="0"/>
+        </a:p>
+      </dsp:txBody>
+      <dsp:txXfrm rot="5400000">
+        <a:off x="3335" y="790536"/>
+        <a:ext cx="2937415" cy="2371609"/>
+      </dsp:txXfrm>
+    </dsp:sp>
+    <dsp:sp modelId="{4A2757D9-EA3E-4300-9C07-77EBA31E4FE6}">
+      <dsp:nvSpPr>
+        <dsp:cNvPr id="0" name=""/>
+        <dsp:cNvSpPr/>
+      </dsp:nvSpPr>
+      <dsp:spPr>
+        <a:xfrm rot="16200000">
+          <a:off x="2561388" y="587663"/>
+          <a:ext cx="3952683" cy="2777356"/>
+        </a:xfrm>
+        <a:prstGeom prst="flowChartManualOperation">
+          <a:avLst/>
+        </a:prstGeom>
+        <a:noFill/>
+        <a:ln>
+          <a:noFill/>
+        </a:ln>
+        <a:effectLst>
+          <a:outerShdw blurRad="50800" dist="38100" dir="5400000" rotWithShape="0">
+            <a:srgbClr val="000000">
+              <a:alpha val="60000"/>
+            </a:srgbClr>
+          </a:outerShdw>
+        </a:effectLst>
+      </dsp:spPr>
+      <dsp:style>
+        <a:lnRef idx="0">
+          <a:scrgbClr r="0" g="0" b="0"/>
+        </a:lnRef>
+        <a:fillRef idx="3">
+          <a:scrgbClr r="0" g="0" b="0"/>
+        </a:fillRef>
+        <a:effectRef idx="3">
+          <a:scrgbClr r="0" g="0" b="0"/>
+        </a:effectRef>
+        <a:fontRef idx="minor">
+          <a:schemeClr val="lt1"/>
+        </a:fontRef>
+      </dsp:style>
+      <dsp:txBody>
+        <a:bodyPr spcFirstLastPara="0" vert="horz" wrap="square" lIns="412750" tIns="0" rIns="412750" bIns="0" numCol="1" spcCol="1270" anchor="ctr" anchorCtr="0">
+          <a:noAutofit/>
+        </a:bodyPr>
+        <a:lstStyle/>
+        <a:p>
+          <a:pPr lvl="0" algn="ctr" defTabSz="2889250">
+            <a:lnSpc>
+              <a:spcPct val="90000"/>
+            </a:lnSpc>
+            <a:spcBef>
+              <a:spcPct val="0"/>
+            </a:spcBef>
+            <a:spcAft>
+              <a:spcPct val="35000"/>
+            </a:spcAft>
+          </a:pPr>
+          <a:endParaRPr lang="en-US" sz="6500" kern="1200" dirty="0"/>
+        </a:p>
+      </dsp:txBody>
+      <dsp:txXfrm rot="5400000">
+        <a:off x="3149052" y="790536"/>
+        <a:ext cx="2777356" cy="2371609"/>
+      </dsp:txXfrm>
+    </dsp:sp>
+    <dsp:sp modelId="{CB3970F5-4B46-4D03-9416-FEB9FF6AB152}">
+      <dsp:nvSpPr>
+        <dsp:cNvPr id="0" name=""/>
+        <dsp:cNvSpPr/>
+      </dsp:nvSpPr>
+      <dsp:spPr>
+        <a:xfrm rot="16200000">
+          <a:off x="5547045" y="587663"/>
+          <a:ext cx="3952683" cy="2777356"/>
+        </a:xfrm>
+        <a:prstGeom prst="flowChartManualOperation">
+          <a:avLst/>
+        </a:prstGeom>
+        <a:noFill/>
+        <a:ln>
+          <a:noFill/>
+        </a:ln>
+        <a:effectLst>
+          <a:outerShdw blurRad="50800" dist="38100" dir="5400000" rotWithShape="0">
+            <a:srgbClr val="000000">
+              <a:alpha val="60000"/>
+            </a:srgbClr>
+          </a:outerShdw>
+        </a:effectLst>
+      </dsp:spPr>
+      <dsp:style>
+        <a:lnRef idx="0">
+          <a:scrgbClr r="0" g="0" b="0"/>
+        </a:lnRef>
+        <a:fillRef idx="3">
+          <a:scrgbClr r="0" g="0" b="0"/>
+        </a:fillRef>
+        <a:effectRef idx="3">
+          <a:scrgbClr r="0" g="0" b="0"/>
+        </a:effectRef>
+        <a:fontRef idx="minor">
+          <a:schemeClr val="lt1"/>
+        </a:fontRef>
+      </dsp:style>
+      <dsp:txBody>
+        <a:bodyPr spcFirstLastPara="0" vert="horz" wrap="square" lIns="412750" tIns="0" rIns="412750" bIns="0" numCol="1" spcCol="1270" anchor="ctr" anchorCtr="0">
+          <a:noAutofit/>
+        </a:bodyPr>
+        <a:lstStyle/>
+        <a:p>
+          <a:pPr lvl="0" algn="ctr" defTabSz="2889250">
+            <a:lnSpc>
+              <a:spcPct val="90000"/>
+            </a:lnSpc>
+            <a:spcBef>
+              <a:spcPct val="0"/>
+            </a:spcBef>
+            <a:spcAft>
+              <a:spcPct val="35000"/>
+            </a:spcAft>
+          </a:pPr>
+          <a:endParaRPr lang="en-US" sz="6500" kern="1200" dirty="0"/>
+        </a:p>
+      </dsp:txBody>
+      <dsp:txXfrm rot="5400000">
+        <a:off x="6134709" y="790536"/>
+        <a:ext cx="2777356" cy="2371609"/>
+      </dsp:txXfrm>
+    </dsp:sp>
   </dsp:spTree>
 </dsp:drawing>
 </file>
@@ -7245,6 +7543,372 @@
       <dsp:cNvGrpSpPr/>
     </dsp:nvGrpSpPr>
     <dsp:grpSpPr/>
+    <dsp:sp modelId="{475E8E10-321D-43CB-9FBE-E21B12C6A7FB}">
+      <dsp:nvSpPr>
+        <dsp:cNvPr id="0" name=""/>
+        <dsp:cNvSpPr/>
+      </dsp:nvSpPr>
+      <dsp:spPr>
+        <a:xfrm rot="16200000">
+          <a:off x="-506828" y="507917"/>
+          <a:ext cx="3845429" cy="2829594"/>
+        </a:xfrm>
+        <a:prstGeom prst="flowChartManualOperation">
+          <a:avLst/>
+        </a:prstGeom>
+        <a:gradFill rotWithShape="0">
+          <a:gsLst>
+            <a:gs pos="0">
+              <a:schemeClr val="accent1">
+                <a:shade val="80000"/>
+                <a:hueOff val="0"/>
+                <a:satOff val="0"/>
+                <a:lumOff val="0"/>
+                <a:alphaOff val="0"/>
+                <a:tint val="96000"/>
+                <a:lumMod val="104000"/>
+              </a:schemeClr>
+            </a:gs>
+            <a:gs pos="100000">
+              <a:schemeClr val="accent1">
+                <a:shade val="80000"/>
+                <a:hueOff val="0"/>
+                <a:satOff val="0"/>
+                <a:lumOff val="0"/>
+                <a:alphaOff val="0"/>
+                <a:shade val="98000"/>
+                <a:lumMod val="94000"/>
+              </a:schemeClr>
+            </a:gs>
+          </a:gsLst>
+          <a:lin ang="5400000" scaled="0"/>
+        </a:gradFill>
+        <a:ln>
+          <a:noFill/>
+        </a:ln>
+        <a:effectLst>
+          <a:outerShdw blurRad="50800" dist="38100" dir="5400000" rotWithShape="0">
+            <a:srgbClr val="000000">
+              <a:alpha val="60000"/>
+            </a:srgbClr>
+          </a:outerShdw>
+        </a:effectLst>
+      </dsp:spPr>
+      <dsp:style>
+        <a:lnRef idx="0">
+          <a:scrgbClr r="0" g="0" b="0"/>
+        </a:lnRef>
+        <a:fillRef idx="3">
+          <a:scrgbClr r="0" g="0" b="0"/>
+        </a:fillRef>
+        <a:effectRef idx="3">
+          <a:scrgbClr r="0" g="0" b="0"/>
+        </a:effectRef>
+        <a:fontRef idx="minor">
+          <a:schemeClr val="lt1"/>
+        </a:fontRef>
+      </dsp:style>
+      <dsp:txBody>
+        <a:bodyPr spcFirstLastPara="0" vert="horz" wrap="square" lIns="133350" tIns="0" rIns="134476" bIns="0" numCol="1" spcCol="1270" anchor="t" anchorCtr="0">
+          <a:noAutofit/>
+        </a:bodyPr>
+        <a:lstStyle/>
+        <a:p>
+          <a:pPr lvl="0" algn="l" defTabSz="933450">
+            <a:lnSpc>
+              <a:spcPct val="90000"/>
+            </a:lnSpc>
+            <a:spcBef>
+              <a:spcPct val="0"/>
+            </a:spcBef>
+            <a:spcAft>
+              <a:spcPct val="35000"/>
+            </a:spcAft>
+          </a:pPr>
+          <a:r>
+            <a:rPr lang="en-US" sz="2100" kern="1200" dirty="0" smtClean="0"/>
+            <a:t>Analyze</a:t>
+          </a:r>
+          <a:endParaRPr lang="en-US" sz="2100" kern="1200" dirty="0"/>
+        </a:p>
+        <a:p>
+          <a:pPr marL="171450" lvl="1" indent="-171450" algn="l" defTabSz="711200">
+            <a:lnSpc>
+              <a:spcPct val="90000"/>
+            </a:lnSpc>
+            <a:spcBef>
+              <a:spcPct val="0"/>
+            </a:spcBef>
+            <a:spcAft>
+              <a:spcPct val="15000"/>
+            </a:spcAft>
+            <a:buChar char="••"/>
+          </a:pPr>
+          <a:r>
+            <a:rPr lang="en-US" sz="1600" kern="1200" dirty="0" smtClean="0"/>
+            <a:t>Testing tools for responsive design</a:t>
+          </a:r>
+          <a:endParaRPr lang="en-US" sz="1600" kern="1200" dirty="0"/>
+        </a:p>
+        <a:p>
+          <a:pPr marL="171450" lvl="1" indent="-171450" algn="l" defTabSz="711200">
+            <a:lnSpc>
+              <a:spcPct val="90000"/>
+            </a:lnSpc>
+            <a:spcBef>
+              <a:spcPct val="0"/>
+            </a:spcBef>
+            <a:spcAft>
+              <a:spcPct val="15000"/>
+            </a:spcAft>
+            <a:buChar char="••"/>
+          </a:pPr>
+          <a:r>
+            <a:rPr lang="en-US" sz="1600" kern="1200" dirty="0" smtClean="0"/>
+            <a:t>General web testing tools</a:t>
+          </a:r>
+          <a:endParaRPr lang="en-US" sz="1600" kern="1200" dirty="0"/>
+        </a:p>
+        <a:p>
+          <a:pPr marL="171450" lvl="1" indent="-171450" algn="l" defTabSz="711200">
+            <a:lnSpc>
+              <a:spcPct val="90000"/>
+            </a:lnSpc>
+            <a:spcBef>
+              <a:spcPct val="0"/>
+            </a:spcBef>
+            <a:spcAft>
+              <a:spcPct val="15000"/>
+            </a:spcAft>
+            <a:buChar char="••"/>
+          </a:pPr>
+          <a:r>
+            <a:rPr lang="en-US" sz="1600" kern="1200" dirty="0" smtClean="0"/>
+            <a:t>Find limitations</a:t>
+          </a:r>
+          <a:endParaRPr lang="en-US" sz="1600" kern="1200" dirty="0"/>
+        </a:p>
+        <a:p>
+          <a:pPr marL="171450" lvl="1" indent="-171450" algn="l" defTabSz="711200">
+            <a:lnSpc>
+              <a:spcPct val="90000"/>
+            </a:lnSpc>
+            <a:spcBef>
+              <a:spcPct val="0"/>
+            </a:spcBef>
+            <a:spcAft>
+              <a:spcPct val="15000"/>
+            </a:spcAft>
+            <a:buChar char="••"/>
+          </a:pPr>
+          <a:r>
+            <a:rPr lang="en-US" sz="1600" kern="1200" dirty="0" smtClean="0"/>
+            <a:t>Gather requirements for improvements</a:t>
+          </a:r>
+          <a:endParaRPr lang="en-US" sz="1600" kern="1200" dirty="0"/>
+        </a:p>
+      </dsp:txBody>
+      <dsp:txXfrm rot="5400000">
+        <a:off x="1090" y="769085"/>
+        <a:ext cx="2829594" cy="2307257"/>
+      </dsp:txXfrm>
+    </dsp:sp>
+    <dsp:sp modelId="{4A2757D9-EA3E-4300-9C07-77EBA31E4FE6}">
+      <dsp:nvSpPr>
+        <dsp:cNvPr id="0" name=""/>
+        <dsp:cNvSpPr/>
+      </dsp:nvSpPr>
+      <dsp:spPr>
+        <a:xfrm rot="16200000">
+          <a:off x="2534985" y="507917"/>
+          <a:ext cx="3845429" cy="2829594"/>
+        </a:xfrm>
+        <a:prstGeom prst="flowChartManualOperation">
+          <a:avLst/>
+        </a:prstGeom>
+        <a:gradFill rotWithShape="0">
+          <a:gsLst>
+            <a:gs pos="0">
+              <a:schemeClr val="accent1">
+                <a:shade val="80000"/>
+                <a:hueOff val="164162"/>
+                <a:satOff val="-7062"/>
+                <a:lumOff val="14007"/>
+                <a:alphaOff val="0"/>
+                <a:tint val="96000"/>
+                <a:lumMod val="104000"/>
+              </a:schemeClr>
+            </a:gs>
+            <a:gs pos="100000">
+              <a:schemeClr val="accent1">
+                <a:shade val="80000"/>
+                <a:hueOff val="164162"/>
+                <a:satOff val="-7062"/>
+                <a:lumOff val="14007"/>
+                <a:alphaOff val="0"/>
+                <a:shade val="98000"/>
+                <a:lumMod val="94000"/>
+              </a:schemeClr>
+            </a:gs>
+          </a:gsLst>
+          <a:lin ang="5400000" scaled="0"/>
+        </a:gradFill>
+        <a:ln>
+          <a:noFill/>
+        </a:ln>
+        <a:effectLst>
+          <a:outerShdw blurRad="50800" dist="38100" dir="5400000" rotWithShape="0">
+            <a:srgbClr val="000000">
+              <a:alpha val="60000"/>
+            </a:srgbClr>
+          </a:outerShdw>
+        </a:effectLst>
+      </dsp:spPr>
+      <dsp:style>
+        <a:lnRef idx="0">
+          <a:scrgbClr r="0" g="0" b="0"/>
+        </a:lnRef>
+        <a:fillRef idx="3">
+          <a:scrgbClr r="0" g="0" b="0"/>
+        </a:fillRef>
+        <a:effectRef idx="3">
+          <a:scrgbClr r="0" g="0" b="0"/>
+        </a:effectRef>
+        <a:fontRef idx="minor">
+          <a:schemeClr val="lt1"/>
+        </a:fontRef>
+      </dsp:style>
+      <dsp:txBody>
+        <a:bodyPr spcFirstLastPara="0" vert="horz" wrap="square" lIns="133350" tIns="0" rIns="134476" bIns="0" numCol="1" spcCol="1270" anchor="t" anchorCtr="0">
+          <a:noAutofit/>
+        </a:bodyPr>
+        <a:lstStyle/>
+        <a:p>
+          <a:pPr lvl="0" algn="l" defTabSz="933450">
+            <a:lnSpc>
+              <a:spcPct val="90000"/>
+            </a:lnSpc>
+            <a:spcBef>
+              <a:spcPct val="0"/>
+            </a:spcBef>
+            <a:spcAft>
+              <a:spcPct val="35000"/>
+            </a:spcAft>
+          </a:pPr>
+          <a:r>
+            <a:rPr lang="en-US" sz="2100" kern="1200" dirty="0" smtClean="0"/>
+            <a:t>Design and Implement</a:t>
+          </a:r>
+          <a:endParaRPr lang="en-US" sz="2100" kern="1200" dirty="0"/>
+        </a:p>
+        <a:p>
+          <a:pPr marL="171450" lvl="1" indent="-171450" algn="l" defTabSz="711200">
+            <a:lnSpc>
+              <a:spcPct val="90000"/>
+            </a:lnSpc>
+            <a:spcBef>
+              <a:spcPct val="0"/>
+            </a:spcBef>
+            <a:spcAft>
+              <a:spcPct val="15000"/>
+            </a:spcAft>
+            <a:buChar char="••"/>
+          </a:pPr>
+          <a:r>
+            <a:rPr lang="en-US" sz="1600" kern="1200" dirty="0" smtClean="0"/>
+            <a:t>Set of tools for simplifying cross-device application testing</a:t>
+          </a:r>
+          <a:endParaRPr lang="en-US" sz="1600" kern="1200" dirty="0"/>
+        </a:p>
+        <a:p>
+          <a:pPr marL="171450" lvl="1" indent="-171450" algn="l" defTabSz="711200">
+            <a:lnSpc>
+              <a:spcPct val="90000"/>
+            </a:lnSpc>
+            <a:spcBef>
+              <a:spcPct val="0"/>
+            </a:spcBef>
+            <a:spcAft>
+              <a:spcPct val="15000"/>
+            </a:spcAft>
+            <a:buChar char="••"/>
+          </a:pPr>
+          <a:r>
+            <a:rPr lang="en-US" sz="1600" kern="1200" dirty="0" smtClean="0"/>
+            <a:t>Based on requirements gathered during analysis</a:t>
+          </a:r>
+          <a:endParaRPr lang="en-US" sz="1600" kern="1200" dirty="0"/>
+        </a:p>
+      </dsp:txBody>
+      <dsp:txXfrm rot="5400000">
+        <a:off x="3042903" y="769085"/>
+        <a:ext cx="2829594" cy="2307257"/>
+      </dsp:txXfrm>
+    </dsp:sp>
+    <dsp:sp modelId="{CB3970F5-4B46-4D03-9416-FEB9FF6AB152}">
+      <dsp:nvSpPr>
+        <dsp:cNvPr id="0" name=""/>
+        <dsp:cNvSpPr/>
+      </dsp:nvSpPr>
+      <dsp:spPr>
+        <a:xfrm rot="16200000">
+          <a:off x="5576799" y="507917"/>
+          <a:ext cx="3845429" cy="2829594"/>
+        </a:xfrm>
+        <a:prstGeom prst="flowChartManualOperation">
+          <a:avLst/>
+        </a:prstGeom>
+        <a:noFill/>
+        <a:ln>
+          <a:noFill/>
+        </a:ln>
+        <a:effectLst>
+          <a:outerShdw blurRad="50800" dist="38100" dir="5400000" rotWithShape="0">
+            <a:srgbClr val="000000">
+              <a:alpha val="60000"/>
+            </a:srgbClr>
+          </a:outerShdw>
+        </a:effectLst>
+      </dsp:spPr>
+      <dsp:style>
+        <a:lnRef idx="0">
+          <a:scrgbClr r="0" g="0" b="0"/>
+        </a:lnRef>
+        <a:fillRef idx="3">
+          <a:scrgbClr r="0" g="0" b="0"/>
+        </a:fillRef>
+        <a:effectRef idx="3">
+          <a:scrgbClr r="0" g="0" b="0"/>
+        </a:effectRef>
+        <a:fontRef idx="minor">
+          <a:schemeClr val="lt1"/>
+        </a:fontRef>
+      </dsp:style>
+      <dsp:txBody>
+        <a:bodyPr spcFirstLastPara="0" vert="horz" wrap="square" lIns="133350" tIns="0" rIns="134476" bIns="0" numCol="1" spcCol="1270" anchor="ctr" anchorCtr="0">
+          <a:noAutofit/>
+        </a:bodyPr>
+        <a:lstStyle/>
+        <a:p>
+          <a:pPr lvl="0" algn="ctr" defTabSz="933450">
+            <a:lnSpc>
+              <a:spcPct val="90000"/>
+            </a:lnSpc>
+            <a:spcBef>
+              <a:spcPct val="0"/>
+            </a:spcBef>
+            <a:spcAft>
+              <a:spcPct val="35000"/>
+            </a:spcAft>
+          </a:pPr>
+          <a:endParaRPr lang="en-US" sz="2100" kern="1200" dirty="0"/>
+        </a:p>
+      </dsp:txBody>
+      <dsp:txXfrm rot="5400000">
+        <a:off x="6084717" y="769085"/>
+        <a:ext cx="2829594" cy="2307257"/>
+      </dsp:txXfrm>
+    </dsp:sp>
   </dsp:spTree>
 </dsp:drawing>
 </file>
@@ -7257,6 +7921,421 @@
       <dsp:cNvGrpSpPr/>
     </dsp:nvGrpSpPr>
     <dsp:grpSpPr/>
+    <dsp:sp modelId="{475E8E10-321D-43CB-9FBE-E21B12C6A7FB}">
+      <dsp:nvSpPr>
+        <dsp:cNvPr id="0" name=""/>
+        <dsp:cNvSpPr/>
+      </dsp:nvSpPr>
+      <dsp:spPr>
+        <a:xfrm rot="16200000">
+          <a:off x="-506828" y="507917"/>
+          <a:ext cx="3845429" cy="2829594"/>
+        </a:xfrm>
+        <a:prstGeom prst="flowChartManualOperation">
+          <a:avLst/>
+        </a:prstGeom>
+        <a:gradFill rotWithShape="0">
+          <a:gsLst>
+            <a:gs pos="0">
+              <a:schemeClr val="accent1">
+                <a:shade val="80000"/>
+                <a:hueOff val="0"/>
+                <a:satOff val="0"/>
+                <a:lumOff val="0"/>
+                <a:alphaOff val="0"/>
+                <a:tint val="96000"/>
+                <a:lumMod val="104000"/>
+              </a:schemeClr>
+            </a:gs>
+            <a:gs pos="100000">
+              <a:schemeClr val="accent1">
+                <a:shade val="80000"/>
+                <a:hueOff val="0"/>
+                <a:satOff val="0"/>
+                <a:lumOff val="0"/>
+                <a:alphaOff val="0"/>
+                <a:shade val="98000"/>
+                <a:lumMod val="94000"/>
+              </a:schemeClr>
+            </a:gs>
+          </a:gsLst>
+          <a:lin ang="5400000" scaled="0"/>
+        </a:gradFill>
+        <a:ln>
+          <a:noFill/>
+        </a:ln>
+        <a:effectLst>
+          <a:outerShdw blurRad="50800" dist="38100" dir="5400000" rotWithShape="0">
+            <a:srgbClr val="000000">
+              <a:alpha val="60000"/>
+            </a:srgbClr>
+          </a:outerShdw>
+        </a:effectLst>
+      </dsp:spPr>
+      <dsp:style>
+        <a:lnRef idx="0">
+          <a:scrgbClr r="0" g="0" b="0"/>
+        </a:lnRef>
+        <a:fillRef idx="3">
+          <a:scrgbClr r="0" g="0" b="0"/>
+        </a:fillRef>
+        <a:effectRef idx="3">
+          <a:scrgbClr r="0" g="0" b="0"/>
+        </a:effectRef>
+        <a:fontRef idx="minor">
+          <a:schemeClr val="lt1"/>
+        </a:fontRef>
+      </dsp:style>
+      <dsp:txBody>
+        <a:bodyPr spcFirstLastPara="0" vert="horz" wrap="square" lIns="133350" tIns="0" rIns="134476" bIns="0" numCol="1" spcCol="1270" anchor="t" anchorCtr="0">
+          <a:noAutofit/>
+        </a:bodyPr>
+        <a:lstStyle/>
+        <a:p>
+          <a:pPr lvl="0" algn="l" defTabSz="933450">
+            <a:lnSpc>
+              <a:spcPct val="90000"/>
+            </a:lnSpc>
+            <a:spcBef>
+              <a:spcPct val="0"/>
+            </a:spcBef>
+            <a:spcAft>
+              <a:spcPct val="35000"/>
+            </a:spcAft>
+          </a:pPr>
+          <a:r>
+            <a:rPr lang="en-US" sz="2100" kern="1200" dirty="0" smtClean="0"/>
+            <a:t>Analyze</a:t>
+          </a:r>
+          <a:endParaRPr lang="en-US" sz="2100" kern="1200" dirty="0"/>
+        </a:p>
+        <a:p>
+          <a:pPr marL="171450" lvl="1" indent="-171450" algn="l" defTabSz="711200">
+            <a:lnSpc>
+              <a:spcPct val="90000"/>
+            </a:lnSpc>
+            <a:spcBef>
+              <a:spcPct val="0"/>
+            </a:spcBef>
+            <a:spcAft>
+              <a:spcPct val="15000"/>
+            </a:spcAft>
+            <a:buChar char="••"/>
+          </a:pPr>
+          <a:r>
+            <a:rPr lang="en-US" sz="1600" kern="1200" dirty="0" smtClean="0"/>
+            <a:t>Testing tools for responsive design</a:t>
+          </a:r>
+          <a:endParaRPr lang="en-US" sz="1600" kern="1200" dirty="0"/>
+        </a:p>
+        <a:p>
+          <a:pPr marL="171450" lvl="1" indent="-171450" algn="l" defTabSz="711200">
+            <a:lnSpc>
+              <a:spcPct val="90000"/>
+            </a:lnSpc>
+            <a:spcBef>
+              <a:spcPct val="0"/>
+            </a:spcBef>
+            <a:spcAft>
+              <a:spcPct val="15000"/>
+            </a:spcAft>
+            <a:buChar char="••"/>
+          </a:pPr>
+          <a:r>
+            <a:rPr lang="en-US" sz="1600" kern="1200" dirty="0" smtClean="0"/>
+            <a:t>General web testing tools</a:t>
+          </a:r>
+          <a:endParaRPr lang="en-US" sz="1600" kern="1200" dirty="0"/>
+        </a:p>
+        <a:p>
+          <a:pPr marL="171450" lvl="1" indent="-171450" algn="l" defTabSz="711200">
+            <a:lnSpc>
+              <a:spcPct val="90000"/>
+            </a:lnSpc>
+            <a:spcBef>
+              <a:spcPct val="0"/>
+            </a:spcBef>
+            <a:spcAft>
+              <a:spcPct val="15000"/>
+            </a:spcAft>
+            <a:buChar char="••"/>
+          </a:pPr>
+          <a:r>
+            <a:rPr lang="en-US" sz="1600" kern="1200" dirty="0" smtClean="0"/>
+            <a:t>Find limitations</a:t>
+          </a:r>
+          <a:endParaRPr lang="en-US" sz="1600" kern="1200" dirty="0"/>
+        </a:p>
+        <a:p>
+          <a:pPr marL="171450" lvl="1" indent="-171450" algn="l" defTabSz="711200">
+            <a:lnSpc>
+              <a:spcPct val="90000"/>
+            </a:lnSpc>
+            <a:spcBef>
+              <a:spcPct val="0"/>
+            </a:spcBef>
+            <a:spcAft>
+              <a:spcPct val="15000"/>
+            </a:spcAft>
+            <a:buChar char="••"/>
+          </a:pPr>
+          <a:r>
+            <a:rPr lang="en-US" sz="1600" kern="1200" dirty="0" smtClean="0"/>
+            <a:t>Gather requirements for improvements</a:t>
+          </a:r>
+          <a:endParaRPr lang="en-US" sz="1600" kern="1200" dirty="0"/>
+        </a:p>
+      </dsp:txBody>
+      <dsp:txXfrm rot="5400000">
+        <a:off x="1090" y="769085"/>
+        <a:ext cx="2829594" cy="2307257"/>
+      </dsp:txXfrm>
+    </dsp:sp>
+    <dsp:sp modelId="{4A2757D9-EA3E-4300-9C07-77EBA31E4FE6}">
+      <dsp:nvSpPr>
+        <dsp:cNvPr id="0" name=""/>
+        <dsp:cNvSpPr/>
+      </dsp:nvSpPr>
+      <dsp:spPr>
+        <a:xfrm rot="16200000">
+          <a:off x="2534985" y="507917"/>
+          <a:ext cx="3845429" cy="2829594"/>
+        </a:xfrm>
+        <a:prstGeom prst="flowChartManualOperation">
+          <a:avLst/>
+        </a:prstGeom>
+        <a:gradFill rotWithShape="0">
+          <a:gsLst>
+            <a:gs pos="0">
+              <a:schemeClr val="accent1">
+                <a:shade val="80000"/>
+                <a:hueOff val="164162"/>
+                <a:satOff val="-7062"/>
+                <a:lumOff val="14007"/>
+                <a:alphaOff val="0"/>
+                <a:tint val="96000"/>
+                <a:lumMod val="104000"/>
+              </a:schemeClr>
+            </a:gs>
+            <a:gs pos="100000">
+              <a:schemeClr val="accent1">
+                <a:shade val="80000"/>
+                <a:hueOff val="164162"/>
+                <a:satOff val="-7062"/>
+                <a:lumOff val="14007"/>
+                <a:alphaOff val="0"/>
+                <a:shade val="98000"/>
+                <a:lumMod val="94000"/>
+              </a:schemeClr>
+            </a:gs>
+          </a:gsLst>
+          <a:lin ang="5400000" scaled="0"/>
+        </a:gradFill>
+        <a:ln>
+          <a:noFill/>
+        </a:ln>
+        <a:effectLst>
+          <a:outerShdw blurRad="50800" dist="38100" dir="5400000" rotWithShape="0">
+            <a:srgbClr val="000000">
+              <a:alpha val="60000"/>
+            </a:srgbClr>
+          </a:outerShdw>
+        </a:effectLst>
+      </dsp:spPr>
+      <dsp:style>
+        <a:lnRef idx="0">
+          <a:scrgbClr r="0" g="0" b="0"/>
+        </a:lnRef>
+        <a:fillRef idx="3">
+          <a:scrgbClr r="0" g="0" b="0"/>
+        </a:fillRef>
+        <a:effectRef idx="3">
+          <a:scrgbClr r="0" g="0" b="0"/>
+        </a:effectRef>
+        <a:fontRef idx="minor">
+          <a:schemeClr val="lt1"/>
+        </a:fontRef>
+      </dsp:style>
+      <dsp:txBody>
+        <a:bodyPr spcFirstLastPara="0" vert="horz" wrap="square" lIns="133350" tIns="0" rIns="134476" bIns="0" numCol="1" spcCol="1270" anchor="t" anchorCtr="0">
+          <a:noAutofit/>
+        </a:bodyPr>
+        <a:lstStyle/>
+        <a:p>
+          <a:pPr lvl="0" algn="l" defTabSz="933450">
+            <a:lnSpc>
+              <a:spcPct val="90000"/>
+            </a:lnSpc>
+            <a:spcBef>
+              <a:spcPct val="0"/>
+            </a:spcBef>
+            <a:spcAft>
+              <a:spcPct val="35000"/>
+            </a:spcAft>
+          </a:pPr>
+          <a:r>
+            <a:rPr lang="en-US" sz="2100" kern="1200" dirty="0" smtClean="0"/>
+            <a:t>Design and Implement</a:t>
+          </a:r>
+          <a:endParaRPr lang="en-US" sz="2100" kern="1200" dirty="0"/>
+        </a:p>
+        <a:p>
+          <a:pPr marL="171450" lvl="1" indent="-171450" algn="l" defTabSz="711200">
+            <a:lnSpc>
+              <a:spcPct val="90000"/>
+            </a:lnSpc>
+            <a:spcBef>
+              <a:spcPct val="0"/>
+            </a:spcBef>
+            <a:spcAft>
+              <a:spcPct val="15000"/>
+            </a:spcAft>
+            <a:buChar char="••"/>
+          </a:pPr>
+          <a:r>
+            <a:rPr lang="en-US" sz="1600" kern="1200" dirty="0" smtClean="0"/>
+            <a:t>Set of tools for simplifying cross-device application testing</a:t>
+          </a:r>
+          <a:endParaRPr lang="en-US" sz="1600" kern="1200" dirty="0"/>
+        </a:p>
+        <a:p>
+          <a:pPr marL="171450" lvl="1" indent="-171450" algn="l" defTabSz="711200">
+            <a:lnSpc>
+              <a:spcPct val="90000"/>
+            </a:lnSpc>
+            <a:spcBef>
+              <a:spcPct val="0"/>
+            </a:spcBef>
+            <a:spcAft>
+              <a:spcPct val="15000"/>
+            </a:spcAft>
+            <a:buChar char="••"/>
+          </a:pPr>
+          <a:r>
+            <a:rPr lang="en-US" sz="1600" kern="1200" dirty="0" smtClean="0"/>
+            <a:t>Based on requirements gathered during analysis</a:t>
+          </a:r>
+          <a:endParaRPr lang="en-US" sz="1600" kern="1200" dirty="0"/>
+        </a:p>
+      </dsp:txBody>
+      <dsp:txXfrm rot="5400000">
+        <a:off x="3042903" y="769085"/>
+        <a:ext cx="2829594" cy="2307257"/>
+      </dsp:txXfrm>
+    </dsp:sp>
+    <dsp:sp modelId="{CB3970F5-4B46-4D03-9416-FEB9FF6AB152}">
+      <dsp:nvSpPr>
+        <dsp:cNvPr id="0" name=""/>
+        <dsp:cNvSpPr/>
+      </dsp:nvSpPr>
+      <dsp:spPr>
+        <a:xfrm rot="16200000">
+          <a:off x="5576799" y="507917"/>
+          <a:ext cx="3845429" cy="2829594"/>
+        </a:xfrm>
+        <a:prstGeom prst="flowChartManualOperation">
+          <a:avLst/>
+        </a:prstGeom>
+        <a:gradFill rotWithShape="0">
+          <a:gsLst>
+            <a:gs pos="0">
+              <a:schemeClr val="accent1">
+                <a:shade val="80000"/>
+                <a:hueOff val="328325"/>
+                <a:satOff val="-14124"/>
+                <a:lumOff val="28014"/>
+                <a:alphaOff val="0"/>
+                <a:tint val="96000"/>
+                <a:lumMod val="104000"/>
+              </a:schemeClr>
+            </a:gs>
+            <a:gs pos="100000">
+              <a:schemeClr val="accent1">
+                <a:shade val="80000"/>
+                <a:hueOff val="328325"/>
+                <a:satOff val="-14124"/>
+                <a:lumOff val="28014"/>
+                <a:alphaOff val="0"/>
+                <a:shade val="98000"/>
+                <a:lumMod val="94000"/>
+              </a:schemeClr>
+            </a:gs>
+          </a:gsLst>
+          <a:lin ang="5400000" scaled="0"/>
+        </a:gradFill>
+        <a:ln>
+          <a:noFill/>
+        </a:ln>
+        <a:effectLst>
+          <a:outerShdw blurRad="50800" dist="38100" dir="5400000" rotWithShape="0">
+            <a:srgbClr val="000000">
+              <a:alpha val="60000"/>
+            </a:srgbClr>
+          </a:outerShdw>
+        </a:effectLst>
+      </dsp:spPr>
+      <dsp:style>
+        <a:lnRef idx="0">
+          <a:scrgbClr r="0" g="0" b="0"/>
+        </a:lnRef>
+        <a:fillRef idx="3">
+          <a:scrgbClr r="0" g="0" b="0"/>
+        </a:fillRef>
+        <a:effectRef idx="3">
+          <a:scrgbClr r="0" g="0" b="0"/>
+        </a:effectRef>
+        <a:fontRef idx="minor">
+          <a:schemeClr val="lt1"/>
+        </a:fontRef>
+      </dsp:style>
+      <dsp:txBody>
+        <a:bodyPr spcFirstLastPara="0" vert="horz" wrap="square" lIns="133350" tIns="0" rIns="134476" bIns="0" numCol="1" spcCol="1270" anchor="t" anchorCtr="0">
+          <a:noAutofit/>
+        </a:bodyPr>
+        <a:lstStyle/>
+        <a:p>
+          <a:pPr lvl="0" algn="l" defTabSz="933450">
+            <a:lnSpc>
+              <a:spcPct val="90000"/>
+            </a:lnSpc>
+            <a:spcBef>
+              <a:spcPct val="0"/>
+            </a:spcBef>
+            <a:spcAft>
+              <a:spcPct val="35000"/>
+            </a:spcAft>
+          </a:pPr>
+          <a:r>
+            <a:rPr lang="en-US" sz="2100" kern="1200" dirty="0" smtClean="0"/>
+            <a:t>User Study</a:t>
+          </a:r>
+          <a:endParaRPr lang="en-US" sz="2100" kern="1200" dirty="0"/>
+        </a:p>
+        <a:p>
+          <a:pPr marL="171450" lvl="1" indent="-171450" algn="l" defTabSz="711200">
+            <a:lnSpc>
+              <a:spcPct val="90000"/>
+            </a:lnSpc>
+            <a:spcBef>
+              <a:spcPct val="0"/>
+            </a:spcBef>
+            <a:spcAft>
+              <a:spcPct val="15000"/>
+            </a:spcAft>
+            <a:buChar char="••"/>
+          </a:pPr>
+          <a:r>
+            <a:rPr lang="en-US" sz="1600" kern="1200" dirty="0" smtClean="0"/>
+            <a:t>Test the suitability and quality of the tools</a:t>
+          </a:r>
+          <a:endParaRPr lang="en-US" sz="1600" kern="1200" dirty="0"/>
+        </a:p>
+      </dsp:txBody>
+      <dsp:txXfrm rot="5400000">
+        <a:off x="6084717" y="769085"/>
+        <a:ext cx="2829594" cy="2307257"/>
+      </dsp:txXfrm>
+    </dsp:sp>
   </dsp:spTree>
 </dsp:drawing>
 </file>
@@ -7269,6 +8348,698 @@
       <dsp:cNvGrpSpPr/>
     </dsp:nvGrpSpPr>
     <dsp:grpSpPr/>
+    <dsp:sp modelId="{9A525D47-14B2-4F0B-85D8-FD3EB0402421}">
+      <dsp:nvSpPr>
+        <dsp:cNvPr id="0" name=""/>
+        <dsp:cNvSpPr/>
+      </dsp:nvSpPr>
+      <dsp:spPr>
+        <a:xfrm rot="5400000">
+          <a:off x="360000" y="1077124"/>
+          <a:ext cx="945949" cy="1076930"/>
+        </a:xfrm>
+        <a:prstGeom prst="bentUpArrow">
+          <a:avLst>
+            <a:gd name="adj1" fmla="val 32840"/>
+            <a:gd name="adj2" fmla="val 25000"/>
+            <a:gd name="adj3" fmla="val 35780"/>
+          </a:avLst>
+        </a:prstGeom>
+        <a:solidFill>
+          <a:schemeClr val="accent1">
+            <a:tint val="50000"/>
+            <a:hueOff val="0"/>
+            <a:satOff val="0"/>
+            <a:lumOff val="0"/>
+            <a:alphaOff val="0"/>
+          </a:schemeClr>
+        </a:solidFill>
+        <a:ln w="15875" cap="rnd" cmpd="sng" algn="ctr">
+          <a:solidFill>
+            <a:schemeClr val="lt1">
+              <a:hueOff val="0"/>
+              <a:satOff val="0"/>
+              <a:lumOff val="0"/>
+              <a:alphaOff val="0"/>
+            </a:schemeClr>
+          </a:solidFill>
+          <a:prstDash val="solid"/>
+        </a:ln>
+        <a:effectLst/>
+      </dsp:spPr>
+      <dsp:style>
+        <a:lnRef idx="2">
+          <a:scrgbClr r="0" g="0" b="0"/>
+        </a:lnRef>
+        <a:fillRef idx="1">
+          <a:scrgbClr r="0" g="0" b="0"/>
+        </a:fillRef>
+        <a:effectRef idx="0">
+          <a:scrgbClr r="0" g="0" b="0"/>
+        </a:effectRef>
+        <a:fontRef idx="minor"/>
+      </dsp:style>
+    </dsp:sp>
+    <dsp:sp modelId="{2BE033E5-5E65-4ABF-9D27-5FFF8CF71BCD}">
+      <dsp:nvSpPr>
+        <dsp:cNvPr id="0" name=""/>
+        <dsp:cNvSpPr/>
+      </dsp:nvSpPr>
+      <dsp:spPr>
+        <a:xfrm>
+          <a:off x="7" y="28520"/>
+          <a:ext cx="1592422" cy="1114644"/>
+        </a:xfrm>
+        <a:prstGeom prst="roundRect">
+          <a:avLst>
+            <a:gd name="adj" fmla="val 16670"/>
+          </a:avLst>
+        </a:prstGeom>
+        <a:solidFill>
+          <a:schemeClr val="accent1">
+            <a:hueOff val="0"/>
+            <a:satOff val="0"/>
+            <a:lumOff val="0"/>
+            <a:alphaOff val="0"/>
+          </a:schemeClr>
+        </a:solidFill>
+        <a:ln w="15875" cap="rnd" cmpd="sng" algn="ctr">
+          <a:solidFill>
+            <a:schemeClr val="lt1">
+              <a:hueOff val="0"/>
+              <a:satOff val="0"/>
+              <a:lumOff val="0"/>
+              <a:alphaOff val="0"/>
+            </a:schemeClr>
+          </a:solidFill>
+          <a:prstDash val="solid"/>
+        </a:ln>
+        <a:effectLst/>
+      </dsp:spPr>
+      <dsp:style>
+        <a:lnRef idx="2">
+          <a:scrgbClr r="0" g="0" b="0"/>
+        </a:lnRef>
+        <a:fillRef idx="1">
+          <a:scrgbClr r="0" g="0" b="0"/>
+        </a:fillRef>
+        <a:effectRef idx="0">
+          <a:scrgbClr r="0" g="0" b="0"/>
+        </a:effectRef>
+        <a:fontRef idx="minor">
+          <a:schemeClr val="lt1"/>
+        </a:fontRef>
+      </dsp:style>
+      <dsp:txBody>
+        <a:bodyPr spcFirstLastPara="0" vert="horz" wrap="square" lIns="80010" tIns="80010" rIns="80010" bIns="80010" numCol="1" spcCol="1270" anchor="ctr" anchorCtr="0">
+          <a:noAutofit/>
+        </a:bodyPr>
+        <a:lstStyle/>
+        <a:p>
+          <a:pPr lvl="0" algn="ctr" defTabSz="933450">
+            <a:lnSpc>
+              <a:spcPct val="90000"/>
+            </a:lnSpc>
+            <a:spcBef>
+              <a:spcPct val="0"/>
+            </a:spcBef>
+            <a:spcAft>
+              <a:spcPct val="35000"/>
+            </a:spcAft>
+          </a:pPr>
+          <a:r>
+            <a:rPr lang="en-US" sz="2100" kern="1200" dirty="0" smtClean="0"/>
+            <a:t>Record sequence</a:t>
+          </a:r>
+          <a:endParaRPr lang="de-CH" sz="2100" kern="1200" dirty="0"/>
+        </a:p>
+      </dsp:txBody>
+      <dsp:txXfrm>
+        <a:off x="54429" y="82942"/>
+        <a:ext cx="1483578" cy="1005800"/>
+      </dsp:txXfrm>
+    </dsp:sp>
+    <dsp:sp modelId="{D4EFC377-AFF7-4383-8611-A4AC615569BE}">
+      <dsp:nvSpPr>
+        <dsp:cNvPr id="0" name=""/>
+        <dsp:cNvSpPr/>
+      </dsp:nvSpPr>
+      <dsp:spPr>
+        <a:xfrm>
+          <a:off x="1583995" y="140782"/>
+          <a:ext cx="2762331" cy="900904"/>
+        </a:xfrm>
+        <a:prstGeom prst="rect">
+          <a:avLst/>
+        </a:prstGeom>
+        <a:noFill/>
+        <a:ln>
+          <a:noFill/>
+        </a:ln>
+        <a:effectLst/>
+      </dsp:spPr>
+      <dsp:style>
+        <a:lnRef idx="0">
+          <a:scrgbClr r="0" g="0" b="0"/>
+        </a:lnRef>
+        <a:fillRef idx="0">
+          <a:scrgbClr r="0" g="0" b="0"/>
+        </a:fillRef>
+        <a:effectRef idx="0">
+          <a:scrgbClr r="0" g="0" b="0"/>
+        </a:effectRef>
+        <a:fontRef idx="minor"/>
+      </dsp:style>
+      <dsp:txBody>
+        <a:bodyPr spcFirstLastPara="0" vert="horz" wrap="square" lIns="68580" tIns="68580" rIns="68580" bIns="68580" numCol="1" spcCol="1270" anchor="ctr" anchorCtr="0">
+          <a:noAutofit/>
+        </a:bodyPr>
+        <a:lstStyle/>
+        <a:p>
+          <a:pPr marL="171450" lvl="1" indent="-171450" algn="l" defTabSz="800100">
+            <a:lnSpc>
+              <a:spcPct val="90000"/>
+            </a:lnSpc>
+            <a:spcBef>
+              <a:spcPct val="0"/>
+            </a:spcBef>
+            <a:spcAft>
+              <a:spcPct val="15000"/>
+            </a:spcAft>
+            <a:buChar char="••"/>
+          </a:pPr>
+          <a:r>
+            <a:rPr lang="en-US" sz="1800" kern="1200" dirty="0" smtClean="0"/>
+            <a:t>On emulated device</a:t>
+          </a:r>
+          <a:endParaRPr lang="de-CH" sz="1800" kern="1200" dirty="0"/>
+        </a:p>
+      </dsp:txBody>
+      <dsp:txXfrm>
+        <a:off x="1583995" y="140782"/>
+        <a:ext cx="2762331" cy="900904"/>
+      </dsp:txXfrm>
+    </dsp:sp>
+    <dsp:sp modelId="{6FB92FAA-8355-4FEC-9356-67979D72B354}">
+      <dsp:nvSpPr>
+        <dsp:cNvPr id="0" name=""/>
+        <dsp:cNvSpPr/>
+      </dsp:nvSpPr>
+      <dsp:spPr>
+        <a:xfrm rot="5400000">
+          <a:off x="2160003" y="2329238"/>
+          <a:ext cx="945949" cy="1076930"/>
+        </a:xfrm>
+        <a:prstGeom prst="bentUpArrow">
+          <a:avLst>
+            <a:gd name="adj1" fmla="val 32840"/>
+            <a:gd name="adj2" fmla="val 25000"/>
+            <a:gd name="adj3" fmla="val 35780"/>
+          </a:avLst>
+        </a:prstGeom>
+        <a:noFill/>
+        <a:ln w="15875" cap="rnd" cmpd="sng" algn="ctr">
+          <a:noFill/>
+          <a:prstDash val="solid"/>
+        </a:ln>
+        <a:effectLst/>
+      </dsp:spPr>
+      <dsp:style>
+        <a:lnRef idx="2">
+          <a:scrgbClr r="0" g="0" b="0"/>
+        </a:lnRef>
+        <a:fillRef idx="1">
+          <a:scrgbClr r="0" g="0" b="0"/>
+        </a:fillRef>
+        <a:effectRef idx="0">
+          <a:scrgbClr r="0" g="0" b="0"/>
+        </a:effectRef>
+        <a:fontRef idx="minor"/>
+      </dsp:style>
+    </dsp:sp>
+    <dsp:sp modelId="{CCCE12E7-E5B8-4F58-8431-0C12B0F81C58}">
+      <dsp:nvSpPr>
+        <dsp:cNvPr id="0" name=""/>
+        <dsp:cNvSpPr/>
+      </dsp:nvSpPr>
+      <dsp:spPr>
+        <a:xfrm>
+          <a:off x="1799996" y="1280633"/>
+          <a:ext cx="1592422" cy="1114644"/>
+        </a:xfrm>
+        <a:prstGeom prst="roundRect">
+          <a:avLst>
+            <a:gd name="adj" fmla="val 16670"/>
+          </a:avLst>
+        </a:prstGeom>
+        <a:noFill/>
+        <a:ln w="15875" cap="rnd" cmpd="sng" algn="ctr">
+          <a:noFill/>
+          <a:prstDash val="solid"/>
+        </a:ln>
+        <a:effectLst/>
+      </dsp:spPr>
+      <dsp:style>
+        <a:lnRef idx="2">
+          <a:scrgbClr r="0" g="0" b="0"/>
+        </a:lnRef>
+        <a:fillRef idx="1">
+          <a:scrgbClr r="0" g="0" b="0"/>
+        </a:fillRef>
+        <a:effectRef idx="0">
+          <a:scrgbClr r="0" g="0" b="0"/>
+        </a:effectRef>
+        <a:fontRef idx="minor">
+          <a:schemeClr val="lt1"/>
+        </a:fontRef>
+      </dsp:style>
+      <dsp:txBody>
+        <a:bodyPr spcFirstLastPara="0" vert="horz" wrap="square" lIns="80010" tIns="80010" rIns="80010" bIns="80010" numCol="1" spcCol="1270" anchor="ctr" anchorCtr="0">
+          <a:noAutofit/>
+        </a:bodyPr>
+        <a:lstStyle/>
+        <a:p>
+          <a:pPr lvl="0" algn="ctr" defTabSz="933450">
+            <a:lnSpc>
+              <a:spcPct val="90000"/>
+            </a:lnSpc>
+            <a:spcBef>
+              <a:spcPct val="0"/>
+            </a:spcBef>
+            <a:spcAft>
+              <a:spcPct val="35000"/>
+            </a:spcAft>
+          </a:pPr>
+          <a:r>
+            <a:rPr lang="en-US" sz="2100" kern="1200" dirty="0" smtClean="0"/>
+            <a:t> </a:t>
+          </a:r>
+          <a:endParaRPr lang="de-CH" sz="2100" kern="1200" dirty="0"/>
+        </a:p>
+      </dsp:txBody>
+      <dsp:txXfrm>
+        <a:off x="1854418" y="1335055"/>
+        <a:ext cx="1483578" cy="1005800"/>
+      </dsp:txXfrm>
+    </dsp:sp>
+    <dsp:sp modelId="{C60AB0D8-72C7-45B2-B090-B32ABD564FCD}">
+      <dsp:nvSpPr>
+        <dsp:cNvPr id="0" name=""/>
+        <dsp:cNvSpPr/>
+      </dsp:nvSpPr>
+      <dsp:spPr>
+        <a:xfrm>
+          <a:off x="3384002" y="1398940"/>
+          <a:ext cx="4672500" cy="900904"/>
+        </a:xfrm>
+        <a:prstGeom prst="rect">
+          <a:avLst/>
+        </a:prstGeom>
+        <a:noFill/>
+        <a:ln>
+          <a:noFill/>
+        </a:ln>
+        <a:effectLst/>
+      </dsp:spPr>
+      <dsp:style>
+        <a:lnRef idx="0">
+          <a:scrgbClr r="0" g="0" b="0"/>
+        </a:lnRef>
+        <a:fillRef idx="0">
+          <a:scrgbClr r="0" g="0" b="0"/>
+        </a:fillRef>
+        <a:effectRef idx="0">
+          <a:scrgbClr r="0" g="0" b="0"/>
+        </a:effectRef>
+        <a:fontRef idx="minor"/>
+      </dsp:style>
+      <dsp:txBody>
+        <a:bodyPr spcFirstLastPara="0" vert="horz" wrap="square" lIns="68580" tIns="68580" rIns="68580" bIns="68580" numCol="1" spcCol="1270" anchor="ctr" anchorCtr="0">
+          <a:noAutofit/>
+        </a:bodyPr>
+        <a:lstStyle/>
+        <a:p>
+          <a:pPr marL="171450" lvl="1" indent="-171450" algn="l" defTabSz="800100">
+            <a:lnSpc>
+              <a:spcPct val="90000"/>
+            </a:lnSpc>
+            <a:spcBef>
+              <a:spcPct val="0"/>
+            </a:spcBef>
+            <a:spcAft>
+              <a:spcPct val="15000"/>
+            </a:spcAft>
+            <a:buChar char="••"/>
+          </a:pPr>
+          <a:endParaRPr lang="de-CH" sz="1800" kern="1200" dirty="0"/>
+        </a:p>
+        <a:p>
+          <a:pPr marL="171450" lvl="1" indent="-171450" algn="l" defTabSz="800100">
+            <a:lnSpc>
+              <a:spcPct val="90000"/>
+            </a:lnSpc>
+            <a:spcBef>
+              <a:spcPct val="0"/>
+            </a:spcBef>
+            <a:spcAft>
+              <a:spcPct val="15000"/>
+            </a:spcAft>
+            <a:buChar char="••"/>
+          </a:pPr>
+          <a:endParaRPr lang="de-CH" sz="1800" kern="1200" dirty="0"/>
+        </a:p>
+        <a:p>
+          <a:pPr marL="171450" lvl="1" indent="-171450" algn="l" defTabSz="800100">
+            <a:lnSpc>
+              <a:spcPct val="90000"/>
+            </a:lnSpc>
+            <a:spcBef>
+              <a:spcPct val="0"/>
+            </a:spcBef>
+            <a:spcAft>
+              <a:spcPct val="15000"/>
+            </a:spcAft>
+            <a:buChar char="••"/>
+          </a:pPr>
+          <a:endParaRPr lang="de-CH" sz="1800" kern="1200" dirty="0"/>
+        </a:p>
+      </dsp:txBody>
+      <dsp:txXfrm>
+        <a:off x="3384002" y="1398940"/>
+        <a:ext cx="4672500" cy="900904"/>
+      </dsp:txXfrm>
+    </dsp:sp>
+    <dsp:sp modelId="{F3F94BDD-D93C-4EB6-8AFF-FDEC6505EA29}">
+      <dsp:nvSpPr>
+        <dsp:cNvPr id="0" name=""/>
+        <dsp:cNvSpPr/>
+      </dsp:nvSpPr>
+      <dsp:spPr>
+        <a:xfrm rot="5400000">
+          <a:off x="3960002" y="3581351"/>
+          <a:ext cx="945949" cy="1076930"/>
+        </a:xfrm>
+        <a:prstGeom prst="bentUpArrow">
+          <a:avLst>
+            <a:gd name="adj1" fmla="val 32840"/>
+            <a:gd name="adj2" fmla="val 25000"/>
+            <a:gd name="adj3" fmla="val 35780"/>
+          </a:avLst>
+        </a:prstGeom>
+        <a:noFill/>
+        <a:ln w="15875" cap="rnd" cmpd="sng" algn="ctr">
+          <a:noFill/>
+          <a:prstDash val="solid"/>
+        </a:ln>
+        <a:effectLst/>
+      </dsp:spPr>
+      <dsp:style>
+        <a:lnRef idx="2">
+          <a:scrgbClr r="0" g="0" b="0"/>
+        </a:lnRef>
+        <a:fillRef idx="1">
+          <a:scrgbClr r="0" g="0" b="0"/>
+        </a:fillRef>
+        <a:effectRef idx="0">
+          <a:scrgbClr r="0" g="0" b="0"/>
+        </a:effectRef>
+        <a:fontRef idx="minor"/>
+      </dsp:style>
+    </dsp:sp>
+    <dsp:sp modelId="{7C9C6413-B337-4A66-8542-181936D08323}">
+      <dsp:nvSpPr>
+        <dsp:cNvPr id="0" name=""/>
+        <dsp:cNvSpPr/>
+      </dsp:nvSpPr>
+      <dsp:spPr>
+        <a:xfrm>
+          <a:off x="3599995" y="2534396"/>
+          <a:ext cx="1592422" cy="1114644"/>
+        </a:xfrm>
+        <a:prstGeom prst="roundRect">
+          <a:avLst>
+            <a:gd name="adj" fmla="val 16670"/>
+          </a:avLst>
+        </a:prstGeom>
+        <a:noFill/>
+        <a:ln w="15875" cap="rnd" cmpd="sng" algn="ctr">
+          <a:noFill/>
+          <a:prstDash val="solid"/>
+        </a:ln>
+        <a:effectLst/>
+      </dsp:spPr>
+      <dsp:style>
+        <a:lnRef idx="2">
+          <a:scrgbClr r="0" g="0" b="0"/>
+        </a:lnRef>
+        <a:fillRef idx="1">
+          <a:scrgbClr r="0" g="0" b="0"/>
+        </a:fillRef>
+        <a:effectRef idx="0">
+          <a:scrgbClr r="0" g="0" b="0"/>
+        </a:effectRef>
+        <a:fontRef idx="minor">
+          <a:schemeClr val="lt1"/>
+        </a:fontRef>
+      </dsp:style>
+      <dsp:txBody>
+        <a:bodyPr spcFirstLastPara="0" vert="horz" wrap="square" lIns="80010" tIns="80010" rIns="80010" bIns="80010" numCol="1" spcCol="1270" anchor="ctr" anchorCtr="0">
+          <a:noAutofit/>
+        </a:bodyPr>
+        <a:lstStyle/>
+        <a:p>
+          <a:pPr lvl="0" algn="ctr" defTabSz="933450">
+            <a:lnSpc>
+              <a:spcPct val="90000"/>
+            </a:lnSpc>
+            <a:spcBef>
+              <a:spcPct val="0"/>
+            </a:spcBef>
+            <a:spcAft>
+              <a:spcPct val="35000"/>
+            </a:spcAft>
+          </a:pPr>
+          <a:r>
+            <a:rPr lang="en-US" sz="2100" kern="1200" dirty="0" smtClean="0"/>
+            <a:t> </a:t>
+          </a:r>
+          <a:endParaRPr lang="de-CH" sz="2100" kern="1200" dirty="0"/>
+        </a:p>
+      </dsp:txBody>
+      <dsp:txXfrm>
+        <a:off x="3654417" y="2588818"/>
+        <a:ext cx="1483578" cy="1005800"/>
+      </dsp:txXfrm>
+    </dsp:sp>
+    <dsp:sp modelId="{00C2D28C-794C-46F8-B203-EACC2F42DFC0}">
+      <dsp:nvSpPr>
+        <dsp:cNvPr id="0" name=""/>
+        <dsp:cNvSpPr/>
+      </dsp:nvSpPr>
+      <dsp:spPr>
+        <a:xfrm>
+          <a:off x="5183996" y="2692423"/>
+          <a:ext cx="3377416" cy="900904"/>
+        </a:xfrm>
+        <a:prstGeom prst="rect">
+          <a:avLst/>
+        </a:prstGeom>
+        <a:noFill/>
+        <a:ln>
+          <a:noFill/>
+        </a:ln>
+        <a:effectLst/>
+      </dsp:spPr>
+      <dsp:style>
+        <a:lnRef idx="0">
+          <a:scrgbClr r="0" g="0" b="0"/>
+        </a:lnRef>
+        <a:fillRef idx="0">
+          <a:scrgbClr r="0" g="0" b="0"/>
+        </a:fillRef>
+        <a:effectRef idx="0">
+          <a:scrgbClr r="0" g="0" b="0"/>
+        </a:effectRef>
+        <a:fontRef idx="minor"/>
+      </dsp:style>
+      <dsp:txBody>
+        <a:bodyPr spcFirstLastPara="0" vert="horz" wrap="square" lIns="68580" tIns="68580" rIns="68580" bIns="68580" numCol="1" spcCol="1270" anchor="ctr" anchorCtr="0">
+          <a:noAutofit/>
+        </a:bodyPr>
+        <a:lstStyle/>
+        <a:p>
+          <a:pPr marL="171450" lvl="1" indent="-171450" algn="l" defTabSz="800100">
+            <a:lnSpc>
+              <a:spcPct val="90000"/>
+            </a:lnSpc>
+            <a:spcBef>
+              <a:spcPct val="0"/>
+            </a:spcBef>
+            <a:spcAft>
+              <a:spcPct val="15000"/>
+            </a:spcAft>
+            <a:buChar char="••"/>
+          </a:pPr>
+          <a:endParaRPr lang="de-CH" sz="1800" kern="1200" dirty="0"/>
+        </a:p>
+        <a:p>
+          <a:pPr marL="171450" lvl="1" indent="-171450" algn="l" defTabSz="800100">
+            <a:lnSpc>
+              <a:spcPct val="90000"/>
+            </a:lnSpc>
+            <a:spcBef>
+              <a:spcPct val="0"/>
+            </a:spcBef>
+            <a:spcAft>
+              <a:spcPct val="15000"/>
+            </a:spcAft>
+            <a:buChar char="••"/>
+          </a:pPr>
+          <a:endParaRPr lang="de-CH" sz="1800" kern="1200" dirty="0"/>
+        </a:p>
+        <a:p>
+          <a:pPr marL="171450" lvl="1" indent="-171450" algn="l" defTabSz="800100">
+            <a:lnSpc>
+              <a:spcPct val="90000"/>
+            </a:lnSpc>
+            <a:spcBef>
+              <a:spcPct val="0"/>
+            </a:spcBef>
+            <a:spcAft>
+              <a:spcPct val="15000"/>
+            </a:spcAft>
+            <a:buChar char="••"/>
+          </a:pPr>
+          <a:endParaRPr lang="de-CH" sz="1800" kern="1200" dirty="0"/>
+        </a:p>
+      </dsp:txBody>
+      <dsp:txXfrm>
+        <a:off x="5183996" y="2692423"/>
+        <a:ext cx="3377416" cy="900904"/>
+      </dsp:txXfrm>
+    </dsp:sp>
+    <dsp:sp modelId="{C2AE311F-8BBD-4734-9B78-465F3C6AAF7A}">
+      <dsp:nvSpPr>
+        <dsp:cNvPr id="0" name=""/>
+        <dsp:cNvSpPr/>
+      </dsp:nvSpPr>
+      <dsp:spPr>
+        <a:xfrm>
+          <a:off x="5399997" y="3784860"/>
+          <a:ext cx="1592422" cy="1114644"/>
+        </a:xfrm>
+        <a:prstGeom prst="roundRect">
+          <a:avLst>
+            <a:gd name="adj" fmla="val 16670"/>
+          </a:avLst>
+        </a:prstGeom>
+        <a:noFill/>
+        <a:ln w="15875" cap="rnd" cmpd="sng" algn="ctr">
+          <a:noFill/>
+          <a:prstDash val="solid"/>
+        </a:ln>
+        <a:effectLst/>
+      </dsp:spPr>
+      <dsp:style>
+        <a:lnRef idx="2">
+          <a:scrgbClr r="0" g="0" b="0"/>
+        </a:lnRef>
+        <a:fillRef idx="1">
+          <a:scrgbClr r="0" g="0" b="0"/>
+        </a:fillRef>
+        <a:effectRef idx="0">
+          <a:scrgbClr r="0" g="0" b="0"/>
+        </a:effectRef>
+        <a:fontRef idx="minor">
+          <a:schemeClr val="lt1"/>
+        </a:fontRef>
+      </dsp:style>
+      <dsp:txBody>
+        <a:bodyPr spcFirstLastPara="0" vert="horz" wrap="square" lIns="80010" tIns="80010" rIns="80010" bIns="80010" numCol="1" spcCol="1270" anchor="ctr" anchorCtr="0">
+          <a:noAutofit/>
+        </a:bodyPr>
+        <a:lstStyle/>
+        <a:p>
+          <a:pPr lvl="0" algn="ctr" defTabSz="933450">
+            <a:lnSpc>
+              <a:spcPct val="90000"/>
+            </a:lnSpc>
+            <a:spcBef>
+              <a:spcPct val="0"/>
+            </a:spcBef>
+            <a:spcAft>
+              <a:spcPct val="35000"/>
+            </a:spcAft>
+          </a:pPr>
+          <a:r>
+            <a:rPr lang="en-US" sz="2100" kern="1200" dirty="0" smtClean="0"/>
+            <a:t> </a:t>
+          </a:r>
+          <a:endParaRPr lang="de-CH" sz="2100" kern="1200" dirty="0"/>
+        </a:p>
+      </dsp:txBody>
+      <dsp:txXfrm>
+        <a:off x="5454419" y="3839282"/>
+        <a:ext cx="1483578" cy="1005800"/>
+      </dsp:txXfrm>
+    </dsp:sp>
+    <dsp:sp modelId="{C6E774FE-2729-439D-889B-C5312A503348}">
+      <dsp:nvSpPr>
+        <dsp:cNvPr id="0" name=""/>
+        <dsp:cNvSpPr/>
+      </dsp:nvSpPr>
+      <dsp:spPr>
+        <a:xfrm>
+          <a:off x="6983996" y="3891166"/>
+          <a:ext cx="1984940" cy="900904"/>
+        </a:xfrm>
+        <a:prstGeom prst="rect">
+          <a:avLst/>
+        </a:prstGeom>
+        <a:noFill/>
+        <a:ln>
+          <a:noFill/>
+        </a:ln>
+        <a:effectLst/>
+      </dsp:spPr>
+      <dsp:style>
+        <a:lnRef idx="0">
+          <a:scrgbClr r="0" g="0" b="0"/>
+        </a:lnRef>
+        <a:fillRef idx="0">
+          <a:scrgbClr r="0" g="0" b="0"/>
+        </a:fillRef>
+        <a:effectRef idx="0">
+          <a:scrgbClr r="0" g="0" b="0"/>
+        </a:effectRef>
+        <a:fontRef idx="minor"/>
+      </dsp:style>
+      <dsp:txBody>
+        <a:bodyPr spcFirstLastPara="0" vert="horz" wrap="square" lIns="68580" tIns="68580" rIns="68580" bIns="68580" numCol="1" spcCol="1270" anchor="ctr" anchorCtr="0">
+          <a:noAutofit/>
+        </a:bodyPr>
+        <a:lstStyle/>
+        <a:p>
+          <a:pPr marL="171450" lvl="1" indent="-171450" algn="l" defTabSz="800100">
+            <a:lnSpc>
+              <a:spcPct val="90000"/>
+            </a:lnSpc>
+            <a:spcBef>
+              <a:spcPct val="0"/>
+            </a:spcBef>
+            <a:spcAft>
+              <a:spcPct val="15000"/>
+            </a:spcAft>
+            <a:buChar char="••"/>
+          </a:pPr>
+          <a:endParaRPr lang="de-CH" sz="1800" kern="1200" dirty="0"/>
+        </a:p>
+      </dsp:txBody>
+      <dsp:txXfrm>
+        <a:off x="6983996" y="3891166"/>
+        <a:ext cx="1984940" cy="900904"/>
+      </dsp:txXfrm>
+    </dsp:sp>
   </dsp:spTree>
 </dsp:drawing>
 </file>
@@ -7281,6 +9052,798 @@
       <dsp:cNvGrpSpPr/>
     </dsp:nvGrpSpPr>
     <dsp:grpSpPr/>
+    <dsp:sp modelId="{9A525D47-14B2-4F0B-85D8-FD3EB0402421}">
+      <dsp:nvSpPr>
+        <dsp:cNvPr id="0" name=""/>
+        <dsp:cNvSpPr/>
+      </dsp:nvSpPr>
+      <dsp:spPr>
+        <a:xfrm rot="5400000">
+          <a:off x="360000" y="1077124"/>
+          <a:ext cx="945949" cy="1076930"/>
+        </a:xfrm>
+        <a:prstGeom prst="bentUpArrow">
+          <a:avLst>
+            <a:gd name="adj1" fmla="val 32840"/>
+            <a:gd name="adj2" fmla="val 25000"/>
+            <a:gd name="adj3" fmla="val 35780"/>
+          </a:avLst>
+        </a:prstGeom>
+        <a:solidFill>
+          <a:schemeClr val="accent1">
+            <a:tint val="50000"/>
+            <a:hueOff val="0"/>
+            <a:satOff val="0"/>
+            <a:lumOff val="0"/>
+            <a:alphaOff val="0"/>
+          </a:schemeClr>
+        </a:solidFill>
+        <a:ln w="15875" cap="rnd" cmpd="sng" algn="ctr">
+          <a:solidFill>
+            <a:schemeClr val="lt1">
+              <a:hueOff val="0"/>
+              <a:satOff val="0"/>
+              <a:lumOff val="0"/>
+              <a:alphaOff val="0"/>
+            </a:schemeClr>
+          </a:solidFill>
+          <a:prstDash val="solid"/>
+        </a:ln>
+        <a:effectLst/>
+      </dsp:spPr>
+      <dsp:style>
+        <a:lnRef idx="2">
+          <a:scrgbClr r="0" g="0" b="0"/>
+        </a:lnRef>
+        <a:fillRef idx="1">
+          <a:scrgbClr r="0" g="0" b="0"/>
+        </a:fillRef>
+        <a:effectRef idx="0">
+          <a:scrgbClr r="0" g="0" b="0"/>
+        </a:effectRef>
+        <a:fontRef idx="minor"/>
+      </dsp:style>
+    </dsp:sp>
+    <dsp:sp modelId="{2BE033E5-5E65-4ABF-9D27-5FFF8CF71BCD}">
+      <dsp:nvSpPr>
+        <dsp:cNvPr id="0" name=""/>
+        <dsp:cNvSpPr/>
+      </dsp:nvSpPr>
+      <dsp:spPr>
+        <a:xfrm>
+          <a:off x="7" y="28520"/>
+          <a:ext cx="1592422" cy="1114644"/>
+        </a:xfrm>
+        <a:prstGeom prst="roundRect">
+          <a:avLst>
+            <a:gd name="adj" fmla="val 16670"/>
+          </a:avLst>
+        </a:prstGeom>
+        <a:solidFill>
+          <a:schemeClr val="accent1">
+            <a:hueOff val="0"/>
+            <a:satOff val="0"/>
+            <a:lumOff val="0"/>
+            <a:alphaOff val="0"/>
+          </a:schemeClr>
+        </a:solidFill>
+        <a:ln w="15875" cap="rnd" cmpd="sng" algn="ctr">
+          <a:solidFill>
+            <a:schemeClr val="lt1">
+              <a:hueOff val="0"/>
+              <a:satOff val="0"/>
+              <a:lumOff val="0"/>
+              <a:alphaOff val="0"/>
+            </a:schemeClr>
+          </a:solidFill>
+          <a:prstDash val="solid"/>
+        </a:ln>
+        <a:effectLst/>
+      </dsp:spPr>
+      <dsp:style>
+        <a:lnRef idx="2">
+          <a:scrgbClr r="0" g="0" b="0"/>
+        </a:lnRef>
+        <a:fillRef idx="1">
+          <a:scrgbClr r="0" g="0" b="0"/>
+        </a:fillRef>
+        <a:effectRef idx="0">
+          <a:scrgbClr r="0" g="0" b="0"/>
+        </a:effectRef>
+        <a:fontRef idx="minor">
+          <a:schemeClr val="lt1"/>
+        </a:fontRef>
+      </dsp:style>
+      <dsp:txBody>
+        <a:bodyPr spcFirstLastPara="0" vert="horz" wrap="square" lIns="80010" tIns="80010" rIns="80010" bIns="80010" numCol="1" spcCol="1270" anchor="ctr" anchorCtr="0">
+          <a:noAutofit/>
+        </a:bodyPr>
+        <a:lstStyle/>
+        <a:p>
+          <a:pPr lvl="0" algn="ctr" defTabSz="933450">
+            <a:lnSpc>
+              <a:spcPct val="90000"/>
+            </a:lnSpc>
+            <a:spcBef>
+              <a:spcPct val="0"/>
+            </a:spcBef>
+            <a:spcAft>
+              <a:spcPct val="35000"/>
+            </a:spcAft>
+          </a:pPr>
+          <a:r>
+            <a:rPr lang="en-US" sz="2100" kern="1200" dirty="0" smtClean="0"/>
+            <a:t>Record sequence</a:t>
+          </a:r>
+          <a:endParaRPr lang="de-CH" sz="2100" kern="1200" dirty="0"/>
+        </a:p>
+      </dsp:txBody>
+      <dsp:txXfrm>
+        <a:off x="54429" y="82942"/>
+        <a:ext cx="1483578" cy="1005800"/>
+      </dsp:txXfrm>
+    </dsp:sp>
+    <dsp:sp modelId="{D4EFC377-AFF7-4383-8611-A4AC615569BE}">
+      <dsp:nvSpPr>
+        <dsp:cNvPr id="0" name=""/>
+        <dsp:cNvSpPr/>
+      </dsp:nvSpPr>
+      <dsp:spPr>
+        <a:xfrm>
+          <a:off x="1583995" y="140782"/>
+          <a:ext cx="2762331" cy="900904"/>
+        </a:xfrm>
+        <a:prstGeom prst="rect">
+          <a:avLst/>
+        </a:prstGeom>
+        <a:noFill/>
+        <a:ln>
+          <a:noFill/>
+        </a:ln>
+        <a:effectLst/>
+      </dsp:spPr>
+      <dsp:style>
+        <a:lnRef idx="0">
+          <a:scrgbClr r="0" g="0" b="0"/>
+        </a:lnRef>
+        <a:fillRef idx="0">
+          <a:scrgbClr r="0" g="0" b="0"/>
+        </a:fillRef>
+        <a:effectRef idx="0">
+          <a:scrgbClr r="0" g="0" b="0"/>
+        </a:effectRef>
+        <a:fontRef idx="minor"/>
+      </dsp:style>
+      <dsp:txBody>
+        <a:bodyPr spcFirstLastPara="0" vert="horz" wrap="square" lIns="68580" tIns="68580" rIns="68580" bIns="68580" numCol="1" spcCol="1270" anchor="ctr" anchorCtr="0">
+          <a:noAutofit/>
+        </a:bodyPr>
+        <a:lstStyle/>
+        <a:p>
+          <a:pPr marL="171450" lvl="1" indent="-171450" algn="l" defTabSz="800100">
+            <a:lnSpc>
+              <a:spcPct val="90000"/>
+            </a:lnSpc>
+            <a:spcBef>
+              <a:spcPct val="0"/>
+            </a:spcBef>
+            <a:spcAft>
+              <a:spcPct val="15000"/>
+            </a:spcAft>
+            <a:buChar char="••"/>
+          </a:pPr>
+          <a:r>
+            <a:rPr lang="en-US" sz="1800" kern="1200" dirty="0" smtClean="0"/>
+            <a:t>On emulated device</a:t>
+          </a:r>
+          <a:endParaRPr lang="de-CH" sz="1800" kern="1200" dirty="0"/>
+        </a:p>
+      </dsp:txBody>
+      <dsp:txXfrm>
+        <a:off x="1583995" y="140782"/>
+        <a:ext cx="2762331" cy="900904"/>
+      </dsp:txXfrm>
+    </dsp:sp>
+    <dsp:sp modelId="{6FB92FAA-8355-4FEC-9356-67979D72B354}">
+      <dsp:nvSpPr>
+        <dsp:cNvPr id="0" name=""/>
+        <dsp:cNvSpPr/>
+      </dsp:nvSpPr>
+      <dsp:spPr>
+        <a:xfrm rot="5400000">
+          <a:off x="2160003" y="2329238"/>
+          <a:ext cx="945949" cy="1076930"/>
+        </a:xfrm>
+        <a:prstGeom prst="bentUpArrow">
+          <a:avLst>
+            <a:gd name="adj1" fmla="val 32840"/>
+            <a:gd name="adj2" fmla="val 25000"/>
+            <a:gd name="adj3" fmla="val 35780"/>
+          </a:avLst>
+        </a:prstGeom>
+        <a:solidFill>
+          <a:schemeClr val="accent1">
+            <a:tint val="50000"/>
+            <a:hueOff val="0"/>
+            <a:satOff val="0"/>
+            <a:lumOff val="0"/>
+            <a:alphaOff val="0"/>
+          </a:schemeClr>
+        </a:solidFill>
+        <a:ln w="15875" cap="rnd" cmpd="sng" algn="ctr">
+          <a:solidFill>
+            <a:schemeClr val="lt1">
+              <a:hueOff val="0"/>
+              <a:satOff val="0"/>
+              <a:lumOff val="0"/>
+              <a:alphaOff val="0"/>
+            </a:schemeClr>
+          </a:solidFill>
+          <a:prstDash val="solid"/>
+        </a:ln>
+        <a:effectLst/>
+      </dsp:spPr>
+      <dsp:style>
+        <a:lnRef idx="2">
+          <a:scrgbClr r="0" g="0" b="0"/>
+        </a:lnRef>
+        <a:fillRef idx="1">
+          <a:scrgbClr r="0" g="0" b="0"/>
+        </a:fillRef>
+        <a:effectRef idx="0">
+          <a:scrgbClr r="0" g="0" b="0"/>
+        </a:effectRef>
+        <a:fontRef idx="minor"/>
+      </dsp:style>
+    </dsp:sp>
+    <dsp:sp modelId="{CCCE12E7-E5B8-4F58-8431-0C12B0F81C58}">
+      <dsp:nvSpPr>
+        <dsp:cNvPr id="0" name=""/>
+        <dsp:cNvSpPr/>
+      </dsp:nvSpPr>
+      <dsp:spPr>
+        <a:xfrm>
+          <a:off x="1799996" y="1280633"/>
+          <a:ext cx="1592422" cy="1114644"/>
+        </a:xfrm>
+        <a:prstGeom prst="roundRect">
+          <a:avLst>
+            <a:gd name="adj" fmla="val 16670"/>
+          </a:avLst>
+        </a:prstGeom>
+        <a:solidFill>
+          <a:schemeClr val="accent1">
+            <a:hueOff val="0"/>
+            <a:satOff val="0"/>
+            <a:lumOff val="0"/>
+            <a:alphaOff val="0"/>
+          </a:schemeClr>
+        </a:solidFill>
+        <a:ln w="15875" cap="rnd" cmpd="sng" algn="ctr">
+          <a:solidFill>
+            <a:schemeClr val="lt1">
+              <a:hueOff val="0"/>
+              <a:satOff val="0"/>
+              <a:lumOff val="0"/>
+              <a:alphaOff val="0"/>
+            </a:schemeClr>
+          </a:solidFill>
+          <a:prstDash val="solid"/>
+        </a:ln>
+        <a:effectLst/>
+      </dsp:spPr>
+      <dsp:style>
+        <a:lnRef idx="2">
+          <a:scrgbClr r="0" g="0" b="0"/>
+        </a:lnRef>
+        <a:fillRef idx="1">
+          <a:scrgbClr r="0" g="0" b="0"/>
+        </a:fillRef>
+        <a:effectRef idx="0">
+          <a:scrgbClr r="0" g="0" b="0"/>
+        </a:effectRef>
+        <a:fontRef idx="minor">
+          <a:schemeClr val="lt1"/>
+        </a:fontRef>
+      </dsp:style>
+      <dsp:txBody>
+        <a:bodyPr spcFirstLastPara="0" vert="horz" wrap="square" lIns="80010" tIns="80010" rIns="80010" bIns="80010" numCol="1" spcCol="1270" anchor="ctr" anchorCtr="0">
+          <a:noAutofit/>
+        </a:bodyPr>
+        <a:lstStyle/>
+        <a:p>
+          <a:pPr lvl="0" algn="ctr" defTabSz="933450">
+            <a:lnSpc>
+              <a:spcPct val="90000"/>
+            </a:lnSpc>
+            <a:spcBef>
+              <a:spcPct val="0"/>
+            </a:spcBef>
+            <a:spcAft>
+              <a:spcPct val="35000"/>
+            </a:spcAft>
+          </a:pPr>
+          <a:r>
+            <a:rPr lang="en-US" sz="2100" kern="1200" dirty="0" smtClean="0"/>
+            <a:t>Visualize sequence</a:t>
+          </a:r>
+          <a:endParaRPr lang="de-CH" sz="2100" kern="1200" dirty="0"/>
+        </a:p>
+      </dsp:txBody>
+      <dsp:txXfrm>
+        <a:off x="1854418" y="1335055"/>
+        <a:ext cx="1483578" cy="1005800"/>
+      </dsp:txXfrm>
+    </dsp:sp>
+    <dsp:sp modelId="{C60AB0D8-72C7-45B2-B090-B32ABD564FCD}">
+      <dsp:nvSpPr>
+        <dsp:cNvPr id="0" name=""/>
+        <dsp:cNvSpPr/>
+      </dsp:nvSpPr>
+      <dsp:spPr>
+        <a:xfrm>
+          <a:off x="3384002" y="1398940"/>
+          <a:ext cx="4672500" cy="900904"/>
+        </a:xfrm>
+        <a:prstGeom prst="rect">
+          <a:avLst/>
+        </a:prstGeom>
+        <a:noFill/>
+        <a:ln>
+          <a:noFill/>
+        </a:ln>
+        <a:effectLst/>
+      </dsp:spPr>
+      <dsp:style>
+        <a:lnRef idx="0">
+          <a:scrgbClr r="0" g="0" b="0"/>
+        </a:lnRef>
+        <a:fillRef idx="0">
+          <a:scrgbClr r="0" g="0" b="0"/>
+        </a:fillRef>
+        <a:effectRef idx="0">
+          <a:scrgbClr r="0" g="0" b="0"/>
+        </a:effectRef>
+        <a:fontRef idx="minor"/>
+      </dsp:style>
+      <dsp:txBody>
+        <a:bodyPr spcFirstLastPara="0" vert="horz" wrap="square" lIns="68580" tIns="68580" rIns="68580" bIns="68580" numCol="1" spcCol="1270" anchor="ctr" anchorCtr="0">
+          <a:noAutofit/>
+        </a:bodyPr>
+        <a:lstStyle/>
+        <a:p>
+          <a:pPr marL="171450" lvl="1" indent="-171450" algn="l" defTabSz="800100">
+            <a:lnSpc>
+              <a:spcPct val="90000"/>
+            </a:lnSpc>
+            <a:spcBef>
+              <a:spcPct val="0"/>
+            </a:spcBef>
+            <a:spcAft>
+              <a:spcPct val="15000"/>
+            </a:spcAft>
+            <a:buChar char="••"/>
+          </a:pPr>
+          <a:r>
+            <a:rPr lang="en-US" sz="1800" kern="1200" dirty="0" smtClean="0"/>
+            <a:t>Display events in a timeline</a:t>
+          </a:r>
+          <a:endParaRPr lang="de-CH" sz="1800" kern="1200" dirty="0"/>
+        </a:p>
+        <a:p>
+          <a:pPr marL="171450" lvl="1" indent="-171450" algn="l" defTabSz="800100">
+            <a:lnSpc>
+              <a:spcPct val="90000"/>
+            </a:lnSpc>
+            <a:spcBef>
+              <a:spcPct val="0"/>
+            </a:spcBef>
+            <a:spcAft>
+              <a:spcPct val="15000"/>
+            </a:spcAft>
+            <a:buChar char="••"/>
+          </a:pPr>
+          <a:r>
+            <a:rPr lang="en-US" sz="1800" kern="1200" dirty="0" smtClean="0"/>
+            <a:t>Save sequence</a:t>
+          </a:r>
+          <a:endParaRPr lang="de-CH" sz="1800" kern="1200" dirty="0"/>
+        </a:p>
+        <a:p>
+          <a:pPr marL="171450" lvl="1" indent="-171450" algn="l" defTabSz="800100">
+            <a:lnSpc>
+              <a:spcPct val="90000"/>
+            </a:lnSpc>
+            <a:spcBef>
+              <a:spcPct val="0"/>
+            </a:spcBef>
+            <a:spcAft>
+              <a:spcPct val="15000"/>
+            </a:spcAft>
+            <a:buChar char="••"/>
+          </a:pPr>
+          <a:r>
+            <a:rPr lang="en-US" sz="1800" kern="1200" dirty="0" smtClean="0"/>
+            <a:t>Move sequence to other device</a:t>
+          </a:r>
+          <a:endParaRPr lang="de-CH" sz="1800" kern="1200" dirty="0"/>
+        </a:p>
+      </dsp:txBody>
+      <dsp:txXfrm>
+        <a:off x="3384002" y="1398940"/>
+        <a:ext cx="4672500" cy="900904"/>
+      </dsp:txXfrm>
+    </dsp:sp>
+    <dsp:sp modelId="{F3F94BDD-D93C-4EB6-8AFF-FDEC6505EA29}">
+      <dsp:nvSpPr>
+        <dsp:cNvPr id="0" name=""/>
+        <dsp:cNvSpPr/>
+      </dsp:nvSpPr>
+      <dsp:spPr>
+        <a:xfrm rot="5400000">
+          <a:off x="3960002" y="3581351"/>
+          <a:ext cx="945949" cy="1076930"/>
+        </a:xfrm>
+        <a:prstGeom prst="bentUpArrow">
+          <a:avLst>
+            <a:gd name="adj1" fmla="val 32840"/>
+            <a:gd name="adj2" fmla="val 25000"/>
+            <a:gd name="adj3" fmla="val 35780"/>
+          </a:avLst>
+        </a:prstGeom>
+        <a:solidFill>
+          <a:schemeClr val="accent1">
+            <a:tint val="50000"/>
+            <a:hueOff val="0"/>
+            <a:satOff val="0"/>
+            <a:lumOff val="0"/>
+            <a:alphaOff val="0"/>
+          </a:schemeClr>
+        </a:solidFill>
+        <a:ln w="15875" cap="rnd" cmpd="sng" algn="ctr">
+          <a:solidFill>
+            <a:schemeClr val="lt1">
+              <a:hueOff val="0"/>
+              <a:satOff val="0"/>
+              <a:lumOff val="0"/>
+              <a:alphaOff val="0"/>
+            </a:schemeClr>
+          </a:solidFill>
+          <a:prstDash val="solid"/>
+        </a:ln>
+        <a:effectLst/>
+      </dsp:spPr>
+      <dsp:style>
+        <a:lnRef idx="2">
+          <a:scrgbClr r="0" g="0" b="0"/>
+        </a:lnRef>
+        <a:fillRef idx="1">
+          <a:scrgbClr r="0" g="0" b="0"/>
+        </a:fillRef>
+        <a:effectRef idx="0">
+          <a:scrgbClr r="0" g="0" b="0"/>
+        </a:effectRef>
+        <a:fontRef idx="minor"/>
+      </dsp:style>
+    </dsp:sp>
+    <dsp:sp modelId="{7C9C6413-B337-4A66-8542-181936D08323}">
+      <dsp:nvSpPr>
+        <dsp:cNvPr id="0" name=""/>
+        <dsp:cNvSpPr/>
+      </dsp:nvSpPr>
+      <dsp:spPr>
+        <a:xfrm>
+          <a:off x="3599995" y="2534396"/>
+          <a:ext cx="1592422" cy="1114644"/>
+        </a:xfrm>
+        <a:prstGeom prst="roundRect">
+          <a:avLst>
+            <a:gd name="adj" fmla="val 16670"/>
+          </a:avLst>
+        </a:prstGeom>
+        <a:solidFill>
+          <a:schemeClr val="accent1">
+            <a:hueOff val="0"/>
+            <a:satOff val="0"/>
+            <a:lumOff val="0"/>
+            <a:alphaOff val="0"/>
+          </a:schemeClr>
+        </a:solidFill>
+        <a:ln w="15875" cap="rnd" cmpd="sng" algn="ctr">
+          <a:solidFill>
+            <a:schemeClr val="lt1">
+              <a:hueOff val="0"/>
+              <a:satOff val="0"/>
+              <a:lumOff val="0"/>
+              <a:alphaOff val="0"/>
+            </a:schemeClr>
+          </a:solidFill>
+          <a:prstDash val="solid"/>
+        </a:ln>
+        <a:effectLst/>
+      </dsp:spPr>
+      <dsp:style>
+        <a:lnRef idx="2">
+          <a:scrgbClr r="0" g="0" b="0"/>
+        </a:lnRef>
+        <a:fillRef idx="1">
+          <a:scrgbClr r="0" g="0" b="0"/>
+        </a:fillRef>
+        <a:effectRef idx="0">
+          <a:scrgbClr r="0" g="0" b="0"/>
+        </a:effectRef>
+        <a:fontRef idx="minor">
+          <a:schemeClr val="lt1"/>
+        </a:fontRef>
+      </dsp:style>
+      <dsp:txBody>
+        <a:bodyPr spcFirstLastPara="0" vert="horz" wrap="square" lIns="80010" tIns="80010" rIns="80010" bIns="80010" numCol="1" spcCol="1270" anchor="ctr" anchorCtr="0">
+          <a:noAutofit/>
+        </a:bodyPr>
+        <a:lstStyle/>
+        <a:p>
+          <a:pPr lvl="0" algn="ctr" defTabSz="933450">
+            <a:lnSpc>
+              <a:spcPct val="90000"/>
+            </a:lnSpc>
+            <a:spcBef>
+              <a:spcPct val="0"/>
+            </a:spcBef>
+            <a:spcAft>
+              <a:spcPct val="35000"/>
+            </a:spcAft>
+          </a:pPr>
+          <a:r>
+            <a:rPr lang="en-US" sz="2100" kern="1200" dirty="0" smtClean="0"/>
+            <a:t>Adjust timing</a:t>
+          </a:r>
+          <a:endParaRPr lang="de-CH" sz="2100" kern="1200" dirty="0"/>
+        </a:p>
+      </dsp:txBody>
+      <dsp:txXfrm>
+        <a:off x="3654417" y="2588818"/>
+        <a:ext cx="1483578" cy="1005800"/>
+      </dsp:txXfrm>
+    </dsp:sp>
+    <dsp:sp modelId="{00C2D28C-794C-46F8-B203-EACC2F42DFC0}">
+      <dsp:nvSpPr>
+        <dsp:cNvPr id="0" name=""/>
+        <dsp:cNvSpPr/>
+      </dsp:nvSpPr>
+      <dsp:spPr>
+        <a:xfrm>
+          <a:off x="5183996" y="2692423"/>
+          <a:ext cx="3377416" cy="900904"/>
+        </a:xfrm>
+        <a:prstGeom prst="rect">
+          <a:avLst/>
+        </a:prstGeom>
+        <a:noFill/>
+        <a:ln>
+          <a:noFill/>
+        </a:ln>
+        <a:effectLst/>
+      </dsp:spPr>
+      <dsp:style>
+        <a:lnRef idx="0">
+          <a:scrgbClr r="0" g="0" b="0"/>
+        </a:lnRef>
+        <a:fillRef idx="0">
+          <a:scrgbClr r="0" g="0" b="0"/>
+        </a:fillRef>
+        <a:effectRef idx="0">
+          <a:scrgbClr r="0" g="0" b="0"/>
+        </a:effectRef>
+        <a:fontRef idx="minor"/>
+      </dsp:style>
+      <dsp:txBody>
+        <a:bodyPr spcFirstLastPara="0" vert="horz" wrap="square" lIns="68580" tIns="68580" rIns="68580" bIns="68580" numCol="1" spcCol="1270" anchor="ctr" anchorCtr="0">
+          <a:noAutofit/>
+        </a:bodyPr>
+        <a:lstStyle/>
+        <a:p>
+          <a:pPr marL="171450" lvl="1" indent="-171450" algn="l" defTabSz="800100">
+            <a:lnSpc>
+              <a:spcPct val="90000"/>
+            </a:lnSpc>
+            <a:spcBef>
+              <a:spcPct val="0"/>
+            </a:spcBef>
+            <a:spcAft>
+              <a:spcPct val="15000"/>
+            </a:spcAft>
+            <a:buChar char="••"/>
+          </a:pPr>
+          <a:r>
+            <a:rPr lang="en-US" sz="1800" kern="1200" dirty="0" smtClean="0"/>
+            <a:t>Drag and drop sequence</a:t>
+          </a:r>
+          <a:endParaRPr lang="de-CH" sz="1800" kern="1200" dirty="0"/>
+        </a:p>
+        <a:p>
+          <a:pPr marL="171450" lvl="1" indent="-171450" algn="l" defTabSz="800100">
+            <a:lnSpc>
+              <a:spcPct val="90000"/>
+            </a:lnSpc>
+            <a:spcBef>
+              <a:spcPct val="0"/>
+            </a:spcBef>
+            <a:spcAft>
+              <a:spcPct val="15000"/>
+            </a:spcAft>
+            <a:buChar char="••"/>
+          </a:pPr>
+          <a:r>
+            <a:rPr lang="en-US" sz="1800" kern="1200" dirty="0" smtClean="0"/>
+            <a:t>Set breakpoints</a:t>
+          </a:r>
+          <a:endParaRPr lang="de-CH" sz="1800" kern="1200" dirty="0"/>
+        </a:p>
+        <a:p>
+          <a:pPr marL="171450" lvl="1" indent="-171450" algn="l" defTabSz="800100">
+            <a:lnSpc>
+              <a:spcPct val="90000"/>
+            </a:lnSpc>
+            <a:spcBef>
+              <a:spcPct val="0"/>
+            </a:spcBef>
+            <a:spcAft>
+              <a:spcPct val="15000"/>
+            </a:spcAft>
+            <a:buChar char="••"/>
+          </a:pPr>
+          <a:r>
+            <a:rPr lang="en-US" sz="1800" kern="1200" dirty="0" smtClean="0"/>
+            <a:t>Add breaks of one second</a:t>
+          </a:r>
+          <a:endParaRPr lang="de-CH" sz="1800" kern="1200" dirty="0"/>
+        </a:p>
+      </dsp:txBody>
+      <dsp:txXfrm>
+        <a:off x="5183996" y="2692423"/>
+        <a:ext cx="3377416" cy="900904"/>
+      </dsp:txXfrm>
+    </dsp:sp>
+    <dsp:sp modelId="{C2AE311F-8BBD-4734-9B78-465F3C6AAF7A}">
+      <dsp:nvSpPr>
+        <dsp:cNvPr id="0" name=""/>
+        <dsp:cNvSpPr/>
+      </dsp:nvSpPr>
+      <dsp:spPr>
+        <a:xfrm>
+          <a:off x="5399997" y="3784860"/>
+          <a:ext cx="1592422" cy="1114644"/>
+        </a:xfrm>
+        <a:prstGeom prst="roundRect">
+          <a:avLst>
+            <a:gd name="adj" fmla="val 16670"/>
+          </a:avLst>
+        </a:prstGeom>
+        <a:solidFill>
+          <a:schemeClr val="accent1">
+            <a:hueOff val="0"/>
+            <a:satOff val="0"/>
+            <a:lumOff val="0"/>
+            <a:alphaOff val="0"/>
+          </a:schemeClr>
+        </a:solidFill>
+        <a:ln w="15875" cap="rnd" cmpd="sng" algn="ctr">
+          <a:solidFill>
+            <a:schemeClr val="lt1">
+              <a:hueOff val="0"/>
+              <a:satOff val="0"/>
+              <a:lumOff val="0"/>
+              <a:alphaOff val="0"/>
+            </a:schemeClr>
+          </a:solidFill>
+          <a:prstDash val="solid"/>
+        </a:ln>
+        <a:effectLst/>
+      </dsp:spPr>
+      <dsp:style>
+        <a:lnRef idx="2">
+          <a:scrgbClr r="0" g="0" b="0"/>
+        </a:lnRef>
+        <a:fillRef idx="1">
+          <a:scrgbClr r="0" g="0" b="0"/>
+        </a:fillRef>
+        <a:effectRef idx="0">
+          <a:scrgbClr r="0" g="0" b="0"/>
+        </a:effectRef>
+        <a:fontRef idx="minor">
+          <a:schemeClr val="lt1"/>
+        </a:fontRef>
+      </dsp:style>
+      <dsp:txBody>
+        <a:bodyPr spcFirstLastPara="0" vert="horz" wrap="square" lIns="80010" tIns="80010" rIns="80010" bIns="80010" numCol="1" spcCol="1270" anchor="ctr" anchorCtr="0">
+          <a:noAutofit/>
+        </a:bodyPr>
+        <a:lstStyle/>
+        <a:p>
+          <a:pPr lvl="0" algn="ctr" defTabSz="933450">
+            <a:lnSpc>
+              <a:spcPct val="90000"/>
+            </a:lnSpc>
+            <a:spcBef>
+              <a:spcPct val="0"/>
+            </a:spcBef>
+            <a:spcAft>
+              <a:spcPct val="35000"/>
+            </a:spcAft>
+          </a:pPr>
+          <a:r>
+            <a:rPr lang="en-US" sz="2100" kern="1200" dirty="0" smtClean="0"/>
+            <a:t>Replay sequence</a:t>
+          </a:r>
+          <a:endParaRPr lang="de-CH" sz="2100" kern="1200" dirty="0"/>
+        </a:p>
+      </dsp:txBody>
+      <dsp:txXfrm>
+        <a:off x="5454419" y="3839282"/>
+        <a:ext cx="1483578" cy="1005800"/>
+      </dsp:txXfrm>
+    </dsp:sp>
+    <dsp:sp modelId="{C6E774FE-2729-439D-889B-C5312A503348}">
+      <dsp:nvSpPr>
+        <dsp:cNvPr id="0" name=""/>
+        <dsp:cNvSpPr/>
+      </dsp:nvSpPr>
+      <dsp:spPr>
+        <a:xfrm>
+          <a:off x="6983996" y="3891166"/>
+          <a:ext cx="1984940" cy="900904"/>
+        </a:xfrm>
+        <a:prstGeom prst="rect">
+          <a:avLst/>
+        </a:prstGeom>
+        <a:noFill/>
+        <a:ln>
+          <a:noFill/>
+        </a:ln>
+        <a:effectLst/>
+      </dsp:spPr>
+      <dsp:style>
+        <a:lnRef idx="0">
+          <a:scrgbClr r="0" g="0" b="0"/>
+        </a:lnRef>
+        <a:fillRef idx="0">
+          <a:scrgbClr r="0" g="0" b="0"/>
+        </a:fillRef>
+        <a:effectRef idx="0">
+          <a:scrgbClr r="0" g="0" b="0"/>
+        </a:effectRef>
+        <a:fontRef idx="minor"/>
+      </dsp:style>
+      <dsp:txBody>
+        <a:bodyPr spcFirstLastPara="0" vert="horz" wrap="square" lIns="68580" tIns="68580" rIns="68580" bIns="68580" numCol="1" spcCol="1270" anchor="ctr" anchorCtr="0">
+          <a:noAutofit/>
+        </a:bodyPr>
+        <a:lstStyle/>
+        <a:p>
+          <a:pPr marL="171450" lvl="1" indent="-171450" algn="l" defTabSz="800100">
+            <a:lnSpc>
+              <a:spcPct val="90000"/>
+            </a:lnSpc>
+            <a:spcBef>
+              <a:spcPct val="0"/>
+            </a:spcBef>
+            <a:spcAft>
+              <a:spcPct val="15000"/>
+            </a:spcAft>
+            <a:buChar char="••"/>
+          </a:pPr>
+          <a:r>
+            <a:rPr lang="en-US" sz="1800" kern="1200" dirty="0" smtClean="0"/>
+            <a:t>On any device</a:t>
+          </a:r>
+          <a:endParaRPr lang="de-CH" sz="1800" kern="1200" dirty="0"/>
+        </a:p>
+      </dsp:txBody>
+      <dsp:txXfrm>
+        <a:off x="6983996" y="3891166"/>
+        <a:ext cx="1984940" cy="900904"/>
+      </dsp:txXfrm>
+    </dsp:sp>
   </dsp:spTree>
 </dsp:drawing>
 </file>
@@ -13689,7 +16252,7 @@
           <a:p>
             <a:fld id="{039C12ED-8806-4CCC-9C94-51D73545C590}" type="datetimeFigureOut">
               <a:rPr lang="en-US" smtClean="0"/>
-              <a:t>9/17/2015</a:t>
+              <a:t>9/29/2015</a:t>
             </a:fld>
             <a:endParaRPr lang="en-US" dirty="0"/>
           </a:p>
@@ -20425,7 +22988,7 @@
           <a:p>
             <a:fld id="{459220CB-8956-4D40-9A0B-82DE40C3C923}" type="datetimeFigureOut">
               <a:rPr lang="en-US" smtClean="0"/>
-              <a:t>9/17/2015</a:t>
+              <a:t>9/29/2015</a:t>
             </a:fld>
             <a:endParaRPr lang="en-US" dirty="0"/>
           </a:p>
@@ -20763,7 +23326,7 @@
           <a:p>
             <a:fld id="{459220CB-8956-4D40-9A0B-82DE40C3C923}" type="datetimeFigureOut">
               <a:rPr lang="en-US" smtClean="0"/>
-              <a:t>9/17/2015</a:t>
+              <a:t>9/29/2015</a:t>
             </a:fld>
             <a:endParaRPr lang="en-US" dirty="0"/>
           </a:p>
@@ -21164,7 +23727,7 @@
           <a:p>
             <a:fld id="{459220CB-8956-4D40-9A0B-82DE40C3C923}" type="datetimeFigureOut">
               <a:rPr lang="en-US" smtClean="0"/>
-              <a:t>9/17/2015</a:t>
+              <a:t>9/29/2015</a:t>
             </a:fld>
             <a:endParaRPr lang="en-US" dirty="0"/>
           </a:p>
@@ -21500,7 +24063,7 @@
           <a:p>
             <a:fld id="{459220CB-8956-4D40-9A0B-82DE40C3C923}" type="datetimeFigureOut">
               <a:rPr lang="en-US" smtClean="0"/>
-              <a:t>9/17/2015</a:t>
+              <a:t>9/29/2015</a:t>
             </a:fld>
             <a:endParaRPr lang="en-US" dirty="0"/>
           </a:p>
@@ -21820,7 +24383,7 @@
           <a:p>
             <a:fld id="{459220CB-8956-4D40-9A0B-82DE40C3C923}" type="datetimeFigureOut">
               <a:rPr lang="en-US" smtClean="0"/>
-              <a:t>9/17/2015</a:t>
+              <a:t>9/29/2015</a:t>
             </a:fld>
             <a:endParaRPr lang="en-US" dirty="0"/>
           </a:p>
@@ -22216,7 +24779,7 @@
           <a:p>
             <a:fld id="{459220CB-8956-4D40-9A0B-82DE40C3C923}" type="datetimeFigureOut">
               <a:rPr lang="en-US" smtClean="0"/>
-              <a:t>9/17/2015</a:t>
+              <a:t>9/29/2015</a:t>
             </a:fld>
             <a:endParaRPr lang="en-US" dirty="0"/>
           </a:p>
@@ -22473,7 +25036,7 @@
           <a:p>
             <a:fld id="{459220CB-8956-4D40-9A0B-82DE40C3C923}" type="datetimeFigureOut">
               <a:rPr lang="en-US" smtClean="0"/>
-              <a:t>9/17/2015</a:t>
+              <a:t>9/29/2015</a:t>
             </a:fld>
             <a:endParaRPr lang="en-US" dirty="0"/>
           </a:p>
@@ -22735,7 +25298,7 @@
           <a:p>
             <a:fld id="{459220CB-8956-4D40-9A0B-82DE40C3C923}" type="datetimeFigureOut">
               <a:rPr lang="en-US" smtClean="0"/>
-              <a:t>9/17/2015</a:t>
+              <a:t>9/29/2015</a:t>
             </a:fld>
             <a:endParaRPr lang="en-US" dirty="0"/>
           </a:p>
@@ -22997,7 +25560,7 @@
           <a:p>
             <a:fld id="{459220CB-8956-4D40-9A0B-82DE40C3C923}" type="datetimeFigureOut">
               <a:rPr lang="en-US" smtClean="0"/>
-              <a:t>9/17/2015</a:t>
+              <a:t>9/29/2015</a:t>
             </a:fld>
             <a:endParaRPr lang="en-US" dirty="0"/>
           </a:p>
@@ -23326,7 +25889,7 @@
           <a:p>
             <a:fld id="{459220CB-8956-4D40-9A0B-82DE40C3C923}" type="datetimeFigureOut">
               <a:rPr lang="en-US" smtClean="0"/>
-              <a:t>9/17/2015</a:t>
+              <a:t>9/29/2015</a:t>
             </a:fld>
             <a:endParaRPr lang="en-US" dirty="0"/>
           </a:p>
@@ -23649,7 +26212,7 @@
           <a:p>
             <a:fld id="{459220CB-8956-4D40-9A0B-82DE40C3C923}" type="datetimeFigureOut">
               <a:rPr lang="en-US" smtClean="0"/>
-              <a:t>9/17/2015</a:t>
+              <a:t>9/29/2015</a:t>
             </a:fld>
             <a:endParaRPr lang="en-US" dirty="0"/>
           </a:p>
@@ -24106,7 +26669,7 @@
           <a:p>
             <a:fld id="{459220CB-8956-4D40-9A0B-82DE40C3C923}" type="datetimeFigureOut">
               <a:rPr lang="en-US" smtClean="0"/>
-              <a:t>9/17/2015</a:t>
+              <a:t>9/29/2015</a:t>
             </a:fld>
             <a:endParaRPr lang="en-US" dirty="0"/>
           </a:p>
@@ -24311,7 +26874,7 @@
           <a:p>
             <a:fld id="{459220CB-8956-4D40-9A0B-82DE40C3C923}" type="datetimeFigureOut">
               <a:rPr lang="en-US" smtClean="0"/>
-              <a:t>9/17/2015</a:t>
+              <a:t>9/29/2015</a:t>
             </a:fld>
             <a:endParaRPr lang="en-US" dirty="0"/>
           </a:p>
@@ -24488,7 +27051,7 @@
           <a:p>
             <a:fld id="{459220CB-8956-4D40-9A0B-82DE40C3C923}" type="datetimeFigureOut">
               <a:rPr lang="en-US" smtClean="0"/>
-              <a:t>9/17/2015</a:t>
+              <a:t>9/29/2015</a:t>
             </a:fld>
             <a:endParaRPr lang="en-US" dirty="0"/>
           </a:p>
@@ -24821,7 +27384,7 @@
           <a:p>
             <a:fld id="{459220CB-8956-4D40-9A0B-82DE40C3C923}" type="datetimeFigureOut">
               <a:rPr lang="en-US" smtClean="0"/>
-              <a:t>9/17/2015</a:t>
+              <a:t>9/29/2015</a:t>
             </a:fld>
             <a:endParaRPr lang="en-US" dirty="0"/>
           </a:p>
@@ -25166,7 +27729,7 @@
           <a:p>
             <a:fld id="{459220CB-8956-4D40-9A0B-82DE40C3C923}" type="datetimeFigureOut">
               <a:rPr lang="en-US" smtClean="0"/>
-              <a:t>9/17/2015</a:t>
+              <a:t>9/29/2015</a:t>
             </a:fld>
             <a:endParaRPr lang="en-US" dirty="0"/>
           </a:p>
@@ -27283,7 +29846,7 @@
           <a:p>
             <a:fld id="{459220CB-8956-4D40-9A0B-82DE40C3C923}" type="datetimeFigureOut">
               <a:rPr lang="en-US" smtClean="0"/>
-              <a:t>9/17/2015</a:t>
+              <a:t>9/29/2015</a:t>
             </a:fld>
             <a:endParaRPr lang="en-US" dirty="0"/>
           </a:p>
@@ -50668,7 +53231,10 @@
                 <a:gd name="adj1" fmla="val 58808"/>
               </a:avLst>
             </a:prstGeom>
-            <a:ln w="28575">
+            <a:ln w="9525">
+              <a:solidFill>
+                <a:srgbClr val="3E83AD"/>
+              </a:solidFill>
               <a:tailEnd type="triangle"/>
             </a:ln>
           </p:spPr>
@@ -50710,9 +53276,9 @@
             <p:grpSpPr>
               <a:xfrm>
                 <a:off x="2130074" y="1501618"/>
-                <a:ext cx="2416961" cy="2268876"/>
+                <a:ext cx="2420856" cy="2268876"/>
                 <a:chOff x="1557127" y="1991524"/>
-                <a:chExt cx="2416961" cy="2268876"/>
+                <a:chExt cx="2420856" cy="2268876"/>
               </a:xfrm>
             </p:grpSpPr>
             <p:grpSp>
@@ -50743,6 +53309,14 @@
                   <a:prstGeom prst="rect">
                     <a:avLst/>
                   </a:prstGeom>
+                  <a:solidFill>
+                    <a:srgbClr val="A7BFD3"/>
+                  </a:solidFill>
+                  <a:ln w="9525">
+                    <a:solidFill>
+                      <a:srgbClr val="3E83AD"/>
+                    </a:solidFill>
+                  </a:ln>
                 </p:spPr>
                 <p:style>
                   <a:lnRef idx="2">
@@ -50784,11 +53358,13 @@
                     <a:avLst/>
                   </a:prstGeom>
                   <a:solidFill>
-                    <a:schemeClr val="accent1">
-                      <a:lumMod val="20000"/>
-                      <a:lumOff val="80000"/>
-                    </a:schemeClr>
+                    <a:srgbClr val="CAD9E5"/>
                   </a:solidFill>
+                  <a:ln w="9525">
+                    <a:solidFill>
+                      <a:srgbClr val="3E83AD"/>
+                    </a:solidFill>
+                  </a:ln>
                 </p:spPr>
                 <p:style>
                   <a:lnRef idx="2">
@@ -50810,20 +53386,16 @@
                   <a:p>
                     <a:pPr algn="ctr"/>
                     <a:r>
-                      <a:rPr lang="en-US" sz="2000" dirty="0" smtClean="0">
+                      <a:rPr lang="en-US" sz="1600" dirty="0" smtClean="0">
                         <a:solidFill>
-                          <a:schemeClr val="accent1">
-                            <a:lumMod val="75000"/>
-                          </a:schemeClr>
+                          <a:schemeClr val="tx1"/>
                         </a:solidFill>
                       </a:rPr>
-                      <a:t>Desktop</a:t>
+                      <a:t>Main application</a:t>
                     </a:r>
-                    <a:endParaRPr lang="de-CH" sz="2000" dirty="0">
+                    <a:endParaRPr lang="de-CH" sz="1600" dirty="0">
                       <a:solidFill>
-                        <a:schemeClr val="accent1">
-                          <a:lumMod val="75000"/>
-                        </a:schemeClr>
+                        <a:schemeClr val="tx1"/>
                       </a:solidFill>
                     </a:endParaRPr>
                   </a:p>
@@ -50845,7 +53417,11 @@
                   <a:avLst/>
                 </a:prstGeom>
                 <a:noFill/>
-                <a:ln w="28575"/>
+                <a:ln w="9525">
+                  <a:solidFill>
+                    <a:srgbClr val="3E83AD"/>
+                  </a:solidFill>
+                </a:ln>
                 <a:effectLst>
                   <a:glow rad="317500">
                     <a:schemeClr val="accent1">
@@ -50887,7 +53463,7 @@
               <p:spPr>
                 <a:xfrm>
                   <a:off x="1557127" y="1991524"/>
-                  <a:ext cx="1898277" cy="430887"/>
+                  <a:ext cx="2420856" cy="369332"/>
                 </a:xfrm>
                 <a:prstGeom prst="rect">
                   <a:avLst/>
@@ -50901,22 +53477,10 @@
                 <a:lstStyle/>
                 <a:p>
                   <a:r>
-                    <a:rPr lang="en-US" sz="2200" dirty="0" smtClean="0">
-                      <a:solidFill>
-                        <a:schemeClr val="accent1">
-                          <a:lumMod val="75000"/>
-                        </a:schemeClr>
-                      </a:solidFill>
-                    </a:rPr>
-                    <a:t>Main device</a:t>
+                    <a:rPr lang="en-US" dirty="0" smtClean="0"/>
+                    <a:t>Developer Machine</a:t>
                   </a:r>
-                  <a:endParaRPr lang="en-US" sz="2200" dirty="0">
-                    <a:solidFill>
-                      <a:schemeClr val="accent1">
-                        <a:lumMod val="75000"/>
-                      </a:schemeClr>
-                    </a:solidFill>
-                  </a:endParaRPr>
+                  <a:endParaRPr lang="en-US" dirty="0"/>
                 </a:p>
               </p:txBody>
             </p:sp>
@@ -50977,6 +53541,10 @@
                     <a:prstGeom prst="roundRect">
                       <a:avLst/>
                     </a:prstGeom>
+                    <a:solidFill>
+                      <a:srgbClr val="A7BFD3"/>
+                    </a:solidFill>
+                    <a:ln w="9525"/>
                   </p:spPr>
                   <p:style>
                     <a:lnRef idx="2">
@@ -51018,11 +53586,13 @@
                       <a:avLst/>
                     </a:prstGeom>
                     <a:solidFill>
-                      <a:schemeClr val="accent1">
-                        <a:lumMod val="20000"/>
-                        <a:lumOff val="80000"/>
-                      </a:schemeClr>
+                      <a:srgbClr val="CAD9E5"/>
                     </a:solidFill>
+                    <a:ln w="9525">
+                      <a:solidFill>
+                        <a:srgbClr val="3E83AD"/>
+                      </a:solidFill>
+                    </a:ln>
                   </p:spPr>
                   <p:style>
                     <a:lnRef idx="2">
@@ -51043,7 +53613,19 @@
                     <a:lstStyle/>
                     <a:p>
                       <a:pPr algn="ctr"/>
-                      <a:endParaRPr lang="de-CH" dirty="0"/>
+                      <a:r>
+                        <a:rPr lang="de-CH" sz="1600" dirty="0" smtClean="0">
+                          <a:solidFill>
+                            <a:schemeClr val="tx1"/>
+                          </a:solidFill>
+                        </a:rPr>
+                        <a:t>Helper</a:t>
+                      </a:r>
+                      <a:endParaRPr lang="de-CH" sz="1600" dirty="0">
+                        <a:solidFill>
+                          <a:schemeClr val="tx1"/>
+                        </a:solidFill>
+                      </a:endParaRPr>
                     </a:p>
                   </p:txBody>
                 </p:sp>
@@ -51062,6 +53644,14 @@
                   <a:prstGeom prst="ellipse">
                     <a:avLst/>
                   </a:prstGeom>
+                  <a:solidFill>
+                    <a:srgbClr val="A7BFD3"/>
+                  </a:solidFill>
+                  <a:ln w="9525">
+                    <a:solidFill>
+                      <a:srgbClr val="3E83AD"/>
+                    </a:solidFill>
+                  </a:ln>
                 </p:spPr>
                 <p:style>
                   <a:lnRef idx="2">
@@ -51102,6 +53692,14 @@
                   <a:prstGeom prst="ellipse">
                     <a:avLst/>
                   </a:prstGeom>
+                  <a:solidFill>
+                    <a:srgbClr val="A7BFD3"/>
+                  </a:solidFill>
+                  <a:ln w="9525">
+                    <a:solidFill>
+                      <a:srgbClr val="3E83AD"/>
+                    </a:solidFill>
+                  </a:ln>
                 </p:spPr>
                 <p:style>
                   <a:lnRef idx="2">
@@ -51157,6 +53755,14 @@
                   <a:prstGeom prst="roundRect">
                     <a:avLst/>
                   </a:prstGeom>
+                  <a:solidFill>
+                    <a:srgbClr val="A7BFD3"/>
+                  </a:solidFill>
+                  <a:ln w="9525">
+                    <a:solidFill>
+                      <a:srgbClr val="3E83AD"/>
+                    </a:solidFill>
+                  </a:ln>
                 </p:spPr>
                 <p:style>
                   <a:lnRef idx="2">
@@ -51198,11 +53804,13 @@
                     <a:avLst/>
                   </a:prstGeom>
                   <a:solidFill>
-                    <a:schemeClr val="accent1">
-                      <a:lumMod val="20000"/>
-                      <a:lumOff val="80000"/>
-                    </a:schemeClr>
+                    <a:srgbClr val="CAD9E5"/>
                   </a:solidFill>
+                  <a:ln w="9525">
+                    <a:solidFill>
+                      <a:srgbClr val="3E83AD"/>
+                    </a:solidFill>
+                  </a:ln>
                 </p:spPr>
                 <p:style>
                   <a:lnRef idx="2">
@@ -51223,7 +53831,19 @@
                   <a:lstStyle/>
                   <a:p>
                     <a:pPr algn="ctr"/>
-                    <a:endParaRPr lang="de-CH" dirty="0"/>
+                    <a:r>
+                      <a:rPr lang="de-CH" sz="1600" dirty="0" smtClean="0">
+                        <a:solidFill>
+                          <a:schemeClr val="tx1"/>
+                        </a:solidFill>
+                      </a:rPr>
+                      <a:t>Helper</a:t>
+                    </a:r>
+                    <a:endParaRPr lang="de-CH" sz="1600" dirty="0">
+                      <a:solidFill>
+                        <a:schemeClr val="tx1"/>
+                      </a:solidFill>
+                    </a:endParaRPr>
                   </a:p>
                 </p:txBody>
               </p:sp>
@@ -51241,6 +53861,14 @@
                   <a:prstGeom prst="roundRect">
                     <a:avLst/>
                   </a:prstGeom>
+                  <a:solidFill>
+                    <a:srgbClr val="A7BFD3"/>
+                  </a:solidFill>
+                  <a:ln w="9525">
+                    <a:solidFill>
+                      <a:srgbClr val="3E83AD"/>
+                    </a:solidFill>
+                  </a:ln>
                 </p:spPr>
                 <p:style>
                   <a:lnRef idx="2">
@@ -51281,6 +53909,14 @@
                   <a:prstGeom prst="roundRect">
                     <a:avLst/>
                   </a:prstGeom>
+                  <a:solidFill>
+                    <a:srgbClr val="A7BFD3"/>
+                  </a:solidFill>
+                  <a:ln w="9525">
+                    <a:solidFill>
+                      <a:srgbClr val="3E83AD"/>
+                    </a:solidFill>
+                  </a:ln>
                 </p:spPr>
                 <p:style>
                   <a:lnRef idx="2">
@@ -51323,7 +53959,11 @@
                   <a:avLst/>
                 </a:prstGeom>
                 <a:noFill/>
-                <a:ln w="28575"/>
+                <a:ln w="9525">
+                  <a:solidFill>
+                    <a:srgbClr val="3E83AD"/>
+                  </a:solidFill>
+                </a:ln>
                 <a:effectLst>
                   <a:glow rad="317500">
                     <a:schemeClr val="accent1">
@@ -51365,7 +54005,7 @@
               <p:spPr>
                 <a:xfrm>
                   <a:off x="1452136" y="4521360"/>
-                  <a:ext cx="2234907" cy="430887"/>
+                  <a:ext cx="1616148" cy="369332"/>
                 </a:xfrm>
                 <a:prstGeom prst="rect">
                   <a:avLst/>
@@ -51379,22 +54019,10 @@
                 <a:lstStyle/>
                 <a:p>
                   <a:r>
-                    <a:rPr lang="en-US" sz="2200" dirty="0" smtClean="0">
-                      <a:solidFill>
-                        <a:schemeClr val="accent1">
-                          <a:lumMod val="75000"/>
-                        </a:schemeClr>
-                      </a:solidFill>
-                    </a:rPr>
-                    <a:t>Actual devices</a:t>
+                    <a:rPr lang="en-US" dirty="0" smtClean="0"/>
+                    <a:t>Real devices</a:t>
                   </a:r>
-                  <a:endParaRPr lang="en-US" sz="2200" dirty="0">
-                    <a:solidFill>
-                      <a:schemeClr val="accent1">
-                        <a:lumMod val="75000"/>
-                      </a:schemeClr>
-                    </a:solidFill>
-                  </a:endParaRPr>
+                  <a:endParaRPr lang="en-US" dirty="0"/>
                 </a:p>
               </p:txBody>
             </p:sp>
@@ -51413,29 +54041,19 @@
               <a:prstGeom prst="can">
                 <a:avLst/>
               </a:prstGeom>
-              <a:effectLst>
-                <a:glow rad="317500">
-                  <a:schemeClr val="accent6">
-                    <a:satMod val="175000"/>
-                    <a:alpha val="0"/>
-                  </a:schemeClr>
-                </a:glow>
-              </a:effectLst>
             </p:spPr>
             <p:style>
-              <a:lnRef idx="2">
-                <a:schemeClr val="accent6">
-                  <a:shade val="50000"/>
-                </a:schemeClr>
+              <a:lnRef idx="1">
+                <a:schemeClr val="accent3"/>
               </a:lnRef>
-              <a:fillRef idx="1">
-                <a:schemeClr val="accent6"/>
+              <a:fillRef idx="2">
+                <a:schemeClr val="accent3"/>
               </a:fillRef>
-              <a:effectRef idx="0">
-                <a:schemeClr val="accent6"/>
+              <a:effectRef idx="1">
+                <a:schemeClr val="accent3"/>
               </a:effectRef>
               <a:fontRef idx="minor">
-                <a:schemeClr val="lt1"/>
+                <a:schemeClr val="dk1"/>
               </a:fontRef>
             </p:style>
             <p:txBody>
@@ -51444,22 +54062,16 @@
               <a:p>
                 <a:pPr algn="ctr"/>
                 <a:r>
-                  <a:rPr lang="en-US" sz="2200" dirty="0" smtClean="0">
+                  <a:rPr lang="en-US" dirty="0" smtClean="0">
                     <a:solidFill>
-                      <a:schemeClr val="accent5">
-                        <a:lumMod val="20000"/>
-                        <a:lumOff val="80000"/>
-                      </a:schemeClr>
+                      <a:schemeClr val="tx1"/>
                     </a:solidFill>
                   </a:rPr>
                   <a:t>Application Server</a:t>
                 </a:r>
-                <a:endParaRPr lang="en-US" sz="2200" dirty="0">
+                <a:endParaRPr lang="en-US" dirty="0">
                   <a:solidFill>
-                    <a:schemeClr val="accent5">
-                      <a:lumMod val="20000"/>
-                      <a:lumOff val="80000"/>
-                    </a:schemeClr>
+                    <a:schemeClr val="tx1"/>
                   </a:solidFill>
                 </a:endParaRPr>
               </a:p>
@@ -51479,29 +54091,19 @@
               <a:prstGeom prst="can">
                 <a:avLst/>
               </a:prstGeom>
-              <a:effectLst>
-                <a:glow rad="317500">
-                  <a:schemeClr val="accent4">
-                    <a:satMod val="175000"/>
-                    <a:alpha val="0"/>
-                  </a:schemeClr>
-                </a:glow>
-              </a:effectLst>
             </p:spPr>
             <p:style>
-              <a:lnRef idx="2">
-                <a:schemeClr val="accent4">
-                  <a:shade val="50000"/>
-                </a:schemeClr>
+              <a:lnRef idx="1">
+                <a:schemeClr val="accent4"/>
               </a:lnRef>
-              <a:fillRef idx="1">
+              <a:fillRef idx="2">
                 <a:schemeClr val="accent4"/>
               </a:fillRef>
-              <a:effectRef idx="0">
+              <a:effectRef idx="1">
                 <a:schemeClr val="accent4"/>
               </a:effectRef>
               <a:fontRef idx="minor">
-                <a:schemeClr val="lt1"/>
+                <a:schemeClr val="dk1"/>
               </a:fontRef>
             </p:style>
             <p:txBody>
@@ -51510,12 +54112,9 @@
               <a:p>
                 <a:pPr algn="ctr"/>
                 <a:r>
-                  <a:rPr lang="en-US" sz="2200" dirty="0" smtClean="0">
+                  <a:rPr lang="en-US" dirty="0" smtClean="0">
                     <a:solidFill>
-                      <a:schemeClr val="accent4">
-                        <a:lumMod val="20000"/>
-                        <a:lumOff val="80000"/>
-                      </a:schemeClr>
+                      <a:schemeClr val="tx1"/>
                     </a:solidFill>
                   </a:rPr>
                   <a:t>DNS Server</a:t>
@@ -51537,29 +54136,19 @@
               <a:prstGeom prst="can">
                 <a:avLst/>
               </a:prstGeom>
-              <a:effectLst>
-                <a:glow rad="317500">
-                  <a:schemeClr val="accent2">
-                    <a:satMod val="175000"/>
-                    <a:alpha val="0"/>
-                  </a:schemeClr>
-                </a:glow>
-              </a:effectLst>
             </p:spPr>
             <p:style>
-              <a:lnRef idx="2">
-                <a:schemeClr val="accent2">
-                  <a:shade val="50000"/>
-                </a:schemeClr>
+              <a:lnRef idx="1">
+                <a:schemeClr val="accent2"/>
               </a:lnRef>
-              <a:fillRef idx="1">
+              <a:fillRef idx="2">
                 <a:schemeClr val="accent2"/>
               </a:fillRef>
-              <a:effectRef idx="0">
+              <a:effectRef idx="1">
                 <a:schemeClr val="accent2"/>
               </a:effectRef>
               <a:fontRef idx="minor">
-                <a:schemeClr val="lt1"/>
+                <a:schemeClr val="dk1"/>
               </a:fontRef>
             </p:style>
             <p:txBody>
@@ -51568,12 +54157,9 @@
               <a:p>
                 <a:pPr algn="ctr"/>
                 <a:r>
-                  <a:rPr lang="en-US" sz="2200" dirty="0" smtClean="0">
+                  <a:rPr lang="en-US" dirty="0" smtClean="0">
                     <a:solidFill>
-                      <a:schemeClr val="accent2">
-                        <a:lumMod val="20000"/>
-                        <a:lumOff val="80000"/>
-                      </a:schemeClr>
+                      <a:schemeClr val="tx1"/>
                     </a:solidFill>
                   </a:rPr>
                   <a:t>Server</a:t>
@@ -51589,8 +54175,8 @@
             </p:nvSpPr>
             <p:spPr>
               <a:xfrm>
-                <a:off x="4603626" y="2263765"/>
-                <a:ext cx="2816795" cy="400110"/>
+                <a:off x="4746135" y="2323145"/>
+                <a:ext cx="2816795" cy="338554"/>
               </a:xfrm>
               <a:prstGeom prst="rect">
                 <a:avLst/>
@@ -51604,22 +54190,10 @@
               <a:lstStyle/>
               <a:p>
                 <a:r>
-                  <a:rPr lang="en-US" sz="2000" dirty="0" smtClean="0">
-                    <a:solidFill>
-                      <a:schemeClr val="accent1">
-                        <a:lumMod val="75000"/>
-                      </a:schemeClr>
-                    </a:solidFill>
-                  </a:rPr>
+                  <a:rPr lang="en-US" sz="1600" dirty="0" smtClean="0"/>
                   <a:t>Requests subdomain</a:t>
                 </a:r>
-                <a:endParaRPr lang="en-US" sz="2000" dirty="0">
-                  <a:solidFill>
-                    <a:schemeClr val="accent1">
-                      <a:lumMod val="75000"/>
-                    </a:schemeClr>
-                  </a:solidFill>
-                </a:endParaRPr>
+                <a:endParaRPr lang="en-US" sz="1600" dirty="0"/>
               </a:p>
             </p:txBody>
           </p:sp>
@@ -51631,8 +54205,8 @@
             </p:nvSpPr>
             <p:spPr>
               <a:xfrm>
-                <a:off x="5509420" y="5431814"/>
-                <a:ext cx="2392349" cy="400110"/>
+                <a:off x="4923566" y="5110294"/>
+                <a:ext cx="3534386" cy="584775"/>
               </a:xfrm>
               <a:prstGeom prst="rect">
                 <a:avLst/>
@@ -51646,102 +54220,10 @@
               <a:lstStyle/>
               <a:p>
                 <a:r>
-                  <a:rPr lang="en-US" sz="2000" dirty="0" smtClean="0">
-                    <a:solidFill>
-                      <a:schemeClr val="accent2">
-                        <a:lumMod val="75000"/>
-                      </a:schemeClr>
-                    </a:solidFill>
-                  </a:rPr>
-                  <a:t>Sends commands</a:t>
+                  <a:rPr lang="en-US" sz="1600" dirty="0" smtClean="0"/>
+                  <a:t>Helper application, commands, script</a:t>
                 </a:r>
-                <a:endParaRPr lang="en-US" sz="2000" dirty="0">
-                  <a:solidFill>
-                    <a:schemeClr val="accent2">
-                      <a:lumMod val="75000"/>
-                    </a:schemeClr>
-                  </a:solidFill>
-                </a:endParaRPr>
-              </a:p>
-            </p:txBody>
-          </p:sp>
-          <p:cxnSp>
-            <p:nvCxnSpPr>
-              <p:cNvPr id="15" name="Gerade Verbindung mit Pfeil 54"/>
-              <p:cNvCxnSpPr>
-                <a:stCxn id="12" idx="1"/>
-                <a:endCxn id="10" idx="3"/>
-              </p:cNvCxnSpPr>
-              <p:nvPr/>
-            </p:nvCxnSpPr>
-            <p:spPr>
-              <a:xfrm rot="5400000" flipH="1" flipV="1">
-                <a:off x="8938704" y="3854616"/>
-                <a:ext cx="1254050" cy="422425"/>
-              </a:xfrm>
-              <a:prstGeom prst="bentConnector3">
-                <a:avLst>
-                  <a:gd name="adj1" fmla="val 50000"/>
-                </a:avLst>
-              </a:prstGeom>
-              <a:ln w="28575">
-                <a:tailEnd type="triangle"/>
-              </a:ln>
-            </p:spPr>
-            <p:style>
-              <a:lnRef idx="1">
-                <a:schemeClr val="accent2"/>
-              </a:lnRef>
-              <a:fillRef idx="0">
-                <a:schemeClr val="accent2"/>
-              </a:fillRef>
-              <a:effectRef idx="0">
-                <a:schemeClr val="accent2"/>
-              </a:effectRef>
-              <a:fontRef idx="minor">
-                <a:schemeClr val="tx1"/>
-              </a:fontRef>
-            </p:style>
-          </p:cxnSp>
-          <p:sp>
-            <p:nvSpPr>
-              <p:cNvPr id="16" name="Textfeld 55"/>
-              <p:cNvSpPr txBox="1"/>
-              <p:nvPr/>
-            </p:nvSpPr>
-            <p:spPr>
-              <a:xfrm>
-                <a:off x="9321068" y="4006439"/>
-                <a:ext cx="956028" cy="707886"/>
-              </a:xfrm>
-              <a:prstGeom prst="rect">
-                <a:avLst/>
-              </a:prstGeom>
-              <a:noFill/>
-            </p:spPr>
-            <p:txBody>
-              <a:bodyPr wrap="square" rtlCol="0">
-                <a:spAutoFit/>
-              </a:bodyPr>
-              <a:lstStyle/>
-              <a:p>
-                <a:r>
-                  <a:rPr lang="en-US" sz="2000" dirty="0" smtClean="0">
-                    <a:solidFill>
-                      <a:schemeClr val="accent2">
-                        <a:lumMod val="75000"/>
-                      </a:schemeClr>
-                    </a:solidFill>
-                  </a:rPr>
-                  <a:t>Sends script</a:t>
-                </a:r>
-                <a:endParaRPr lang="en-US" sz="2000" dirty="0">
-                  <a:solidFill>
-                    <a:schemeClr val="accent2">
-                      <a:lumMod val="75000"/>
-                    </a:schemeClr>
-                  </a:solidFill>
-                </a:endParaRPr>
+                <a:endParaRPr lang="en-US" sz="1600" dirty="0"/>
               </a:p>
             </p:txBody>
           </p:sp>
@@ -51755,15 +54237,19 @@
             </p:nvCxnSpPr>
             <p:spPr>
               <a:xfrm rot="10800000" flipV="1">
-                <a:off x="5259952" y="2801042"/>
-                <a:ext cx="3605415" cy="1525718"/>
+                <a:off x="5259954" y="2801042"/>
+                <a:ext cx="3605413" cy="1525718"/>
               </a:xfrm>
               <a:prstGeom prst="bentConnector3">
                 <a:avLst>
-                  <a:gd name="adj1" fmla="val 28341"/>
+                  <a:gd name="adj1" fmla="val 21838"/>
                 </a:avLst>
               </a:prstGeom>
-              <a:ln w="28575"/>
+              <a:ln w="9525">
+                <a:solidFill>
+                  <a:srgbClr val="EB8B00"/>
+                </a:solidFill>
+              </a:ln>
             </p:spPr>
             <p:style>
               <a:lnRef idx="2">
@@ -51788,8 +54274,8 @@
             </p:nvSpPr>
             <p:spPr>
               <a:xfrm>
-                <a:off x="5658080" y="3324531"/>
-                <a:ext cx="2297083" cy="1015663"/>
+                <a:off x="5462950" y="4021287"/>
+                <a:ext cx="2584030" cy="338554"/>
               </a:xfrm>
               <a:prstGeom prst="rect">
                 <a:avLst/>
@@ -51803,22 +54289,10 @@
               <a:lstStyle/>
               <a:p>
                 <a:r>
-                  <a:rPr lang="en-US" sz="2000" dirty="0" smtClean="0">
-                    <a:solidFill>
-                      <a:schemeClr val="accent6">
-                        <a:lumMod val="75000"/>
-                      </a:schemeClr>
-                    </a:solidFill>
-                  </a:rPr>
-                  <a:t>Provides application that is being tested</a:t>
+                  <a:rPr lang="en-US" sz="1600" dirty="0" smtClean="0"/>
+                  <a:t>Application under test</a:t>
                 </a:r>
-                <a:endParaRPr lang="en-US" sz="2000" dirty="0">
-                  <a:solidFill>
-                    <a:schemeClr val="accent6">
-                      <a:lumMod val="75000"/>
-                    </a:schemeClr>
-                  </a:solidFill>
-                </a:endParaRPr>
+                <a:endParaRPr lang="en-US" sz="1600" dirty="0"/>
               </a:p>
             </p:txBody>
           </p:sp>
@@ -51830,15 +54304,18 @@
             </p:nvCxnSpPr>
             <p:spPr>
               <a:xfrm>
-                <a:off x="4529907" y="3041651"/>
-                <a:ext cx="4243070" cy="2183270"/>
+                <a:off x="4547035" y="2845154"/>
+                <a:ext cx="4225942" cy="2174457"/>
               </a:xfrm>
               <a:prstGeom prst="bentConnector3">
                 <a:avLst>
-                  <a:gd name="adj1" fmla="val 19589"/>
+                  <a:gd name="adj1" fmla="val 19948"/>
                 </a:avLst>
               </a:prstGeom>
-              <a:ln w="28575">
+              <a:ln w="9525">
+                <a:solidFill>
+                  <a:srgbClr val="9EAF25"/>
+                </a:solidFill>
                 <a:headEnd type="triangle"/>
                 <a:tailEnd type="triangle"/>
               </a:ln>
@@ -51866,8 +54343,8 @@
             </p:nvSpPr>
             <p:spPr>
               <a:xfrm>
-                <a:off x="5298199" y="4838781"/>
-                <a:ext cx="3590615" cy="400110"/>
+                <a:off x="5351340" y="4465900"/>
+                <a:ext cx="3590615" cy="584775"/>
               </a:xfrm>
               <a:prstGeom prst="rect">
                 <a:avLst/>
@@ -51881,22 +54358,18 @@
               <a:lstStyle/>
               <a:p>
                 <a:r>
-                  <a:rPr lang="en-US" sz="2000" dirty="0" smtClean="0">
-                    <a:solidFill>
-                      <a:schemeClr val="accent2">
-                        <a:lumMod val="75000"/>
-                      </a:schemeClr>
-                    </a:solidFill>
-                  </a:rPr>
-                  <a:t>Application, commands, …</a:t>
+                  <a:rPr lang="en-US" sz="1600" dirty="0" smtClean="0"/>
+                  <a:t>Main application, </a:t>
                 </a:r>
-                <a:endParaRPr lang="en-US" sz="2000" dirty="0">
-                  <a:solidFill>
-                    <a:schemeClr val="accent2">
-                      <a:lumMod val="75000"/>
-                    </a:schemeClr>
-                  </a:solidFill>
-                </a:endParaRPr>
+                <a:r>
+                  <a:rPr lang="en-US" sz="1600" dirty="0" smtClean="0"/>
+                  <a:t>commands, </a:t>
+                </a:r>
+                <a:r>
+                  <a:rPr lang="en-US" sz="1600" dirty="0" smtClean="0"/>
+                  <a:t>script</a:t>
+                </a:r>
+                <a:endParaRPr lang="en-US" sz="1600" dirty="0"/>
               </a:p>
             </p:txBody>
           </p:sp>
@@ -51914,7 +54387,11 @@
               <a:prstGeom prst="line">
                 <a:avLst/>
               </a:prstGeom>
-              <a:ln w="28575"/>
+              <a:ln w="9525">
+                <a:solidFill>
+                  <a:srgbClr val="EB8B00"/>
+                </a:solidFill>
+              </a:ln>
             </p:spPr>
             <p:style>
               <a:lnRef idx="2">
@@ -51940,12 +54417,16 @@
             <p:spPr>
               <a:xfrm flipV="1">
                 <a:off x="5252693" y="4146502"/>
-                <a:ext cx="0" cy="1028990"/>
+                <a:ext cx="0" cy="689257"/>
               </a:xfrm>
               <a:prstGeom prst="line">
                 <a:avLst/>
               </a:prstGeom>
-              <a:ln w="28575"/>
+              <a:ln w="9525">
+                <a:solidFill>
+                  <a:srgbClr val="EB8B00"/>
+                </a:solidFill>
+              </a:ln>
             </p:spPr>
             <p:style>
               <a:lnRef idx="2">
@@ -51970,13 +54451,16 @@
             </p:nvCxnSpPr>
             <p:spPr>
               <a:xfrm flipH="1">
-                <a:off x="4529907" y="3321401"/>
-                <a:ext cx="722786" cy="0"/>
+                <a:off x="4547035" y="3321401"/>
+                <a:ext cx="705658" cy="0"/>
               </a:xfrm>
               <a:prstGeom prst="straightConnector1">
                 <a:avLst/>
               </a:prstGeom>
-              <a:ln w="28575">
+              <a:ln w="9525">
+                <a:solidFill>
+                  <a:srgbClr val="EB8B00"/>
+                </a:solidFill>
                 <a:tailEnd type="triangle"/>
               </a:ln>
             </p:spPr>
@@ -52003,24 +54487,27 @@
             </p:nvCxnSpPr>
             <p:spPr>
               <a:xfrm flipH="1">
-                <a:off x="4876063" y="5180144"/>
-                <a:ext cx="376630" cy="0"/>
+                <a:off x="4876062" y="4835759"/>
+                <a:ext cx="376631" cy="0"/>
               </a:xfrm>
               <a:prstGeom prst="straightConnector1">
                 <a:avLst/>
               </a:prstGeom>
-              <a:ln w="28575">
+              <a:ln w="9525">
+                <a:solidFill>
+                  <a:srgbClr val="EB8B00"/>
+                </a:solidFill>
                 <a:tailEnd type="triangle"/>
               </a:ln>
             </p:spPr>
             <p:style>
-              <a:lnRef idx="1">
+              <a:lnRef idx="2">
                 <a:schemeClr val="accent6"/>
               </a:lnRef>
               <a:fillRef idx="0">
                 <a:schemeClr val="accent6"/>
               </a:fillRef>
-              <a:effectRef idx="0">
+              <a:effectRef idx="1">
                 <a:schemeClr val="accent6"/>
               </a:effectRef>
               <a:fontRef idx="minor">
@@ -52036,13 +54523,16 @@
             </p:nvCxnSpPr>
             <p:spPr>
               <a:xfrm flipH="1" flipV="1">
-                <a:off x="4876062" y="5452872"/>
-                <a:ext cx="3989304" cy="14619"/>
+                <a:off x="4876063" y="5666633"/>
+                <a:ext cx="3896914" cy="14278"/>
               </a:xfrm>
               <a:prstGeom prst="straightConnector1">
                 <a:avLst/>
               </a:prstGeom>
-              <a:ln w="28575">
+              <a:ln w="9525">
+                <a:solidFill>
+                  <a:srgbClr val="9EAF25"/>
+                </a:solidFill>
                 <a:tailEnd type="triangle"/>
               </a:ln>
             </p:spPr>
@@ -52086,22 +54576,10 @@
           <a:lstStyle/>
           <a:p>
             <a:r>
-              <a:rPr lang="en-US" sz="1600" dirty="0" smtClean="0">
-                <a:solidFill>
-                  <a:schemeClr val="accent1">
-                    <a:lumMod val="75000"/>
-                  </a:schemeClr>
-                </a:solidFill>
-              </a:rPr>
+              <a:rPr lang="en-US" sz="1600" dirty="0" smtClean="0"/>
               <a:t>Chrome extension</a:t>
             </a:r>
-            <a:endParaRPr lang="en-US" sz="1600" dirty="0">
-              <a:solidFill>
-                <a:schemeClr val="accent1">
-                  <a:lumMod val="75000"/>
-                </a:schemeClr>
-              </a:solidFill>
-            </a:endParaRPr>
+            <a:endParaRPr lang="en-US" sz="1600" dirty="0"/>
           </a:p>
         </p:txBody>
       </p:sp>
@@ -52120,7 +54598,11 @@
             <a:avLst/>
           </a:prstGeom>
           <a:noFill/>
-          <a:ln w="12700"/>
+          <a:ln w="6350">
+            <a:solidFill>
+              <a:schemeClr val="tx1"/>
+            </a:solidFill>
+          </a:ln>
           <a:effectLst>
             <a:glow rad="317500">
               <a:schemeClr val="accent1">

</xml_diff>